<commit_message>
Preserving stack trace when re-throw exception
</commit_message>
<xml_diff>
--- a/C# Tips and Tricks.pptx
+++ b/C# Tips and Tricks.pptx
@@ -7,10 +7,10 @@
     <p:sldMasterId id="2147483653" r:id="rId3"/>
   </p:sldMasterIdLst>
   <p:notesMasterIdLst>
-    <p:notesMasterId r:id="rId10"/>
+    <p:notesMasterId r:id="rId11"/>
   </p:notesMasterIdLst>
   <p:handoutMasterIdLst>
-    <p:handoutMasterId r:id="rId11"/>
+    <p:handoutMasterId r:id="rId12"/>
   </p:handoutMasterIdLst>
   <p:sldIdLst>
     <p:sldId id="256" r:id="rId4"/>
@@ -19,6 +19,7 @@
     <p:sldId id="259" r:id="rId7"/>
     <p:sldId id="260" r:id="rId8"/>
     <p:sldId id="261" r:id="rId9"/>
+    <p:sldId id="262" r:id="rId10"/>
   </p:sldIdLst>
   <p:sldSz cx="9144000" cy="5143500" type="screen16x9"/>
   <p:notesSz cx="6858000" cy="9144000"/>
@@ -6701,6 +6702,315 @@
     <p:extLst>
       <p:ext uri="{BB962C8B-B14F-4D97-AF65-F5344CB8AC3E}">
         <p14:creationId xmlns:p14="http://schemas.microsoft.com/office/powerpoint/2010/main" val="2991388255"/>
+      </p:ext>
+    </p:extLst>
+  </p:cSld>
+  <p:clrMapOvr>
+    <a:masterClrMapping/>
+  </p:clrMapOvr>
+</p:sld>
+</file>
+
+<file path=ppt/slides/slide7.xml><?xml version="1.0" encoding="utf-8"?>
+<p:sld xmlns:a="http://schemas.openxmlformats.org/drawingml/2006/main" xmlns:r="http://schemas.openxmlformats.org/officeDocument/2006/relationships" xmlns:p="http://schemas.openxmlformats.org/presentationml/2006/main">
+  <p:cSld>
+    <p:spTree>
+      <p:nvGrpSpPr>
+        <p:cNvPr id="1" name=""/>
+        <p:cNvGrpSpPr/>
+        <p:nvPr/>
+      </p:nvGrpSpPr>
+      <p:grpSpPr>
+        <a:xfrm>
+          <a:off x="0" y="0"/>
+          <a:ext cx="0" cy="0"/>
+          <a:chOff x="0" y="0"/>
+          <a:chExt cx="0" cy="0"/>
+        </a:xfrm>
+      </p:grpSpPr>
+      <p:sp>
+        <p:nvSpPr>
+          <p:cNvPr id="2" name="Текстов контейнер 1"/>
+          <p:cNvSpPr>
+            <a:spLocks noGrp="1"/>
+          </p:cNvSpPr>
+          <p:nvPr>
+            <p:ph type="body" sz="quarter" idx="10"/>
+          </p:nvPr>
+        </p:nvSpPr>
+        <p:spPr/>
+        <p:txBody>
+          <a:bodyPr/>
+          <a:lstStyle/>
+          <a:p>
+            <a:r>
+              <a:rPr lang="en-US" b="1" i="1" dirty="0" smtClean="0">
+                <a:solidFill>
+                  <a:schemeClr val="tx1"/>
+                </a:solidFill>
+              </a:rPr>
+              <a:t>Preserving stack trace	</a:t>
+            </a:r>
+            <a:endParaRPr lang="en-US" b="1" i="1" dirty="0">
+              <a:solidFill>
+                <a:schemeClr val="tx1"/>
+              </a:solidFill>
+            </a:endParaRPr>
+          </a:p>
+        </p:txBody>
+      </p:sp>
+      <p:sp>
+        <p:nvSpPr>
+          <p:cNvPr id="3" name="Текстов контейнер 2"/>
+          <p:cNvSpPr>
+            <a:spLocks noGrp="1"/>
+          </p:cNvSpPr>
+          <p:nvPr>
+            <p:ph type="body" sz="quarter" idx="11"/>
+          </p:nvPr>
+        </p:nvSpPr>
+        <p:spPr>
+          <a:xfrm>
+            <a:off x="0" y="699542"/>
+            <a:ext cx="9144000" cy="4104456"/>
+          </a:xfrm>
+        </p:spPr>
+        <p:txBody>
+          <a:bodyPr anchor="t"/>
+          <a:lstStyle/>
+          <a:p>
+            <a:pPr marL="342900" indent="-342900" algn="l">
+              <a:buFont typeface="Wingdings" panose="05000000000000000000" pitchFamily="2" charset="2"/>
+              <a:buChar char="§"/>
+            </a:pPr>
+            <a:r>
+              <a:rPr lang="en-US" sz="2000" dirty="0" smtClean="0">
+                <a:solidFill>
+                  <a:schemeClr val="tx1"/>
+                </a:solidFill>
+              </a:rPr>
+              <a:t>These two same blocks simply </a:t>
+            </a:r>
+            <a:r>
+              <a:rPr lang="en-US" sz="2000" b="1" dirty="0" smtClean="0">
+                <a:solidFill>
+                  <a:schemeClr val="tx1"/>
+                </a:solidFill>
+              </a:rPr>
+              <a:t>re-throw</a:t>
+            </a:r>
+            <a:r>
+              <a:rPr lang="en-US" sz="2000" dirty="0" smtClean="0">
+                <a:solidFill>
+                  <a:schemeClr val="tx1"/>
+                </a:solidFill>
+              </a:rPr>
+              <a:t> the exception keeping the                 </a:t>
+            </a:r>
+            <a:r>
+              <a:rPr lang="en-US" sz="2000" b="1" dirty="0" smtClean="0">
+                <a:solidFill>
+                  <a:schemeClr val="tx1"/>
+                </a:solidFill>
+              </a:rPr>
+              <a:t>stack trace</a:t>
+            </a:r>
+            <a:r>
+              <a:rPr lang="en-US" sz="2000" dirty="0" smtClean="0">
+                <a:solidFill>
+                  <a:schemeClr val="tx1"/>
+                </a:solidFill>
+              </a:rPr>
+              <a:t>:</a:t>
+            </a:r>
+          </a:p>
+          <a:p>
+            <a:pPr algn="l"/>
+            <a:r>
+              <a:rPr lang="en-US" sz="2000" dirty="0" smtClean="0">
+                <a:solidFill>
+                  <a:schemeClr val="tx1"/>
+                </a:solidFill>
+              </a:rPr>
+              <a:t>	</a:t>
+            </a:r>
+            <a:r>
+              <a:rPr lang="en-US" sz="2000" b="1" dirty="0" smtClean="0">
+                <a:solidFill>
+                  <a:schemeClr val="tx1"/>
+                </a:solidFill>
+              </a:rPr>
+              <a:t>try { </a:t>
+            </a:r>
+            <a:r>
+              <a:rPr lang="en-150" sz="2000" b="1" dirty="0" smtClean="0">
+                <a:solidFill>
+                  <a:schemeClr val="tx1"/>
+                </a:solidFill>
+              </a:rPr>
+              <a:t>…</a:t>
+            </a:r>
+            <a:r>
+              <a:rPr lang="en-US" sz="2000" b="1" dirty="0" smtClean="0">
+                <a:solidFill>
+                  <a:schemeClr val="tx1"/>
+                </a:solidFill>
+              </a:rPr>
+              <a:t> } catch () { throw; }</a:t>
+            </a:r>
+          </a:p>
+          <a:p>
+            <a:pPr algn="l"/>
+            <a:r>
+              <a:rPr lang="en-US" sz="2000" b="1" dirty="0" smtClean="0">
+                <a:solidFill>
+                  <a:schemeClr val="tx1"/>
+                </a:solidFill>
+              </a:rPr>
+              <a:t>	try { </a:t>
+            </a:r>
+            <a:r>
+              <a:rPr lang="en-150" sz="2000" b="1" dirty="0" smtClean="0">
+                <a:solidFill>
+                  <a:schemeClr val="tx1"/>
+                </a:solidFill>
+              </a:rPr>
+              <a:t>…</a:t>
+            </a:r>
+            <a:r>
+              <a:rPr lang="en-US" sz="2000" b="1" dirty="0" smtClean="0">
+                <a:solidFill>
+                  <a:schemeClr val="tx1"/>
+                </a:solidFill>
+              </a:rPr>
+              <a:t> } catch (Exception e) { throw; }</a:t>
+            </a:r>
+          </a:p>
+          <a:p>
+            <a:pPr marL="342900" indent="-342900" algn="l">
+              <a:buFont typeface="Wingdings" panose="05000000000000000000" pitchFamily="2" charset="2"/>
+              <a:buChar char="§"/>
+            </a:pPr>
+            <a:r>
+              <a:rPr lang="en-US" sz="2000" dirty="0" smtClean="0">
+                <a:solidFill>
+                  <a:schemeClr val="tx1"/>
+                </a:solidFill>
+              </a:rPr>
+              <a:t>The next block is different:</a:t>
+            </a:r>
+          </a:p>
+          <a:p>
+            <a:pPr algn="l"/>
+            <a:r>
+              <a:rPr lang="en-US" sz="2000" dirty="0" smtClean="0">
+                <a:solidFill>
+                  <a:schemeClr val="tx1"/>
+                </a:solidFill>
+              </a:rPr>
+              <a:t>	</a:t>
+            </a:r>
+            <a:r>
+              <a:rPr lang="en-US" sz="2000" b="1" dirty="0" smtClean="0">
+                <a:solidFill>
+                  <a:schemeClr val="tx1"/>
+                </a:solidFill>
+              </a:rPr>
+              <a:t>try { </a:t>
+            </a:r>
+            <a:r>
+              <a:rPr lang="en-150" sz="2000" b="1" dirty="0" smtClean="0">
+                <a:solidFill>
+                  <a:schemeClr val="tx1"/>
+                </a:solidFill>
+              </a:rPr>
+              <a:t>…</a:t>
+            </a:r>
+            <a:r>
+              <a:rPr lang="en-US" sz="2000" b="1" dirty="0" smtClean="0">
+                <a:solidFill>
+                  <a:schemeClr val="tx1"/>
+                </a:solidFill>
+              </a:rPr>
+              <a:t> } catch (Exception ex) { throw ex; }</a:t>
+            </a:r>
+          </a:p>
+          <a:p>
+            <a:pPr marL="342900" indent="-342900" algn="l">
+              <a:buFont typeface="Wingdings" panose="05000000000000000000" pitchFamily="2" charset="2"/>
+              <a:buChar char="§"/>
+            </a:pPr>
+            <a:r>
+              <a:rPr lang="en-US" sz="2000" dirty="0" smtClean="0">
+                <a:solidFill>
+                  <a:schemeClr val="tx1"/>
+                </a:solidFill>
+              </a:rPr>
+              <a:t>It will change the </a:t>
+            </a:r>
+            <a:r>
+              <a:rPr lang="en-US" sz="2000" b="1" dirty="0" smtClean="0">
+                <a:solidFill>
+                  <a:schemeClr val="tx1"/>
+                </a:solidFill>
+              </a:rPr>
+              <a:t>source</a:t>
+            </a:r>
+            <a:r>
+              <a:rPr lang="en-US" sz="2000" dirty="0" smtClean="0">
+                <a:solidFill>
+                  <a:schemeClr val="tx1"/>
+                </a:solidFill>
+              </a:rPr>
+              <a:t> and the </a:t>
+            </a:r>
+            <a:r>
+              <a:rPr lang="en-US" sz="2000" b="1" dirty="0" smtClean="0">
+                <a:solidFill>
+                  <a:schemeClr val="tx1"/>
+                </a:solidFill>
+              </a:rPr>
+              <a:t>stack trace</a:t>
+            </a:r>
+          </a:p>
+          <a:p>
+            <a:pPr marL="1085850" lvl="1" indent="-342900">
+              <a:buFont typeface="Wingdings" panose="05000000000000000000" pitchFamily="2" charset="2"/>
+              <a:buChar char="§"/>
+            </a:pPr>
+            <a:r>
+              <a:rPr lang="en-US" sz="2000" dirty="0" smtClean="0"/>
+              <a:t>It will appear that the exception has been thrown from the current method from that line</a:t>
+            </a:r>
+          </a:p>
+          <a:p>
+            <a:pPr marL="342900" indent="-342900" algn="l">
+              <a:buFont typeface="Wingdings" panose="05000000000000000000" pitchFamily="2" charset="2"/>
+              <a:buChar char="§"/>
+            </a:pPr>
+            <a:r>
+              <a:rPr lang="en-US" sz="2000" dirty="0" smtClean="0">
+                <a:solidFill>
+                  <a:schemeClr val="tx1"/>
+                </a:solidFill>
+              </a:rPr>
+              <a:t>Prefer creating </a:t>
+            </a:r>
+            <a:r>
+              <a:rPr lang="en-US" sz="2000" b="1" dirty="0" smtClean="0">
+                <a:solidFill>
+                  <a:schemeClr val="tx1"/>
+                </a:solidFill>
+              </a:rPr>
+              <a:t>new custom exception</a:t>
+            </a:r>
+          </a:p>
+        </p:txBody>
+      </p:sp>
+    </p:spTree>
+    <p:extLst>
+      <p:ext uri="{BB962C8B-B14F-4D97-AF65-F5344CB8AC3E}">
+        <p14:creationId xmlns:p14="http://schemas.microsoft.com/office/powerpoint/2010/main" val="2421763994"/>
       </p:ext>
     </p:extLst>
   </p:cSld>

</xml_diff>

<commit_message>
Exception in static constructor and virtual call in constractor
</commit_message>
<xml_diff>
--- a/C# Tips and Tricks.pptx
+++ b/C# Tips and Tricks.pptx
@@ -7,10 +7,10 @@
     <p:sldMasterId id="2147483653" r:id="rId3"/>
   </p:sldMasterIdLst>
   <p:notesMasterIdLst>
-    <p:notesMasterId r:id="rId11"/>
+    <p:notesMasterId r:id="rId13"/>
   </p:notesMasterIdLst>
   <p:handoutMasterIdLst>
-    <p:handoutMasterId r:id="rId12"/>
+    <p:handoutMasterId r:id="rId14"/>
   </p:handoutMasterIdLst>
   <p:sldIdLst>
     <p:sldId id="256" r:id="rId4"/>
@@ -20,6 +20,8 @@
     <p:sldId id="260" r:id="rId8"/>
     <p:sldId id="261" r:id="rId9"/>
     <p:sldId id="262" r:id="rId10"/>
+    <p:sldId id="263" r:id="rId11"/>
+    <p:sldId id="264" r:id="rId12"/>
   </p:sldIdLst>
   <p:sldSz cx="9144000" cy="5143500" type="screen16x9"/>
   <p:notesSz cx="6858000" cy="9144000"/>
@@ -5322,6 +5324,13 @@
   <p:clrMapOvr>
     <a:masterClrMapping/>
   </p:clrMapOvr>
+  <p:timing>
+    <p:tnLst>
+      <p:par>
+        <p:cTn id="1" dur="indefinite" restart="never" nodeType="tmRoot"/>
+      </p:par>
+    </p:tnLst>
+  </p:timing>
 </p:sld>
 </file>
 
@@ -5501,6 +5510,13 @@
   <p:clrMapOvr>
     <a:masterClrMapping/>
   </p:clrMapOvr>
+  <p:timing>
+    <p:tnLst>
+      <p:par>
+        <p:cTn id="1" dur="indefinite" restart="never" nodeType="tmRoot"/>
+      </p:par>
+    </p:tnLst>
+  </p:timing>
 </p:sld>
 </file>
 
@@ -7017,6 +7033,580 @@
   <p:clrMapOvr>
     <a:masterClrMapping/>
   </p:clrMapOvr>
+</p:sld>
+</file>
+
+<file path=ppt/slides/slide8.xml><?xml version="1.0" encoding="utf-8"?>
+<p:sld xmlns:a="http://schemas.openxmlformats.org/drawingml/2006/main" xmlns:r="http://schemas.openxmlformats.org/officeDocument/2006/relationships" xmlns:p="http://schemas.openxmlformats.org/presentationml/2006/main">
+  <p:cSld>
+    <p:spTree>
+      <p:nvGrpSpPr>
+        <p:cNvPr id="1" name=""/>
+        <p:cNvGrpSpPr/>
+        <p:nvPr/>
+      </p:nvGrpSpPr>
+      <p:grpSpPr>
+        <a:xfrm>
+          <a:off x="0" y="0"/>
+          <a:ext cx="0" cy="0"/>
+          <a:chOff x="0" y="0"/>
+          <a:chExt cx="0" cy="0"/>
+        </a:xfrm>
+      </p:grpSpPr>
+      <p:sp>
+        <p:nvSpPr>
+          <p:cNvPr id="2" name="Текстов контейнер 1"/>
+          <p:cNvSpPr>
+            <a:spLocks noGrp="1"/>
+          </p:cNvSpPr>
+          <p:nvPr>
+            <p:ph type="body" sz="quarter" idx="10"/>
+          </p:nvPr>
+        </p:nvSpPr>
+        <p:spPr/>
+        <p:txBody>
+          <a:bodyPr/>
+          <a:lstStyle/>
+          <a:p>
+            <a:r>
+              <a:rPr lang="en-US" dirty="0" smtClean="0">
+                <a:solidFill>
+                  <a:schemeClr val="tx1"/>
+                </a:solidFill>
+              </a:rPr>
+              <a:t>Exceptions &amp; Static constructors</a:t>
+            </a:r>
+            <a:endParaRPr lang="en-US" dirty="0">
+              <a:solidFill>
+                <a:schemeClr val="tx1"/>
+              </a:solidFill>
+            </a:endParaRPr>
+          </a:p>
+        </p:txBody>
+      </p:sp>
+      <p:sp>
+        <p:nvSpPr>
+          <p:cNvPr id="3" name="Текстов контейнер 2"/>
+          <p:cNvSpPr>
+            <a:spLocks noGrp="1"/>
+          </p:cNvSpPr>
+          <p:nvPr>
+            <p:ph type="body" sz="quarter" idx="11"/>
+          </p:nvPr>
+        </p:nvSpPr>
+        <p:spPr>
+          <a:xfrm>
+            <a:off x="0" y="843558"/>
+            <a:ext cx="9144000" cy="3888432"/>
+          </a:xfrm>
+        </p:spPr>
+        <p:txBody>
+          <a:bodyPr anchor="t"/>
+          <a:lstStyle/>
+          <a:p>
+            <a:pPr marL="285750" indent="-285750" algn="l">
+              <a:buFont typeface="Wingdings" panose="05000000000000000000" pitchFamily="2" charset="2"/>
+              <a:buChar char="§"/>
+            </a:pPr>
+            <a:r>
+              <a:rPr lang="en-US" sz="2000" dirty="0" smtClean="0">
+                <a:solidFill>
+                  <a:schemeClr val="tx1"/>
+                </a:solidFill>
+              </a:rPr>
+              <a:t>A static constructor is called automatically to initialize the class before:</a:t>
+            </a:r>
+          </a:p>
+          <a:p>
+            <a:pPr marL="1028700" lvl="1">
+              <a:buFont typeface="Wingdings" panose="05000000000000000000" pitchFamily="2" charset="2"/>
+              <a:buChar char="§"/>
+            </a:pPr>
+            <a:r>
+              <a:rPr lang="en-US" sz="2000" dirty="0" smtClean="0"/>
+              <a:t>The first </a:t>
+            </a:r>
+            <a:r>
+              <a:rPr lang="en-US" sz="2000" b="1" dirty="0" smtClean="0"/>
+              <a:t>instance</a:t>
+            </a:r>
+            <a:r>
+              <a:rPr lang="en-US" sz="2000" dirty="0" smtClean="0"/>
+              <a:t> is created</a:t>
+            </a:r>
+          </a:p>
+          <a:p>
+            <a:pPr marL="1028700" lvl="1">
+              <a:buFont typeface="Wingdings" panose="05000000000000000000" pitchFamily="2" charset="2"/>
+              <a:buChar char="§"/>
+            </a:pPr>
+            <a:r>
+              <a:rPr lang="en-US" sz="2000" dirty="0" smtClean="0"/>
+              <a:t>Or any </a:t>
+            </a:r>
+            <a:r>
+              <a:rPr lang="en-US" sz="2000" b="1" dirty="0" smtClean="0"/>
+              <a:t>static members </a:t>
+            </a:r>
+            <a:r>
+              <a:rPr lang="en-US" sz="2000" dirty="0" smtClean="0"/>
+              <a:t>are </a:t>
+            </a:r>
+            <a:r>
+              <a:rPr lang="en-US" sz="2000" b="1" dirty="0" smtClean="0"/>
+              <a:t>referenced</a:t>
+            </a:r>
+          </a:p>
+          <a:p>
+            <a:pPr marL="285750" indent="-285750" algn="l">
+              <a:buFont typeface="Wingdings" panose="05000000000000000000" pitchFamily="2" charset="2"/>
+              <a:buChar char="§"/>
+            </a:pPr>
+            <a:r>
+              <a:rPr lang="en-US" sz="2000" dirty="0" smtClean="0">
+                <a:solidFill>
+                  <a:schemeClr val="tx1"/>
+                </a:solidFill>
+              </a:rPr>
+              <a:t>Once a type initializer has failed, it </a:t>
+            </a:r>
+            <a:r>
+              <a:rPr lang="en-US" sz="2000" b="1" dirty="0" smtClean="0">
+                <a:solidFill>
+                  <a:schemeClr val="tx1"/>
+                </a:solidFill>
+              </a:rPr>
+              <a:t>never retried </a:t>
+            </a:r>
+            <a:r>
+              <a:rPr lang="en-US" sz="2000" dirty="0" smtClean="0">
+                <a:solidFill>
+                  <a:schemeClr val="tx1"/>
+                </a:solidFill>
+              </a:rPr>
+              <a:t>(for the lifetime of the         </a:t>
+            </a:r>
+            <a:r>
+              <a:rPr lang="en-US" sz="2000" dirty="0" err="1" smtClean="0">
+                <a:solidFill>
+                  <a:schemeClr val="tx1"/>
+                </a:solidFill>
+              </a:rPr>
+              <a:t>AppDomain</a:t>
+            </a:r>
+            <a:r>
+              <a:rPr lang="en-US" sz="2000" dirty="0" smtClean="0">
+                <a:solidFill>
+                  <a:schemeClr val="tx1"/>
+                </a:solidFill>
+              </a:rPr>
+              <a:t>)</a:t>
+            </a:r>
+          </a:p>
+          <a:p>
+            <a:pPr marL="1028700" lvl="1">
+              <a:buFont typeface="Wingdings" panose="05000000000000000000" pitchFamily="2" charset="2"/>
+              <a:buChar char="§"/>
+            </a:pPr>
+            <a:r>
+              <a:rPr lang="en-US" sz="2000" dirty="0" smtClean="0"/>
+              <a:t>Type will remain </a:t>
+            </a:r>
+            <a:r>
+              <a:rPr lang="en-US" sz="2000" b="1" dirty="0" smtClean="0"/>
+              <a:t>uninitialized</a:t>
+            </a:r>
+          </a:p>
+          <a:p>
+            <a:pPr marL="1028700" lvl="1">
+              <a:buFont typeface="Wingdings" panose="05000000000000000000" pitchFamily="2" charset="2"/>
+              <a:buChar char="§"/>
+            </a:pPr>
+            <a:r>
+              <a:rPr lang="en-US" sz="2000" dirty="0" smtClean="0"/>
+              <a:t>Creating instances will also </a:t>
+            </a:r>
+            <a:r>
+              <a:rPr lang="en-US" sz="2000" b="1" dirty="0" smtClean="0"/>
+              <a:t>fail</a:t>
+            </a:r>
+          </a:p>
+          <a:p>
+            <a:pPr marL="285750" indent="-285750" algn="l">
+              <a:buFont typeface="Wingdings" panose="05000000000000000000" pitchFamily="2" charset="2"/>
+              <a:buChar char="§"/>
+            </a:pPr>
+            <a:r>
+              <a:rPr lang="en-US" sz="2000" dirty="0" smtClean="0">
+                <a:solidFill>
+                  <a:schemeClr val="tx1"/>
+                </a:solidFill>
+              </a:rPr>
+              <a:t>You should have a </a:t>
+            </a:r>
+            <a:r>
+              <a:rPr lang="en-US" sz="2000" b="1" dirty="0" smtClean="0">
+                <a:solidFill>
+                  <a:schemeClr val="tx1"/>
+                </a:solidFill>
+              </a:rPr>
+              <a:t>very good reason </a:t>
+            </a:r>
+            <a:r>
+              <a:rPr lang="en-US" sz="2000" dirty="0" smtClean="0">
+                <a:solidFill>
+                  <a:schemeClr val="tx1"/>
+                </a:solidFill>
+              </a:rPr>
+              <a:t>for throwing an exception from a static constructor</a:t>
+            </a:r>
+          </a:p>
+          <a:p>
+            <a:pPr lvl="1" indent="0">
+              <a:buNone/>
+            </a:pPr>
+            <a:r>
+              <a:rPr lang="en-US" sz="1600" dirty="0" smtClean="0"/>
+              <a:t>										</a:t>
+            </a:r>
+          </a:p>
+          <a:p>
+            <a:pPr marL="285750">
+              <a:buFont typeface="Wingdings" panose="05000000000000000000" pitchFamily="2" charset="2"/>
+              <a:buChar char="§"/>
+            </a:pPr>
+            <a:endParaRPr lang="en-US" sz="200" dirty="0"/>
+          </a:p>
+        </p:txBody>
+      </p:sp>
+    </p:spTree>
+    <p:extLst>
+      <p:ext uri="{BB962C8B-B14F-4D97-AF65-F5344CB8AC3E}">
+        <p14:creationId xmlns:p14="http://schemas.microsoft.com/office/powerpoint/2010/main" val="3184376360"/>
+      </p:ext>
+    </p:extLst>
+  </p:cSld>
+  <p:clrMapOvr>
+    <a:masterClrMapping/>
+  </p:clrMapOvr>
+  <p:timing>
+    <p:tnLst>
+      <p:par>
+        <p:cTn id="1" dur="indefinite" restart="never" nodeType="tmRoot"/>
+      </p:par>
+    </p:tnLst>
+  </p:timing>
+</p:sld>
+</file>
+
+<file path=ppt/slides/slide9.xml><?xml version="1.0" encoding="utf-8"?>
+<p:sld xmlns:a="http://schemas.openxmlformats.org/drawingml/2006/main" xmlns:r="http://schemas.openxmlformats.org/officeDocument/2006/relationships" xmlns:p="http://schemas.openxmlformats.org/presentationml/2006/main">
+  <p:cSld>
+    <p:spTree>
+      <p:nvGrpSpPr>
+        <p:cNvPr id="1" name=""/>
+        <p:cNvGrpSpPr/>
+        <p:nvPr/>
+      </p:nvGrpSpPr>
+      <p:grpSpPr>
+        <a:xfrm>
+          <a:off x="0" y="0"/>
+          <a:ext cx="0" cy="0"/>
+          <a:chOff x="0" y="0"/>
+          <a:chExt cx="0" cy="0"/>
+        </a:xfrm>
+      </p:grpSpPr>
+      <p:sp>
+        <p:nvSpPr>
+          <p:cNvPr id="2" name="Текстов контейнер 1"/>
+          <p:cNvSpPr>
+            <a:spLocks noGrp="1"/>
+          </p:cNvSpPr>
+          <p:nvPr>
+            <p:ph type="body" sz="quarter" idx="10"/>
+          </p:nvPr>
+        </p:nvSpPr>
+        <p:spPr/>
+        <p:txBody>
+          <a:bodyPr/>
+          <a:lstStyle/>
+          <a:p>
+            <a:r>
+              <a:rPr lang="en-US" b="1" i="1" dirty="0" smtClean="0">
+                <a:solidFill>
+                  <a:schemeClr val="tx1"/>
+                </a:solidFill>
+              </a:rPr>
+              <a:t>Virtual call in constructor</a:t>
+            </a:r>
+            <a:endParaRPr lang="en-US" b="1" i="1" dirty="0">
+              <a:solidFill>
+                <a:schemeClr val="tx1"/>
+              </a:solidFill>
+            </a:endParaRPr>
+          </a:p>
+        </p:txBody>
+      </p:sp>
+      <p:sp>
+        <p:nvSpPr>
+          <p:cNvPr id="3" name="Текстов контейнер 2"/>
+          <p:cNvSpPr>
+            <a:spLocks noGrp="1"/>
+          </p:cNvSpPr>
+          <p:nvPr>
+            <p:ph type="body" sz="quarter" idx="11"/>
+          </p:nvPr>
+        </p:nvSpPr>
+        <p:spPr>
+          <a:xfrm>
+            <a:off x="179512" y="873137"/>
+            <a:ext cx="8784976" cy="4244788"/>
+          </a:xfrm>
+        </p:spPr>
+        <p:txBody>
+          <a:bodyPr wrap="square" anchor="t">
+            <a:noAutofit/>
+          </a:bodyPr>
+          <a:lstStyle/>
+          <a:p>
+            <a:pPr marL="285750" indent="-285750" algn="l">
+              <a:buFont typeface="Wingdings" panose="05000000000000000000" pitchFamily="2" charset="2"/>
+              <a:buChar char="§"/>
+            </a:pPr>
+            <a:r>
+              <a:rPr lang="en-US" sz="2200" dirty="0" smtClean="0">
+                <a:solidFill>
+                  <a:schemeClr val="tx1"/>
+                </a:solidFill>
+              </a:rPr>
+              <a:t>Calling </a:t>
+            </a:r>
+            <a:r>
+              <a:rPr lang="en-US" sz="2200" b="1" dirty="0" smtClean="0">
+                <a:solidFill>
+                  <a:schemeClr val="tx1"/>
+                </a:solidFill>
+              </a:rPr>
+              <a:t>virtual methods </a:t>
+            </a:r>
+            <a:r>
+              <a:rPr lang="en-US" sz="2200" dirty="0" smtClean="0">
+                <a:solidFill>
+                  <a:schemeClr val="tx1"/>
+                </a:solidFill>
+              </a:rPr>
+              <a:t>in a constrictor is a </a:t>
+            </a:r>
+            <a:r>
+              <a:rPr lang="en-US" sz="2200" b="1" dirty="0" smtClean="0">
+                <a:solidFill>
+                  <a:schemeClr val="tx1"/>
+                </a:solidFill>
+              </a:rPr>
+              <a:t>bad</a:t>
+            </a:r>
+            <a:r>
+              <a:rPr lang="en-US" sz="2200" dirty="0" smtClean="0">
+                <a:solidFill>
+                  <a:schemeClr val="tx1"/>
+                </a:solidFill>
+              </a:rPr>
+              <a:t> idea</a:t>
+            </a:r>
+          </a:p>
+          <a:p>
+            <a:pPr marL="285750" indent="-285750" algn="l">
+              <a:buFont typeface="Wingdings" panose="05000000000000000000" pitchFamily="2" charset="2"/>
+              <a:buChar char="§"/>
+            </a:pPr>
+            <a:r>
+              <a:rPr lang="en-US" sz="2200" dirty="0" smtClean="0">
+                <a:solidFill>
+                  <a:schemeClr val="tx1"/>
+                </a:solidFill>
+              </a:rPr>
+              <a:t>When initializing a type in C# constructors are invoked </a:t>
+            </a:r>
+            <a:r>
+              <a:rPr lang="en-US" sz="2200" b="1" dirty="0" smtClean="0">
+                <a:solidFill>
+                  <a:schemeClr val="tx1"/>
+                </a:solidFill>
+              </a:rPr>
+              <a:t>top-down</a:t>
+            </a:r>
+          </a:p>
+          <a:p>
+            <a:pPr marL="1028700" lvl="1">
+              <a:buFont typeface="Wingdings" panose="05000000000000000000" pitchFamily="2" charset="2"/>
+              <a:buChar char="§"/>
+            </a:pPr>
+            <a:r>
+              <a:rPr lang="en-US" sz="2200" dirty="0" smtClean="0"/>
+              <a:t>First the </a:t>
+            </a:r>
+            <a:r>
+              <a:rPr lang="en-US" sz="2200" b="1" dirty="0" smtClean="0"/>
+              <a:t>top base </a:t>
+            </a:r>
+            <a:r>
+              <a:rPr lang="en-US" sz="2200" dirty="0" smtClean="0"/>
+              <a:t>constructor (object())</a:t>
+            </a:r>
+          </a:p>
+          <a:p>
+            <a:pPr marL="1028700" lvl="1">
+              <a:buFont typeface="Wingdings" panose="05000000000000000000" pitchFamily="2" charset="2"/>
+              <a:buChar char="§"/>
+            </a:pPr>
+            <a:r>
+              <a:rPr lang="en-US" sz="2200" dirty="0" smtClean="0"/>
+              <a:t>Then down to </a:t>
+            </a:r>
+            <a:r>
+              <a:rPr lang="en-US" sz="2200" b="1" dirty="0" smtClean="0"/>
+              <a:t>the derived constructors </a:t>
+            </a:r>
+            <a:r>
+              <a:rPr lang="en-US" sz="2200" dirty="0" smtClean="0"/>
+              <a:t>through inheritance</a:t>
+            </a:r>
+          </a:p>
+          <a:p>
+            <a:pPr marL="285750" indent="-285750" algn="l">
+              <a:buFont typeface="Wingdings" panose="05000000000000000000" pitchFamily="2" charset="2"/>
+              <a:buChar char="§"/>
+            </a:pPr>
+            <a:r>
+              <a:rPr lang="en-US" sz="2200" dirty="0" smtClean="0">
+                <a:solidFill>
+                  <a:schemeClr val="tx1"/>
+                </a:solidFill>
+              </a:rPr>
+              <a:t>But virtual methods are invoked </a:t>
+            </a:r>
+            <a:r>
+              <a:rPr lang="en-US" sz="2200" b="1" dirty="0" smtClean="0">
+                <a:solidFill>
+                  <a:schemeClr val="tx1"/>
+                </a:solidFill>
+              </a:rPr>
+              <a:t>bottom-up</a:t>
+            </a:r>
+            <a:r>
+              <a:rPr lang="en-US" sz="2200" dirty="0" smtClean="0">
+                <a:solidFill>
+                  <a:schemeClr val="tx1"/>
+                </a:solidFill>
+              </a:rPr>
+              <a:t>	</a:t>
+            </a:r>
+          </a:p>
+          <a:p>
+            <a:pPr marL="1028700" lvl="1">
+              <a:buFont typeface="Wingdings" panose="05000000000000000000" pitchFamily="2" charset="2"/>
+              <a:buChar char="§"/>
+            </a:pPr>
+            <a:r>
+              <a:rPr lang="en-US" sz="2200" dirty="0" smtClean="0"/>
+              <a:t>First the </a:t>
+            </a:r>
+            <a:r>
+              <a:rPr lang="en-US" sz="2200" b="1" dirty="0" smtClean="0"/>
+              <a:t>most</a:t>
+            </a:r>
+            <a:r>
+              <a:rPr lang="en-US" sz="2200" dirty="0" smtClean="0"/>
+              <a:t> </a:t>
+            </a:r>
+            <a:r>
+              <a:rPr lang="en-US" sz="2200" b="1" dirty="0" smtClean="0"/>
+              <a:t>derived overridden method</a:t>
+            </a:r>
+          </a:p>
+          <a:p>
+            <a:pPr marL="1028700" lvl="1">
+              <a:buFont typeface="Wingdings" panose="05000000000000000000" pitchFamily="2" charset="2"/>
+              <a:buChar char="§"/>
+            </a:pPr>
+            <a:r>
+              <a:rPr lang="en-US" sz="2200" dirty="0" smtClean="0"/>
+              <a:t>Then up to all </a:t>
+            </a:r>
+            <a:r>
+              <a:rPr lang="en-US" sz="2200" b="1" dirty="0" smtClean="0"/>
+              <a:t>base virtual </a:t>
+            </a:r>
+            <a:r>
+              <a:rPr lang="en-US" sz="2200" dirty="0" smtClean="0"/>
+              <a:t>methods</a:t>
+            </a:r>
+          </a:p>
+          <a:p>
+            <a:pPr marL="285750" indent="-285750" algn="l">
+              <a:buFont typeface="Wingdings" panose="05000000000000000000" pitchFamily="2" charset="2"/>
+              <a:buChar char="§"/>
+            </a:pPr>
+            <a:r>
+              <a:rPr lang="en-US" sz="2200" dirty="0" smtClean="0">
+                <a:solidFill>
+                  <a:schemeClr val="tx1"/>
+                </a:solidFill>
+              </a:rPr>
+              <a:t>For this reason, if you call virtual methods in constructor, you may </a:t>
+            </a:r>
+            <a:r>
+              <a:rPr lang="en-US" sz="2200" b="1" dirty="0" smtClean="0">
+                <a:solidFill>
+                  <a:schemeClr val="tx1"/>
+                </a:solidFill>
+              </a:rPr>
+              <a:t>have unexpected </a:t>
+            </a:r>
+            <a:r>
+              <a:rPr lang="en-US" sz="2200" b="1" dirty="0" err="1" smtClean="0">
+                <a:solidFill>
+                  <a:schemeClr val="tx1"/>
+                </a:solidFill>
+              </a:rPr>
+              <a:t>behaviour</a:t>
+            </a:r>
+            <a:r>
+              <a:rPr lang="en-US" sz="2200" dirty="0" smtClean="0">
+                <a:solidFill>
+                  <a:schemeClr val="tx1"/>
+                </a:solidFill>
+              </a:rPr>
+              <a:t> from your classes</a:t>
+            </a:r>
+          </a:p>
+          <a:p>
+            <a:pPr algn="l"/>
+            <a:endParaRPr lang="en-US" sz="2200" dirty="0">
+              <a:solidFill>
+                <a:schemeClr val="tx1"/>
+              </a:solidFill>
+            </a:endParaRPr>
+          </a:p>
+        </p:txBody>
+      </p:sp>
+    </p:spTree>
+    <p:extLst>
+      <p:ext uri="{BB962C8B-B14F-4D97-AF65-F5344CB8AC3E}">
+        <p14:creationId xmlns:p14="http://schemas.microsoft.com/office/powerpoint/2010/main" val="773331329"/>
+      </p:ext>
+    </p:extLst>
+  </p:cSld>
+  <p:clrMapOvr>
+    <a:masterClrMapping/>
+  </p:clrMapOvr>
+  <p:timing>
+    <p:tnLst>
+      <p:par>
+        <p:cTn id="1" dur="indefinite" restart="never" nodeType="tmRoot"/>
+      </p:par>
+    </p:tnLst>
+  </p:timing>
 </p:sld>
 </file>
 

</xml_diff>

<commit_message>
Change hash code runtime
</commit_message>
<xml_diff>
--- a/C# Tips and Tricks.pptx
+++ b/C# Tips and Tricks.pptx
@@ -7,10 +7,10 @@
     <p:sldMasterId id="2147483653" r:id="rId3"/>
   </p:sldMasterIdLst>
   <p:notesMasterIdLst>
-    <p:notesMasterId r:id="rId13"/>
+    <p:notesMasterId r:id="rId14"/>
   </p:notesMasterIdLst>
   <p:handoutMasterIdLst>
-    <p:handoutMasterId r:id="rId14"/>
+    <p:handoutMasterId r:id="rId15"/>
   </p:handoutMasterIdLst>
   <p:sldIdLst>
     <p:sldId id="256" r:id="rId4"/>
@@ -22,6 +22,7 @@
     <p:sldId id="262" r:id="rId10"/>
     <p:sldId id="263" r:id="rId11"/>
     <p:sldId id="264" r:id="rId12"/>
+    <p:sldId id="265" r:id="rId13"/>
   </p:sldIdLst>
   <p:sldSz cx="9144000" cy="5143500" type="screen16x9"/>
   <p:notesSz cx="6858000" cy="9144000"/>
@@ -5334,6 +5335,198 @@
 </p:sld>
 </file>
 
+<file path=ppt/slides/slide10.xml><?xml version="1.0" encoding="utf-8"?>
+<p:sld xmlns:a="http://schemas.openxmlformats.org/drawingml/2006/main" xmlns:r="http://schemas.openxmlformats.org/officeDocument/2006/relationships" xmlns:p="http://schemas.openxmlformats.org/presentationml/2006/main">
+  <p:cSld>
+    <p:spTree>
+      <p:nvGrpSpPr>
+        <p:cNvPr id="1" name=""/>
+        <p:cNvGrpSpPr/>
+        <p:nvPr/>
+      </p:nvGrpSpPr>
+      <p:grpSpPr>
+        <a:xfrm>
+          <a:off x="0" y="0"/>
+          <a:ext cx="0" cy="0"/>
+          <a:chOff x="0" y="0"/>
+          <a:chExt cx="0" cy="0"/>
+        </a:xfrm>
+      </p:grpSpPr>
+      <p:sp>
+        <p:nvSpPr>
+          <p:cNvPr id="2" name="Текстов контейнер 1"/>
+          <p:cNvSpPr>
+            <a:spLocks noGrp="1"/>
+          </p:cNvSpPr>
+          <p:nvPr>
+            <p:ph type="body" sz="quarter" idx="10"/>
+          </p:nvPr>
+        </p:nvSpPr>
+        <p:spPr/>
+        <p:txBody>
+          <a:bodyPr/>
+          <a:lstStyle/>
+          <a:p>
+            <a:r>
+              <a:rPr lang="en-US" dirty="0" smtClean="0"/>
+              <a:t>Changing Hash Code Run-time</a:t>
+            </a:r>
+            <a:endParaRPr lang="en-US" dirty="0"/>
+          </a:p>
+        </p:txBody>
+      </p:sp>
+      <p:sp>
+        <p:nvSpPr>
+          <p:cNvPr id="3" name="Текстов контейнер 2"/>
+          <p:cNvSpPr>
+            <a:spLocks noGrp="1"/>
+          </p:cNvSpPr>
+          <p:nvPr>
+            <p:ph type="body" sz="quarter" idx="11"/>
+          </p:nvPr>
+        </p:nvSpPr>
+        <p:spPr>
+          <a:xfrm>
+            <a:off x="323528" y="843558"/>
+            <a:ext cx="8712968" cy="4032448"/>
+          </a:xfrm>
+        </p:spPr>
+        <p:txBody>
+          <a:bodyPr anchor="t"/>
+          <a:lstStyle/>
+          <a:p>
+            <a:pPr marL="342900" indent="-342900" algn="l">
+              <a:buFont typeface="Wingdings" panose="05000000000000000000" pitchFamily="2" charset="2"/>
+              <a:buChar char="§"/>
+            </a:pPr>
+            <a:r>
+              <a:rPr lang="en-US" sz="2200" dirty="0" smtClean="0"/>
+              <a:t>Hash code is used in various hash-based collections                      (</a:t>
+            </a:r>
+            <a:r>
+              <a:rPr lang="en-US" sz="2200" b="1" dirty="0" err="1" smtClean="0"/>
+              <a:t>HashSet</a:t>
+            </a:r>
+            <a:r>
+              <a:rPr lang="en-US" sz="2200" b="1" dirty="0" smtClean="0"/>
+              <a:t>&lt;T&gt;, Dictionary&lt;</a:t>
+            </a:r>
+            <a:r>
+              <a:rPr lang="en-US" sz="2200" b="1" dirty="0" err="1" smtClean="0"/>
+              <a:t>TKey</a:t>
+            </a:r>
+            <a:r>
+              <a:rPr lang="en-US" sz="2200" b="1" dirty="0" smtClean="0"/>
+              <a:t>, TValue&gt;</a:t>
+            </a:r>
+            <a:r>
+              <a:rPr lang="en-US" sz="2200" dirty="0" smtClean="0"/>
+              <a:t>)</a:t>
+            </a:r>
+          </a:p>
+          <a:p>
+            <a:pPr marL="342900" indent="-342900" algn="l">
+              <a:buFont typeface="Wingdings" panose="05000000000000000000" pitchFamily="2" charset="2"/>
+              <a:buChar char="§"/>
+            </a:pPr>
+            <a:r>
+              <a:rPr lang="en-US" sz="2200" dirty="0" smtClean="0"/>
+              <a:t>In C# an overridden method named </a:t>
+            </a:r>
+            <a:r>
+              <a:rPr lang="en-US" sz="2200" b="1" dirty="0" err="1" smtClean="0"/>
+              <a:t>GetHashCode</a:t>
+            </a:r>
+            <a:r>
+              <a:rPr lang="en-US" sz="2200" dirty="0"/>
+              <a:t> </a:t>
+            </a:r>
+            <a:r>
+              <a:rPr lang="en-US" sz="2200" dirty="0" smtClean="0"/>
+              <a:t>provides the   hash code generation for particular types</a:t>
+            </a:r>
+          </a:p>
+          <a:p>
+            <a:pPr marL="342900" indent="-342900" algn="l">
+              <a:buFont typeface="Wingdings" panose="05000000000000000000" pitchFamily="2" charset="2"/>
+              <a:buChar char="§"/>
+            </a:pPr>
+            <a:r>
+              <a:rPr lang="en-US" sz="2200" dirty="0" smtClean="0"/>
+              <a:t>If you generate a </a:t>
+            </a:r>
+            <a:r>
+              <a:rPr lang="en-US" sz="2200" b="1" dirty="0" smtClean="0"/>
+              <a:t>custom hash code </a:t>
+            </a:r>
+            <a:r>
+              <a:rPr lang="en-US" sz="2200" dirty="0" smtClean="0"/>
+              <a:t>for a type, try to use             </a:t>
+            </a:r>
+            <a:r>
+              <a:rPr lang="en-US" sz="2200" b="1" dirty="0" smtClean="0"/>
+              <a:t>read-only properties </a:t>
+            </a:r>
+            <a:r>
+              <a:rPr lang="en-US" sz="2200" dirty="0" smtClean="0"/>
+              <a:t>for it</a:t>
+            </a:r>
+          </a:p>
+          <a:p>
+            <a:pPr marL="342900" indent="-342900" algn="l">
+              <a:buFont typeface="Wingdings" panose="05000000000000000000" pitchFamily="2" charset="2"/>
+              <a:buChar char="§"/>
+            </a:pPr>
+            <a:r>
+              <a:rPr lang="en-US" sz="2200" b="1" dirty="0" smtClean="0"/>
+              <a:t>Non-read-only properties </a:t>
+            </a:r>
+            <a:r>
+              <a:rPr lang="en-US" sz="2200" dirty="0" smtClean="0"/>
+              <a:t>may </a:t>
+            </a:r>
+            <a:r>
+              <a:rPr lang="en-US" sz="2200" b="1" dirty="0" smtClean="0"/>
+              <a:t>change</a:t>
+            </a:r>
+            <a:r>
+              <a:rPr lang="en-US" sz="2200" dirty="0" smtClean="0"/>
+              <a:t> the hash-code runtime    and collections will not be notified for the change</a:t>
+            </a:r>
+          </a:p>
+          <a:p>
+            <a:pPr marL="342900" indent="-342900" algn="l">
+              <a:buFont typeface="Wingdings" panose="05000000000000000000" pitchFamily="2" charset="2"/>
+              <a:buChar char="§"/>
+            </a:pPr>
+            <a:r>
+              <a:rPr lang="en-US" sz="2200" dirty="0" smtClean="0"/>
+              <a:t>Thus the internal structure and algorithms of the collection will not be able to retrieve and use the </a:t>
+            </a:r>
+            <a:r>
+              <a:rPr lang="en-US" sz="2200" b="1" dirty="0" smtClean="0"/>
+              <a:t>modified instance</a:t>
+            </a:r>
+          </a:p>
+          <a:p>
+            <a:pPr algn="l"/>
+            <a:endParaRPr lang="en-US" dirty="0"/>
+          </a:p>
+        </p:txBody>
+      </p:sp>
+    </p:spTree>
+    <p:extLst>
+      <p:ext uri="{BB962C8B-B14F-4D97-AF65-F5344CB8AC3E}">
+        <p14:creationId xmlns:p14="http://schemas.microsoft.com/office/powerpoint/2010/main" val="2308483657"/>
+      </p:ext>
+    </p:extLst>
+  </p:cSld>
+  <p:clrMapOvr>
+    <a:masterClrMapping/>
+  </p:clrMapOvr>
+</p:sld>
+</file>
+
 <file path=ppt/slides/slide2.xml><?xml version="1.0" encoding="utf-8"?>
 <p:sld xmlns:a="http://schemas.openxmlformats.org/drawingml/2006/main" xmlns:r="http://schemas.openxmlformats.org/officeDocument/2006/relationships" xmlns:p="http://schemas.openxmlformats.org/presentationml/2006/main">
   <p:cSld>
@@ -6503,188 +6696,187 @@
           <a:lstStyle/>
           <a:p>
             <a:r>
-              <a:rPr lang="en-US" sz="1600" dirty="0" err="1"/>
+              <a:rPr lang="en-US" sz="1600" b="1" dirty="0" err="1"/>
               <a:t>var</a:t>
             </a:r>
             <a:r>
-              <a:rPr lang="en-US" sz="1600" dirty="0"/>
+              <a:rPr lang="en-US" sz="1600" b="1" dirty="0"/>
               <a:t> string1 = "some value</a:t>
             </a:r>
             <a:r>
-              <a:rPr lang="en-US" sz="1600" dirty="0" smtClean="0"/>
+              <a:rPr lang="en-US" sz="1600" b="1" dirty="0" smtClean="0"/>
               <a:t>";</a:t>
             </a:r>
           </a:p>
           <a:p>
             <a:r>
-              <a:rPr lang="en-US" sz="1600" dirty="0" err="1" smtClean="0"/>
+              <a:rPr lang="en-US" sz="1600" b="1" dirty="0" err="1" smtClean="0"/>
               <a:t>var</a:t>
             </a:r>
             <a:r>
-              <a:rPr lang="en-US" sz="1600" dirty="0" smtClean="0"/>
+              <a:rPr lang="en-US" sz="1600" b="1" dirty="0" smtClean="0"/>
               <a:t> </a:t>
             </a:r>
             <a:r>
-              <a:rPr lang="en-US" sz="1600" dirty="0"/>
+              <a:rPr lang="en-US" sz="1600" b="1" dirty="0"/>
               <a:t>string2 = "some value";</a:t>
             </a:r>
           </a:p>
           <a:p>
             <a:r>
-              <a:rPr lang="en-US" sz="1600" dirty="0" err="1" smtClean="0"/>
+              <a:rPr lang="en-US" sz="1600" b="1" dirty="0" err="1" smtClean="0"/>
               <a:t>Console.WriteLine</a:t>
             </a:r>
             <a:r>
-              <a:rPr lang="en-US" sz="1600" dirty="0" smtClean="0"/>
+              <a:rPr lang="en-US" sz="1600" b="1" dirty="0" smtClean="0"/>
               <a:t>(</a:t>
             </a:r>
             <a:r>
-              <a:rPr lang="en-US" sz="1600" dirty="0" err="1" smtClean="0"/>
+              <a:rPr lang="en-US" sz="1600" b="1" dirty="0" err="1" smtClean="0"/>
               <a:t>ReferenceEquals</a:t>
             </a:r>
             <a:r>
-              <a:rPr lang="en-US" sz="1600" dirty="0" smtClean="0"/>
+              <a:rPr lang="en-US" sz="1600" b="1" dirty="0" smtClean="0"/>
               <a:t>(string1</a:t>
             </a:r>
             <a:r>
-              <a:rPr lang="en-US" sz="1600" dirty="0"/>
+              <a:rPr lang="en-US" sz="1600" b="1" dirty="0"/>
               <a:t>, string2)); // </a:t>
             </a:r>
             <a:r>
-              <a:rPr lang="en-US" sz="1600" dirty="0" smtClean="0"/>
+              <a:rPr lang="en-US" sz="1600" b="1" dirty="0" smtClean="0"/>
               <a:t>true</a:t>
             </a:r>
           </a:p>
           <a:p>
             <a:r>
-              <a:rPr lang="en-US" sz="1600" dirty="0" err="1" smtClean="0"/>
+              <a:rPr lang="en-US" sz="1600" b="1" dirty="0" err="1" smtClean="0"/>
               <a:t>Console.Write</a:t>
             </a:r>
             <a:r>
-              <a:rPr lang="en-US" sz="1600" dirty="0"/>
+              <a:rPr lang="en-US" sz="1600" b="1" dirty="0"/>
               <a:t>("Please enter \"some value\": ");</a:t>
             </a:r>
           </a:p>
           <a:p>
             <a:r>
-              <a:rPr lang="en-US" sz="1600" dirty="0" err="1" smtClean="0"/>
+              <a:rPr lang="en-US" sz="1600" b="1" dirty="0" err="1" smtClean="0"/>
               <a:t>var</a:t>
             </a:r>
             <a:r>
-              <a:rPr lang="en-US" sz="1600" dirty="0" smtClean="0"/>
+              <a:rPr lang="en-US" sz="1600" b="1" dirty="0" smtClean="0"/>
               <a:t> </a:t>
             </a:r>
             <a:r>
-              <a:rPr lang="en-US" sz="1600" dirty="0" err="1"/>
+              <a:rPr lang="en-US" sz="1600" b="1" dirty="0" err="1"/>
               <a:t>stringFromConsole</a:t>
             </a:r>
             <a:r>
-              <a:rPr lang="en-US" sz="1600" dirty="0"/>
+              <a:rPr lang="en-US" sz="1600" b="1" dirty="0"/>
               <a:t> = </a:t>
             </a:r>
             <a:r>
-              <a:rPr lang="en-US" sz="1600" dirty="0" err="1"/>
+              <a:rPr lang="en-US" sz="1600" b="1" dirty="0" err="1"/>
               <a:t>Console.ReadLine</a:t>
             </a:r>
             <a:r>
-              <a:rPr lang="en-US" sz="1600" dirty="0"/>
+              <a:rPr lang="en-US" sz="1600" b="1" dirty="0"/>
               <a:t>();</a:t>
             </a:r>
           </a:p>
           <a:p>
             <a:r>
-              <a:rPr lang="en-US" sz="1600" dirty="0" err="1" smtClean="0"/>
+              <a:rPr lang="en-US" sz="1600" b="1" dirty="0" err="1" smtClean="0"/>
               <a:t>Console.WriteLine</a:t>
             </a:r>
             <a:r>
-              <a:rPr lang="en-US" sz="1600" dirty="0" smtClean="0"/>
+              <a:rPr lang="en-US" sz="1600" b="1" dirty="0" smtClean="0"/>
               <a:t>(</a:t>
             </a:r>
             <a:r>
-              <a:rPr lang="en-US" sz="1600" dirty="0" err="1" smtClean="0"/>
+              <a:rPr lang="en-US" sz="1600" b="1" dirty="0" err="1" smtClean="0"/>
               <a:t>ReferenceEquals</a:t>
             </a:r>
             <a:r>
-              <a:rPr lang="en-US" sz="1600" dirty="0" smtClean="0"/>
+              <a:rPr lang="en-US" sz="1600" b="1" dirty="0" smtClean="0"/>
               <a:t>(string1</a:t>
             </a:r>
             <a:r>
-              <a:rPr lang="en-US" sz="1600" dirty="0"/>
+              <a:rPr lang="en-US" sz="1600" b="1" dirty="0"/>
               <a:t>, </a:t>
             </a:r>
             <a:r>
-              <a:rPr lang="en-US" sz="1600" dirty="0" err="1"/>
+              <a:rPr lang="en-US" sz="1600" b="1" dirty="0" err="1"/>
               <a:t>stringFromConsole</a:t>
             </a:r>
             <a:r>
-              <a:rPr lang="en-US" sz="1600" dirty="0"/>
+              <a:rPr lang="en-US" sz="1600" b="1" dirty="0"/>
               <a:t>)); // false</a:t>
             </a:r>
           </a:p>
           <a:p>
             <a:r>
-              <a:rPr lang="en-US" sz="1600" dirty="0" err="1" smtClean="0"/>
+              <a:rPr lang="en-US" sz="1600" b="1" dirty="0" err="1" smtClean="0"/>
               <a:t>var</a:t>
             </a:r>
             <a:r>
-              <a:rPr lang="en-US" sz="1600" dirty="0" smtClean="0"/>
+              <a:rPr lang="en-US" sz="1600" b="1" dirty="0" smtClean="0"/>
               <a:t> </a:t>
             </a:r>
             <a:r>
-              <a:rPr lang="en-US" sz="1600" dirty="0" err="1"/>
+              <a:rPr lang="en-US" sz="1600" b="1" dirty="0" err="1"/>
               <a:t>stringInternFromConsole</a:t>
             </a:r>
             <a:r>
-              <a:rPr lang="en-US" sz="1600" dirty="0"/>
+              <a:rPr lang="en-US" sz="1600" b="1" dirty="0"/>
               <a:t> = </a:t>
             </a:r>
             <a:r>
-              <a:rPr lang="en-US" sz="1600" dirty="0" err="1"/>
+              <a:rPr lang="en-US" sz="1600" b="1" dirty="0" err="1"/>
               <a:t>string.Intern</a:t>
             </a:r>
             <a:r>
-              <a:rPr lang="en-US" sz="1600" dirty="0"/>
+              <a:rPr lang="en-US" sz="1600" b="1" dirty="0"/>
               <a:t>(</a:t>
             </a:r>
             <a:r>
-              <a:rPr lang="en-US" sz="1600" dirty="0" err="1"/>
+              <a:rPr lang="en-US" sz="1600" b="1" dirty="0" err="1"/>
               <a:t>stringFromConsole</a:t>
             </a:r>
             <a:r>
-              <a:rPr lang="en-US" sz="1600" dirty="0"/>
+              <a:rPr lang="en-US" sz="1600" b="1" dirty="0"/>
               <a:t>);</a:t>
             </a:r>
           </a:p>
           <a:p>
             <a:r>
-              <a:rPr lang="en-US" sz="1600" dirty="0" err="1" smtClean="0"/>
+              <a:rPr lang="en-US" sz="1600" b="1" dirty="0" err="1" smtClean="0"/>
               <a:t>Console.WriteLine</a:t>
             </a:r>
             <a:r>
-              <a:rPr lang="en-US" sz="1600" dirty="0" smtClean="0"/>
+              <a:rPr lang="en-US" sz="1600" b="1" dirty="0" smtClean="0"/>
               <a:t>(</a:t>
             </a:r>
             <a:r>
-              <a:rPr lang="en-US" sz="1600" dirty="0" err="1" smtClean="0"/>
+              <a:rPr lang="en-US" sz="1600" b="1" dirty="0" err="1" smtClean="0"/>
               <a:t>ReferenceEquals</a:t>
             </a:r>
             <a:r>
-              <a:rPr lang="en-US" sz="1600" dirty="0" smtClean="0"/>
+              <a:rPr lang="en-US" sz="1600" b="1" dirty="0" smtClean="0"/>
               <a:t>(string1</a:t>
             </a:r>
             <a:r>
-              <a:rPr lang="en-US" sz="1600" dirty="0"/>
+              <a:rPr lang="en-US" sz="1600" b="1" dirty="0"/>
               <a:t>, </a:t>
             </a:r>
             <a:r>
-              <a:rPr lang="en-US" sz="1600" dirty="0" err="1"/>
+              <a:rPr lang="en-US" sz="1600" b="1" dirty="0" err="1"/>
               <a:t>stringInternFromConsole</a:t>
             </a:r>
             <a:r>
-              <a:rPr lang="en-US" sz="1600" dirty="0"/>
+              <a:rPr lang="en-US" sz="1600" b="1" dirty="0"/>
               <a:t>)); //true</a:t>
             </a:r>
-            <a:endParaRPr lang="en-US" sz="1600" dirty="0"/>
           </a:p>
         </p:txBody>
       </p:sp>

</xml_diff>

<commit_message>
Change HashCode runtime and random numbers
</commit_message>
<xml_diff>
--- a/C# Tips and Tricks.pptx
+++ b/C# Tips and Tricks.pptx
@@ -7,10 +7,10 @@
     <p:sldMasterId id="2147483653" r:id="rId3"/>
   </p:sldMasterIdLst>
   <p:notesMasterIdLst>
-    <p:notesMasterId r:id="rId14"/>
+    <p:notesMasterId r:id="rId15"/>
   </p:notesMasterIdLst>
   <p:handoutMasterIdLst>
-    <p:handoutMasterId r:id="rId15"/>
+    <p:handoutMasterId r:id="rId16"/>
   </p:handoutMasterIdLst>
   <p:sldIdLst>
     <p:sldId id="256" r:id="rId4"/>
@@ -23,6 +23,7 @@
     <p:sldId id="263" r:id="rId11"/>
     <p:sldId id="264" r:id="rId12"/>
     <p:sldId id="265" r:id="rId13"/>
+    <p:sldId id="266" r:id="rId14"/>
   </p:sldIdLst>
   <p:sldSz cx="9144000" cy="5143500" type="screen16x9"/>
   <p:notesSz cx="6858000" cy="9144000"/>
@@ -5518,6 +5519,280 @@
     <p:extLst>
       <p:ext uri="{BB962C8B-B14F-4D97-AF65-F5344CB8AC3E}">
         <p14:creationId xmlns:p14="http://schemas.microsoft.com/office/powerpoint/2010/main" val="2308483657"/>
+      </p:ext>
+    </p:extLst>
+  </p:cSld>
+  <p:clrMapOvr>
+    <a:masterClrMapping/>
+  </p:clrMapOvr>
+</p:sld>
+</file>
+
+<file path=ppt/slides/slide11.xml><?xml version="1.0" encoding="utf-8"?>
+<p:sld xmlns:a="http://schemas.openxmlformats.org/drawingml/2006/main" xmlns:r="http://schemas.openxmlformats.org/officeDocument/2006/relationships" xmlns:p="http://schemas.openxmlformats.org/presentationml/2006/main">
+  <p:cSld>
+    <p:spTree>
+      <p:nvGrpSpPr>
+        <p:cNvPr id="1" name=""/>
+        <p:cNvGrpSpPr/>
+        <p:nvPr/>
+      </p:nvGrpSpPr>
+      <p:grpSpPr>
+        <a:xfrm>
+          <a:off x="0" y="0"/>
+          <a:ext cx="0" cy="0"/>
+          <a:chOff x="0" y="0"/>
+          <a:chExt cx="0" cy="0"/>
+        </a:xfrm>
+      </p:grpSpPr>
+      <p:sp>
+        <p:nvSpPr>
+          <p:cNvPr id="2" name="Текстов контейнер 1"/>
+          <p:cNvSpPr>
+            <a:spLocks noGrp="1"/>
+          </p:cNvSpPr>
+          <p:nvPr>
+            <p:ph type="body" sz="quarter" idx="10"/>
+          </p:nvPr>
+        </p:nvSpPr>
+        <p:spPr/>
+        <p:txBody>
+          <a:bodyPr/>
+          <a:lstStyle/>
+          <a:p>
+            <a:r>
+              <a:rPr lang="en-US" b="1" i="1" dirty="0" smtClean="0"/>
+              <a:t>Random numbers in .NET</a:t>
+            </a:r>
+            <a:endParaRPr lang="en-US" b="1" i="1" dirty="0"/>
+          </a:p>
+        </p:txBody>
+      </p:sp>
+      <p:sp>
+        <p:nvSpPr>
+          <p:cNvPr id="3" name="Текстов контейнер 2"/>
+          <p:cNvSpPr>
+            <a:spLocks noGrp="1"/>
+          </p:cNvSpPr>
+          <p:nvPr>
+            <p:ph type="body" sz="quarter" idx="11"/>
+          </p:nvPr>
+        </p:nvSpPr>
+        <p:spPr>
+          <a:xfrm>
+            <a:off x="179512" y="843558"/>
+            <a:ext cx="8964488" cy="4104456"/>
+          </a:xfrm>
+        </p:spPr>
+        <p:txBody>
+          <a:bodyPr anchor="t"/>
+          <a:lstStyle/>
+          <a:p>
+            <a:pPr marL="285750" indent="-285750" algn="l">
+              <a:buFont typeface="Wingdings" panose="05000000000000000000" pitchFamily="2" charset="2"/>
+              <a:buChar char="§"/>
+            </a:pPr>
+            <a:r>
+              <a:rPr lang="en-US" sz="2200" dirty="0" smtClean="0"/>
+              <a:t>The </a:t>
+            </a:r>
+            <a:r>
+              <a:rPr lang="en-US" sz="2200" b="1" dirty="0" smtClean="0"/>
+              <a:t>Random</a:t>
+            </a:r>
+            <a:r>
+              <a:rPr lang="en-US" sz="2200" dirty="0" smtClean="0"/>
+              <a:t> class in .NET is a </a:t>
+            </a:r>
+            <a:r>
+              <a:rPr lang="en-US" sz="2200" b="1" dirty="0" smtClean="0"/>
+              <a:t>pseudo-random number                generator </a:t>
+            </a:r>
+            <a:r>
+              <a:rPr lang="en-US" sz="2200" dirty="0" smtClean="0"/>
+              <a:t>(deterministic)</a:t>
+            </a:r>
+          </a:p>
+          <a:p>
+            <a:pPr marL="1028700" lvl="1">
+              <a:buFont typeface="Wingdings" panose="05000000000000000000" pitchFamily="2" charset="2"/>
+              <a:buChar char="§"/>
+            </a:pPr>
+            <a:r>
+              <a:rPr lang="en-US" sz="2200" dirty="0" smtClean="0">
+                <a:solidFill>
+                  <a:schemeClr val="accent3"/>
+                </a:solidFill>
+              </a:rPr>
+              <a:t>Any instance of Random has certain amount of state               (their seed value initially)</a:t>
+            </a:r>
+          </a:p>
+          <a:p>
+            <a:pPr marL="457200" lvl="1" indent="0">
+              <a:buNone/>
+            </a:pPr>
+            <a:r>
+              <a:rPr lang="en-US" sz="2200" dirty="0" smtClean="0"/>
+              <a:t>  </a:t>
+            </a:r>
+            <a:r>
+              <a:rPr lang="en-US" sz="2200" dirty="0" smtClean="0">
+                <a:solidFill>
+                  <a:schemeClr val="accent3"/>
+                </a:solidFill>
+              </a:rPr>
+              <a:t>These two instances will generate the exact same values</a:t>
+            </a:r>
+          </a:p>
+          <a:p>
+            <a:pPr marL="457200" lvl="1" indent="0">
+              <a:buNone/>
+            </a:pPr>
+            <a:r>
+              <a:rPr lang="en-US" sz="2200" b="1" dirty="0" smtClean="0">
+                <a:solidFill>
+                  <a:schemeClr val="accent3"/>
+                </a:solidFill>
+              </a:rPr>
+              <a:t>  </a:t>
+            </a:r>
+            <a:r>
+              <a:rPr lang="en-US" sz="2200" b="1" dirty="0" err="1" smtClean="0">
+                <a:solidFill>
+                  <a:schemeClr val="accent3"/>
+                </a:solidFill>
+              </a:rPr>
+              <a:t>var</a:t>
+            </a:r>
+            <a:r>
+              <a:rPr lang="en-US" sz="2200" b="1" dirty="0" smtClean="0">
+                <a:solidFill>
+                  <a:schemeClr val="accent3"/>
+                </a:solidFill>
+              </a:rPr>
+              <a:t> </a:t>
+            </a:r>
+            <a:r>
+              <a:rPr lang="en-US" sz="2200" b="1" dirty="0" err="1" smtClean="0">
+                <a:solidFill>
+                  <a:schemeClr val="accent3"/>
+                </a:solidFill>
+              </a:rPr>
+              <a:t>firstRandomNumberGenerator</a:t>
+            </a:r>
+            <a:r>
+              <a:rPr lang="en-US" sz="2200" b="1" dirty="0" smtClean="0">
+                <a:solidFill>
+                  <a:schemeClr val="accent3"/>
+                </a:solidFill>
+              </a:rPr>
+              <a:t> = new Random(0);</a:t>
+            </a:r>
+          </a:p>
+          <a:p>
+            <a:pPr marL="457200" lvl="1" indent="0">
+              <a:buNone/>
+            </a:pPr>
+            <a:r>
+              <a:rPr lang="en-US" sz="2200" b="1" dirty="0">
+                <a:solidFill>
+                  <a:schemeClr val="accent3"/>
+                </a:solidFill>
+              </a:rPr>
+              <a:t> </a:t>
+            </a:r>
+            <a:r>
+              <a:rPr lang="en-US" sz="2200" b="1" dirty="0" smtClean="0">
+                <a:solidFill>
+                  <a:schemeClr val="accent3"/>
+                </a:solidFill>
+              </a:rPr>
+              <a:t> </a:t>
+            </a:r>
+            <a:r>
+              <a:rPr lang="en-US" sz="2200" b="1" dirty="0" err="1" smtClean="0">
+                <a:solidFill>
+                  <a:schemeClr val="accent3"/>
+                </a:solidFill>
+              </a:rPr>
+              <a:t>var</a:t>
+            </a:r>
+            <a:r>
+              <a:rPr lang="en-US" sz="2200" b="1" dirty="0" smtClean="0">
+                <a:solidFill>
+                  <a:schemeClr val="accent3"/>
+                </a:solidFill>
+              </a:rPr>
+              <a:t> </a:t>
+            </a:r>
+            <a:r>
+              <a:rPr lang="en-US" sz="2200" b="1" dirty="0" err="1" smtClean="0">
+                <a:solidFill>
+                  <a:schemeClr val="accent3"/>
+                </a:solidFill>
+              </a:rPr>
+              <a:t>secondRandomNumberGenerator</a:t>
+            </a:r>
+            <a:r>
+              <a:rPr lang="en-US" sz="2200" b="1" dirty="0" smtClean="0">
+                <a:solidFill>
+                  <a:schemeClr val="accent3"/>
+                </a:solidFill>
+              </a:rPr>
+              <a:t> </a:t>
+            </a:r>
+            <a:r>
+              <a:rPr lang="en-US" sz="2200" b="1" dirty="0">
+                <a:solidFill>
+                  <a:schemeClr val="accent3"/>
+                </a:solidFill>
+              </a:rPr>
+              <a:t>= new Random(0</a:t>
+            </a:r>
+            <a:r>
+              <a:rPr lang="en-US" sz="2200" b="1" dirty="0" smtClean="0">
+                <a:solidFill>
+                  <a:schemeClr val="accent3"/>
+                </a:solidFill>
+              </a:rPr>
+              <a:t>);</a:t>
+            </a:r>
+          </a:p>
+          <a:p>
+            <a:pPr marL="457200" lvl="1" indent="0">
+              <a:buNone/>
+            </a:pPr>
+            <a:endParaRPr lang="en-US" sz="2200" b="1" dirty="0" smtClean="0">
+              <a:solidFill>
+                <a:schemeClr val="accent3"/>
+              </a:solidFill>
+            </a:endParaRPr>
+          </a:p>
+          <a:p>
+            <a:pPr marL="342900" indent="-342900" algn="l">
+              <a:buFont typeface="Wingdings" panose="05000000000000000000" pitchFamily="2" charset="2"/>
+              <a:buChar char="§"/>
+            </a:pPr>
+            <a:r>
+              <a:rPr lang="en-US" sz="2200" b="1" dirty="0" err="1" smtClean="0"/>
+              <a:t>RNGCryptoServiceProvider</a:t>
+            </a:r>
+            <a:r>
+              <a:rPr lang="en-US" sz="2200" b="1" dirty="0" smtClean="0"/>
+              <a:t> generates high-quality random      numbers</a:t>
+            </a:r>
+            <a:endParaRPr lang="en-US" sz="2200" b="1" dirty="0"/>
+          </a:p>
+          <a:p>
+            <a:pPr algn="l"/>
+            <a:endParaRPr lang="en-US" dirty="0"/>
+          </a:p>
+        </p:txBody>
+      </p:sp>
+    </p:spTree>
+    <p:extLst>
+      <p:ext uri="{BB962C8B-B14F-4D97-AF65-F5344CB8AC3E}">
+        <p14:creationId xmlns:p14="http://schemas.microsoft.com/office/powerpoint/2010/main" val="2449598124"/>
       </p:ext>
     </p:extLst>
   </p:cSld>

</xml_diff>

<commit_message>
Casting vs as operator
</commit_message>
<xml_diff>
--- a/C# Tips and Tricks.pptx
+++ b/C# Tips and Tricks.pptx
@@ -7,24 +7,27 @@
     <p:sldMasterId id="2147483653" r:id="rId3"/>
   </p:sldMasterIdLst>
   <p:notesMasterIdLst>
-    <p:notesMasterId r:id="rId16"/>
+    <p:notesMasterId r:id="rId19"/>
   </p:notesMasterIdLst>
   <p:handoutMasterIdLst>
-    <p:handoutMasterId r:id="rId17"/>
+    <p:handoutMasterId r:id="rId20"/>
   </p:handoutMasterIdLst>
   <p:sldIdLst>
     <p:sldId id="256" r:id="rId4"/>
     <p:sldId id="257" r:id="rId5"/>
-    <p:sldId id="258" r:id="rId6"/>
-    <p:sldId id="259" r:id="rId7"/>
-    <p:sldId id="260" r:id="rId8"/>
-    <p:sldId id="261" r:id="rId9"/>
-    <p:sldId id="262" r:id="rId10"/>
-    <p:sldId id="263" r:id="rId11"/>
-    <p:sldId id="264" r:id="rId12"/>
-    <p:sldId id="265" r:id="rId13"/>
-    <p:sldId id="266" r:id="rId14"/>
-    <p:sldId id="267" r:id="rId15"/>
+    <p:sldId id="268" r:id="rId6"/>
+    <p:sldId id="258" r:id="rId7"/>
+    <p:sldId id="259" r:id="rId8"/>
+    <p:sldId id="260" r:id="rId9"/>
+    <p:sldId id="261" r:id="rId10"/>
+    <p:sldId id="262" r:id="rId11"/>
+    <p:sldId id="263" r:id="rId12"/>
+    <p:sldId id="264" r:id="rId13"/>
+    <p:sldId id="265" r:id="rId14"/>
+    <p:sldId id="266" r:id="rId15"/>
+    <p:sldId id="267" r:id="rId16"/>
+    <p:sldId id="269" r:id="rId17"/>
+    <p:sldId id="270" r:id="rId18"/>
   </p:sldIdLst>
   <p:sldSz cx="9144000" cy="5143500" type="screen16x9"/>
   <p:notesSz cx="6858000" cy="9144000"/>
@@ -265,7 +268,7 @@
           <a:p>
             <a:fld id="{D090F118-FDC5-4298-8605-509719EC5E22}" type="datetimeFigureOut">
               <a:rPr lang="ko-KR" altLang="en-US" smtClean="0"/>
-              <a:t>2020-03-10</a:t>
+              <a:t>2020-03-11</a:t>
             </a:fld>
             <a:endParaRPr lang="ko-KR" altLang="en-US"/>
           </a:p>
@@ -442,7 +445,7 @@
           <a:p>
             <a:fld id="{7C8BDEB5-11C8-4FFD-966B-93DB62A96F3D}" type="datetimeFigureOut">
               <a:rPr lang="ko-KR" altLang="en-US" smtClean="0"/>
-              <a:t>2020-03-10</a:t>
+              <a:t>2020-03-11</a:t>
             </a:fld>
             <a:endParaRPr lang="ko-KR" altLang="en-US"/>
           </a:p>
@@ -5370,10 +5373,18 @@
           <a:lstStyle/>
           <a:p>
             <a:r>
-              <a:rPr lang="en-US" dirty="0" smtClean="0"/>
-              <a:t>Changing Hash Code Run-time</a:t>
-            </a:r>
-            <a:endParaRPr lang="en-US" dirty="0"/>
+              <a:rPr lang="en-US" b="1" i="1" dirty="0" smtClean="0">
+                <a:solidFill>
+                  <a:schemeClr val="tx1"/>
+                </a:solidFill>
+              </a:rPr>
+              <a:t>Virtual call in constructor</a:t>
+            </a:r>
+            <a:endParaRPr lang="en-US" b="1" i="1" dirty="0">
+              <a:solidFill>
+                <a:schemeClr val="tx1"/>
+              </a:solidFill>
+            </a:endParaRPr>
           </a:p>
         </p:txBody>
       </p:sp>
@@ -5389,143 +5400,254 @@
         </p:nvSpPr>
         <p:spPr>
           <a:xfrm>
-            <a:off x="323528" y="843558"/>
-            <a:ext cx="8712968" cy="4032448"/>
+            <a:off x="179512" y="873137"/>
+            <a:ext cx="8784976" cy="4244788"/>
           </a:xfrm>
         </p:spPr>
         <p:txBody>
-          <a:bodyPr anchor="t"/>
+          <a:bodyPr wrap="square" anchor="t">
+            <a:noAutofit/>
+          </a:bodyPr>
           <a:lstStyle/>
           <a:p>
-            <a:pPr marL="342900" indent="-342900" algn="l">
+            <a:pPr marL="285750" indent="-285750" algn="l">
               <a:buFont typeface="Wingdings" panose="05000000000000000000" pitchFamily="2" charset="2"/>
               <a:buChar char="§"/>
             </a:pPr>
             <a:r>
-              <a:rPr lang="en-US" sz="2200" dirty="0" smtClean="0"/>
-              <a:t>Hash code is used in various hash-based collections                      (</a:t>
-            </a:r>
-            <a:r>
-              <a:rPr lang="en-US" sz="2200" b="1" dirty="0" err="1" smtClean="0"/>
-              <a:t>HashSet</a:t>
-            </a:r>
-            <a:r>
-              <a:rPr lang="en-US" sz="2200" b="1" dirty="0" smtClean="0"/>
-              <a:t>&lt;T&gt;, Dictionary&lt;</a:t>
-            </a:r>
-            <a:r>
-              <a:rPr lang="en-US" sz="2200" b="1" dirty="0" err="1" smtClean="0"/>
-              <a:t>TKey</a:t>
-            </a:r>
-            <a:r>
-              <a:rPr lang="en-US" sz="2200" b="1" dirty="0" smtClean="0"/>
-              <a:t>, TValue&gt;</a:t>
-            </a:r>
-            <a:r>
-              <a:rPr lang="en-US" sz="2200" dirty="0" smtClean="0"/>
-              <a:t>)</a:t>
-            </a:r>
-          </a:p>
-          <a:p>
-            <a:pPr marL="342900" indent="-342900" algn="l">
+              <a:rPr lang="en-US" sz="2200" dirty="0" smtClean="0">
+                <a:solidFill>
+                  <a:schemeClr val="tx1"/>
+                </a:solidFill>
+              </a:rPr>
+              <a:t>Calling </a:t>
+            </a:r>
+            <a:r>
+              <a:rPr lang="en-US" sz="2200" b="1" dirty="0" smtClean="0">
+                <a:solidFill>
+                  <a:schemeClr val="tx1"/>
+                </a:solidFill>
+              </a:rPr>
+              <a:t>virtual methods </a:t>
+            </a:r>
+            <a:r>
+              <a:rPr lang="en-US" sz="2200" dirty="0" smtClean="0">
+                <a:solidFill>
+                  <a:schemeClr val="tx1"/>
+                </a:solidFill>
+              </a:rPr>
+              <a:t>in a constrictor is a </a:t>
+            </a:r>
+            <a:r>
+              <a:rPr lang="en-US" sz="2200" b="1" dirty="0" smtClean="0">
+                <a:solidFill>
+                  <a:schemeClr val="tx1"/>
+                </a:solidFill>
+              </a:rPr>
+              <a:t>bad</a:t>
+            </a:r>
+            <a:r>
+              <a:rPr lang="en-US" sz="2200" dirty="0" smtClean="0">
+                <a:solidFill>
+                  <a:schemeClr val="tx1"/>
+                </a:solidFill>
+              </a:rPr>
+              <a:t> idea</a:t>
+            </a:r>
+          </a:p>
+          <a:p>
+            <a:pPr marL="285750" indent="-285750" algn="l">
               <a:buFont typeface="Wingdings" panose="05000000000000000000" pitchFamily="2" charset="2"/>
               <a:buChar char="§"/>
             </a:pPr>
             <a:r>
-              <a:rPr lang="en-US" sz="2200" dirty="0" smtClean="0"/>
-              <a:t>In C# an overridden method named </a:t>
-            </a:r>
-            <a:r>
-              <a:rPr lang="en-US" sz="2200" b="1" dirty="0" err="1" smtClean="0"/>
-              <a:t>GetHashCode</a:t>
-            </a:r>
-            <a:r>
-              <a:rPr lang="en-US" sz="2200" dirty="0"/>
-              <a:t> </a:t>
-            </a:r>
-            <a:r>
-              <a:rPr lang="en-US" sz="2200" dirty="0" smtClean="0"/>
-              <a:t>provides the   hash code generation for particular types</a:t>
-            </a:r>
-          </a:p>
-          <a:p>
-            <a:pPr marL="342900" indent="-342900" algn="l">
+              <a:rPr lang="en-US" sz="2200" dirty="0" smtClean="0">
+                <a:solidFill>
+                  <a:schemeClr val="tx1"/>
+                </a:solidFill>
+              </a:rPr>
+              <a:t>When initializing a type in C# constructors are invoked </a:t>
+            </a:r>
+            <a:r>
+              <a:rPr lang="en-US" sz="2200" b="1" dirty="0" smtClean="0">
+                <a:solidFill>
+                  <a:schemeClr val="tx1"/>
+                </a:solidFill>
+              </a:rPr>
+              <a:t>top-down</a:t>
+            </a:r>
+          </a:p>
+          <a:p>
+            <a:pPr marL="1028700" lvl="1">
               <a:buFont typeface="Wingdings" panose="05000000000000000000" pitchFamily="2" charset="2"/>
               <a:buChar char="§"/>
             </a:pPr>
             <a:r>
               <a:rPr lang="en-US" sz="2200" dirty="0" smtClean="0"/>
-              <a:t>If you generate a </a:t>
+              <a:t>First the </a:t>
             </a:r>
             <a:r>
               <a:rPr lang="en-US" sz="2200" b="1" dirty="0" smtClean="0"/>
-              <a:t>custom hash code </a:t>
+              <a:t>top base </a:t>
             </a:r>
             <a:r>
               <a:rPr lang="en-US" sz="2200" dirty="0" smtClean="0"/>
-              <a:t>for a type, try to use             </a:t>
-            </a:r>
-            <a:r>
-              <a:rPr lang="en-US" sz="2200" b="1" dirty="0" smtClean="0"/>
-              <a:t>read-only properties </a:t>
-            </a:r>
-            <a:r>
-              <a:rPr lang="en-US" sz="2200" dirty="0" smtClean="0"/>
-              <a:t>for it</a:t>
-            </a:r>
-          </a:p>
-          <a:p>
-            <a:pPr marL="342900" indent="-342900" algn="l">
+              <a:t>constructor (object())</a:t>
+            </a:r>
+          </a:p>
+          <a:p>
+            <a:pPr marL="1028700" lvl="1">
               <a:buFont typeface="Wingdings" panose="05000000000000000000" pitchFamily="2" charset="2"/>
               <a:buChar char="§"/>
             </a:pPr>
             <a:r>
+              <a:rPr lang="en-US" sz="2200" dirty="0" smtClean="0"/>
+              <a:t>Then down to </a:t>
+            </a:r>
+            <a:r>
               <a:rPr lang="en-US" sz="2200" b="1" dirty="0" smtClean="0"/>
-              <a:t>Non-read-only properties </a:t>
+              <a:t>the derived constructors </a:t>
             </a:r>
             <a:r>
               <a:rPr lang="en-US" sz="2200" dirty="0" smtClean="0"/>
-              <a:t>may </a:t>
-            </a:r>
-            <a:r>
-              <a:rPr lang="en-US" sz="2200" b="1" dirty="0" smtClean="0"/>
-              <a:t>change</a:t>
-            </a:r>
-            <a:r>
-              <a:rPr lang="en-US" sz="2200" dirty="0" smtClean="0"/>
-              <a:t> the hash-code runtime    and collections will not be notified for the change</a:t>
-            </a:r>
-          </a:p>
-          <a:p>
-            <a:pPr marL="342900" indent="-342900" algn="l">
+              <a:t>through inheritance</a:t>
+            </a:r>
+          </a:p>
+          <a:p>
+            <a:pPr marL="285750" indent="-285750" algn="l">
               <a:buFont typeface="Wingdings" panose="05000000000000000000" pitchFamily="2" charset="2"/>
               <a:buChar char="§"/>
             </a:pPr>
             <a:r>
+              <a:rPr lang="en-US" sz="2200" dirty="0" smtClean="0">
+                <a:solidFill>
+                  <a:schemeClr val="tx1"/>
+                </a:solidFill>
+              </a:rPr>
+              <a:t>But virtual methods are invoked </a:t>
+            </a:r>
+            <a:r>
+              <a:rPr lang="en-US" sz="2200" b="1" dirty="0" smtClean="0">
+                <a:solidFill>
+                  <a:schemeClr val="tx1"/>
+                </a:solidFill>
+              </a:rPr>
+              <a:t>bottom-up</a:t>
+            </a:r>
+            <a:r>
+              <a:rPr lang="en-US" sz="2200" dirty="0" smtClean="0">
+                <a:solidFill>
+                  <a:schemeClr val="tx1"/>
+                </a:solidFill>
+              </a:rPr>
+              <a:t>	</a:t>
+            </a:r>
+          </a:p>
+          <a:p>
+            <a:pPr marL="1028700" lvl="1">
+              <a:buFont typeface="Wingdings" panose="05000000000000000000" pitchFamily="2" charset="2"/>
+              <a:buChar char="§"/>
+            </a:pPr>
+            <a:r>
               <a:rPr lang="en-US" sz="2200" dirty="0" smtClean="0"/>
-              <a:t>Thus the internal structure and algorithms of the collection will not be able to retrieve and use the </a:t>
+              <a:t>First the </a:t>
             </a:r>
             <a:r>
               <a:rPr lang="en-US" sz="2200" b="1" dirty="0" smtClean="0"/>
-              <a:t>modified instance</a:t>
+              <a:t>most</a:t>
+            </a:r>
+            <a:r>
+              <a:rPr lang="en-US" sz="2200" dirty="0" smtClean="0"/>
+              <a:t> </a:t>
+            </a:r>
+            <a:r>
+              <a:rPr lang="en-US" sz="2200" b="1" dirty="0" smtClean="0"/>
+              <a:t>derived overridden method</a:t>
+            </a:r>
+          </a:p>
+          <a:p>
+            <a:pPr marL="1028700" lvl="1">
+              <a:buFont typeface="Wingdings" panose="05000000000000000000" pitchFamily="2" charset="2"/>
+              <a:buChar char="§"/>
+            </a:pPr>
+            <a:r>
+              <a:rPr lang="en-US" sz="2200" dirty="0" smtClean="0"/>
+              <a:t>Then up to all </a:t>
+            </a:r>
+            <a:r>
+              <a:rPr lang="en-US" sz="2200" b="1" dirty="0" smtClean="0"/>
+              <a:t>base virtual </a:t>
+            </a:r>
+            <a:r>
+              <a:rPr lang="en-US" sz="2200" dirty="0" smtClean="0"/>
+              <a:t>methods</a:t>
+            </a:r>
+          </a:p>
+          <a:p>
+            <a:pPr marL="285750" indent="-285750" algn="l">
+              <a:buFont typeface="Wingdings" panose="05000000000000000000" pitchFamily="2" charset="2"/>
+              <a:buChar char="§"/>
+            </a:pPr>
+            <a:r>
+              <a:rPr lang="en-US" sz="2200" dirty="0" smtClean="0">
+                <a:solidFill>
+                  <a:schemeClr val="tx1"/>
+                </a:solidFill>
+              </a:rPr>
+              <a:t>For this reason, if you call virtual methods in constructor, you may </a:t>
+            </a:r>
+            <a:r>
+              <a:rPr lang="en-US" sz="2200" b="1" dirty="0" smtClean="0">
+                <a:solidFill>
+                  <a:schemeClr val="tx1"/>
+                </a:solidFill>
+              </a:rPr>
+              <a:t>have unexpected </a:t>
+            </a:r>
+            <a:r>
+              <a:rPr lang="en-US" sz="2200" b="1" dirty="0" err="1" smtClean="0">
+                <a:solidFill>
+                  <a:schemeClr val="tx1"/>
+                </a:solidFill>
+              </a:rPr>
+              <a:t>behaviour</a:t>
+            </a:r>
+            <a:r>
+              <a:rPr lang="en-US" sz="2200" dirty="0" smtClean="0">
+                <a:solidFill>
+                  <a:schemeClr val="tx1"/>
+                </a:solidFill>
+              </a:rPr>
+              <a:t> from your classes</a:t>
             </a:r>
           </a:p>
           <a:p>
             <a:pPr algn="l"/>
-            <a:endParaRPr lang="en-US" dirty="0"/>
+            <a:endParaRPr lang="en-US" sz="2200" dirty="0">
+              <a:solidFill>
+                <a:schemeClr val="tx1"/>
+              </a:solidFill>
+            </a:endParaRPr>
           </a:p>
         </p:txBody>
       </p:sp>
     </p:spTree>
     <p:extLst>
       <p:ext uri="{BB962C8B-B14F-4D97-AF65-F5344CB8AC3E}">
-        <p14:creationId xmlns:p14="http://schemas.microsoft.com/office/powerpoint/2010/main" val="2308483657"/>
+        <p14:creationId xmlns:p14="http://schemas.microsoft.com/office/powerpoint/2010/main" val="773331329"/>
       </p:ext>
     </p:extLst>
   </p:cSld>
   <p:clrMapOvr>
     <a:masterClrMapping/>
   </p:clrMapOvr>
+  <p:timing>
+    <p:tnLst>
+      <p:par>
+        <p:cTn id="1" dur="indefinite" restart="never" nodeType="tmRoot"/>
+      </p:par>
+    </p:tnLst>
+  </p:timing>
 </p:sld>
 </file>
 
@@ -5562,6 +5684,198 @@
           <a:lstStyle/>
           <a:p>
             <a:r>
+              <a:rPr lang="en-US" dirty="0" smtClean="0"/>
+              <a:t>Changing Hash Code Run-time</a:t>
+            </a:r>
+            <a:endParaRPr lang="en-US" dirty="0"/>
+          </a:p>
+        </p:txBody>
+      </p:sp>
+      <p:sp>
+        <p:nvSpPr>
+          <p:cNvPr id="3" name="Текстов контейнер 2"/>
+          <p:cNvSpPr>
+            <a:spLocks noGrp="1"/>
+          </p:cNvSpPr>
+          <p:nvPr>
+            <p:ph type="body" sz="quarter" idx="11"/>
+          </p:nvPr>
+        </p:nvSpPr>
+        <p:spPr>
+          <a:xfrm>
+            <a:off x="323528" y="843558"/>
+            <a:ext cx="8712968" cy="4032448"/>
+          </a:xfrm>
+        </p:spPr>
+        <p:txBody>
+          <a:bodyPr anchor="t"/>
+          <a:lstStyle/>
+          <a:p>
+            <a:pPr marL="342900" indent="-342900" algn="l">
+              <a:buFont typeface="Wingdings" panose="05000000000000000000" pitchFamily="2" charset="2"/>
+              <a:buChar char="§"/>
+            </a:pPr>
+            <a:r>
+              <a:rPr lang="en-US" sz="2200" dirty="0" smtClean="0"/>
+              <a:t>Hash code is used in various hash-based collections                      (</a:t>
+            </a:r>
+            <a:r>
+              <a:rPr lang="en-US" sz="2200" b="1" dirty="0" err="1" smtClean="0"/>
+              <a:t>HashSet</a:t>
+            </a:r>
+            <a:r>
+              <a:rPr lang="en-US" sz="2200" b="1" dirty="0" smtClean="0"/>
+              <a:t>&lt;T&gt;, Dictionary&lt;</a:t>
+            </a:r>
+            <a:r>
+              <a:rPr lang="en-US" sz="2200" b="1" dirty="0" err="1" smtClean="0"/>
+              <a:t>TKey</a:t>
+            </a:r>
+            <a:r>
+              <a:rPr lang="en-US" sz="2200" b="1" dirty="0" smtClean="0"/>
+              <a:t>, TValue&gt;</a:t>
+            </a:r>
+            <a:r>
+              <a:rPr lang="en-US" sz="2200" dirty="0" smtClean="0"/>
+              <a:t>)</a:t>
+            </a:r>
+          </a:p>
+          <a:p>
+            <a:pPr marL="342900" indent="-342900" algn="l">
+              <a:buFont typeface="Wingdings" panose="05000000000000000000" pitchFamily="2" charset="2"/>
+              <a:buChar char="§"/>
+            </a:pPr>
+            <a:r>
+              <a:rPr lang="en-US" sz="2200" dirty="0" smtClean="0"/>
+              <a:t>In C# an overridden method named </a:t>
+            </a:r>
+            <a:r>
+              <a:rPr lang="en-US" sz="2200" b="1" dirty="0" err="1" smtClean="0"/>
+              <a:t>GetHashCode</a:t>
+            </a:r>
+            <a:r>
+              <a:rPr lang="en-US" sz="2200" dirty="0"/>
+              <a:t> </a:t>
+            </a:r>
+            <a:r>
+              <a:rPr lang="en-US" sz="2200" dirty="0" smtClean="0"/>
+              <a:t>provides the   hash code generation for particular types</a:t>
+            </a:r>
+          </a:p>
+          <a:p>
+            <a:pPr marL="342900" indent="-342900" algn="l">
+              <a:buFont typeface="Wingdings" panose="05000000000000000000" pitchFamily="2" charset="2"/>
+              <a:buChar char="§"/>
+            </a:pPr>
+            <a:r>
+              <a:rPr lang="en-US" sz="2200" dirty="0" smtClean="0"/>
+              <a:t>If you generate a </a:t>
+            </a:r>
+            <a:r>
+              <a:rPr lang="en-US" sz="2200" b="1" dirty="0" smtClean="0"/>
+              <a:t>custom hash code </a:t>
+            </a:r>
+            <a:r>
+              <a:rPr lang="en-US" sz="2200" dirty="0" smtClean="0"/>
+              <a:t>for a type, try to use             </a:t>
+            </a:r>
+            <a:r>
+              <a:rPr lang="en-US" sz="2200" b="1" dirty="0" smtClean="0"/>
+              <a:t>read-only properties </a:t>
+            </a:r>
+            <a:r>
+              <a:rPr lang="en-US" sz="2200" dirty="0" smtClean="0"/>
+              <a:t>for it</a:t>
+            </a:r>
+          </a:p>
+          <a:p>
+            <a:pPr marL="342900" indent="-342900" algn="l">
+              <a:buFont typeface="Wingdings" panose="05000000000000000000" pitchFamily="2" charset="2"/>
+              <a:buChar char="§"/>
+            </a:pPr>
+            <a:r>
+              <a:rPr lang="en-US" sz="2200" b="1" dirty="0" smtClean="0"/>
+              <a:t>Non-read-only properties </a:t>
+            </a:r>
+            <a:r>
+              <a:rPr lang="en-US" sz="2200" dirty="0" smtClean="0"/>
+              <a:t>may </a:t>
+            </a:r>
+            <a:r>
+              <a:rPr lang="en-US" sz="2200" b="1" dirty="0" smtClean="0"/>
+              <a:t>change</a:t>
+            </a:r>
+            <a:r>
+              <a:rPr lang="en-US" sz="2200" dirty="0" smtClean="0"/>
+              <a:t> the hash-code runtime    and collections will not be notified for the change</a:t>
+            </a:r>
+          </a:p>
+          <a:p>
+            <a:pPr marL="342900" indent="-342900" algn="l">
+              <a:buFont typeface="Wingdings" panose="05000000000000000000" pitchFamily="2" charset="2"/>
+              <a:buChar char="§"/>
+            </a:pPr>
+            <a:r>
+              <a:rPr lang="en-US" sz="2200" dirty="0" smtClean="0"/>
+              <a:t>Thus the internal structure and algorithms of the collection will not be able to retrieve and use the </a:t>
+            </a:r>
+            <a:r>
+              <a:rPr lang="en-US" sz="2200" b="1" dirty="0" smtClean="0"/>
+              <a:t>modified instance</a:t>
+            </a:r>
+          </a:p>
+          <a:p>
+            <a:pPr algn="l"/>
+            <a:endParaRPr lang="en-US" dirty="0"/>
+          </a:p>
+        </p:txBody>
+      </p:sp>
+    </p:spTree>
+    <p:extLst>
+      <p:ext uri="{BB962C8B-B14F-4D97-AF65-F5344CB8AC3E}">
+        <p14:creationId xmlns:p14="http://schemas.microsoft.com/office/powerpoint/2010/main" val="2308483657"/>
+      </p:ext>
+    </p:extLst>
+  </p:cSld>
+  <p:clrMapOvr>
+    <a:masterClrMapping/>
+  </p:clrMapOvr>
+</p:sld>
+</file>
+
+<file path=ppt/slides/slide12.xml><?xml version="1.0" encoding="utf-8"?>
+<p:sld xmlns:a="http://schemas.openxmlformats.org/drawingml/2006/main" xmlns:r="http://schemas.openxmlformats.org/officeDocument/2006/relationships" xmlns:p="http://schemas.openxmlformats.org/presentationml/2006/main">
+  <p:cSld>
+    <p:spTree>
+      <p:nvGrpSpPr>
+        <p:cNvPr id="1" name=""/>
+        <p:cNvGrpSpPr/>
+        <p:nvPr/>
+      </p:nvGrpSpPr>
+      <p:grpSpPr>
+        <a:xfrm>
+          <a:off x="0" y="0"/>
+          <a:ext cx="0" cy="0"/>
+          <a:chOff x="0" y="0"/>
+          <a:chExt cx="0" cy="0"/>
+        </a:xfrm>
+      </p:grpSpPr>
+      <p:sp>
+        <p:nvSpPr>
+          <p:cNvPr id="2" name="Текстов контейнер 1"/>
+          <p:cNvSpPr>
+            <a:spLocks noGrp="1"/>
+          </p:cNvSpPr>
+          <p:nvPr>
+            <p:ph type="body" sz="quarter" idx="10"/>
+          </p:nvPr>
+        </p:nvSpPr>
+        <p:spPr/>
+        <p:txBody>
+          <a:bodyPr/>
+          <a:lstStyle/>
+          <a:p>
+            <a:r>
               <a:rPr lang="en-US" b="1" i="1" dirty="0" smtClean="0"/>
               <a:t>Random numbers in .NET</a:t>
             </a:r>
@@ -5803,7 +6117,7 @@
 </p:sld>
 </file>
 
-<file path=ppt/slides/slide12.xml><?xml version="1.0" encoding="utf-8"?>
+<file path=ppt/slides/slide13.xml><?xml version="1.0" encoding="utf-8"?>
 <p:sld xmlns:a="http://schemas.openxmlformats.org/drawingml/2006/main" xmlns:r="http://schemas.openxmlformats.org/officeDocument/2006/relationships" xmlns:p="http://schemas.openxmlformats.org/presentationml/2006/main">
   <p:cSld>
     <p:spTree>
@@ -6318,6 +6632,626 @@
     <p:extLst>
       <p:ext uri="{BB962C8B-B14F-4D97-AF65-F5344CB8AC3E}">
         <p14:creationId xmlns:p14="http://schemas.microsoft.com/office/powerpoint/2010/main" val="1060238846"/>
+      </p:ext>
+    </p:extLst>
+  </p:cSld>
+  <p:clrMapOvr>
+    <a:masterClrMapping/>
+  </p:clrMapOvr>
+</p:sld>
+</file>
+
+<file path=ppt/slides/slide14.xml><?xml version="1.0" encoding="utf-8"?>
+<p:sld xmlns:a="http://schemas.openxmlformats.org/drawingml/2006/main" xmlns:r="http://schemas.openxmlformats.org/officeDocument/2006/relationships" xmlns:p="http://schemas.openxmlformats.org/presentationml/2006/main">
+  <p:cSld>
+    <p:spTree>
+      <p:nvGrpSpPr>
+        <p:cNvPr id="1" name=""/>
+        <p:cNvGrpSpPr/>
+        <p:nvPr/>
+      </p:nvGrpSpPr>
+      <p:grpSpPr>
+        <a:xfrm>
+          <a:off x="0" y="0"/>
+          <a:ext cx="0" cy="0"/>
+          <a:chOff x="0" y="0"/>
+          <a:chExt cx="0" cy="0"/>
+        </a:xfrm>
+      </p:grpSpPr>
+      <p:sp>
+        <p:nvSpPr>
+          <p:cNvPr id="2" name="Текстов контейнер 1"/>
+          <p:cNvSpPr>
+            <a:spLocks noGrp="1"/>
+          </p:cNvSpPr>
+          <p:nvPr>
+            <p:ph type="body" sz="quarter" idx="10"/>
+          </p:nvPr>
+        </p:nvSpPr>
+        <p:spPr>
+          <a:xfrm>
+            <a:off x="0" y="195486"/>
+            <a:ext cx="9144000" cy="576064"/>
+          </a:xfrm>
+        </p:spPr>
+        <p:txBody>
+          <a:bodyPr/>
+          <a:lstStyle/>
+          <a:p>
+            <a:r>
+              <a:rPr lang="en-US" b="1" i="1" dirty="0" smtClean="0">
+                <a:solidFill>
+                  <a:schemeClr val="tx1"/>
+                </a:solidFill>
+              </a:rPr>
+              <a:t>Syntactic sugar</a:t>
+            </a:r>
+            <a:endParaRPr lang="en-US" b="1" i="1" dirty="0">
+              <a:solidFill>
+                <a:schemeClr val="tx1"/>
+              </a:solidFill>
+            </a:endParaRPr>
+          </a:p>
+        </p:txBody>
+      </p:sp>
+      <p:sp>
+        <p:nvSpPr>
+          <p:cNvPr id="3" name="Текстов контейнер 2"/>
+          <p:cNvSpPr>
+            <a:spLocks noGrp="1"/>
+          </p:cNvSpPr>
+          <p:nvPr>
+            <p:ph type="body" sz="quarter" idx="11"/>
+          </p:nvPr>
+        </p:nvSpPr>
+        <p:spPr>
+          <a:xfrm>
+            <a:off x="0" y="915566"/>
+            <a:ext cx="9144000" cy="288032"/>
+          </a:xfrm>
+        </p:spPr>
+        <p:txBody>
+          <a:bodyPr/>
+          <a:lstStyle/>
+          <a:p>
+            <a:r>
+              <a:rPr lang="en-US" sz="2400" b="1" i="1" dirty="0" smtClean="0">
+                <a:solidFill>
+                  <a:schemeClr val="tx1"/>
+                </a:solidFill>
+              </a:rPr>
+              <a:t>Language features in C#</a:t>
+            </a:r>
+            <a:endParaRPr lang="en-US" sz="2400" b="1" i="1" dirty="0">
+              <a:solidFill>
+                <a:schemeClr val="tx1"/>
+              </a:solidFill>
+            </a:endParaRPr>
+          </a:p>
+        </p:txBody>
+      </p:sp>
+      <p:pic>
+        <p:nvPicPr>
+          <p:cNvPr id="4" name="Картина 3"/>
+          <p:cNvPicPr>
+            <a:picLocks noChangeAspect="1"/>
+          </p:cNvPicPr>
+          <p:nvPr/>
+        </p:nvPicPr>
+        <p:blipFill>
+          <a:blip r:embed="rId2">
+            <a:extLst>
+              <a:ext uri="{28A0092B-C50C-407E-A947-70E740481C1C}">
+                <a14:useLocalDpi xmlns:a14="http://schemas.microsoft.com/office/drawing/2010/main" val="0"/>
+              </a:ext>
+            </a:extLst>
+          </a:blip>
+          <a:stretch>
+            <a:fillRect/>
+          </a:stretch>
+        </p:blipFill>
+        <p:spPr>
+          <a:xfrm>
+            <a:off x="2101416" y="1422231"/>
+            <a:ext cx="4941168" cy="3705876"/>
+          </a:xfrm>
+          <a:prstGeom prst="rect">
+            <a:avLst/>
+          </a:prstGeom>
+        </p:spPr>
+      </p:pic>
+    </p:spTree>
+    <p:extLst>
+      <p:ext uri="{BB962C8B-B14F-4D97-AF65-F5344CB8AC3E}">
+        <p14:creationId xmlns:p14="http://schemas.microsoft.com/office/powerpoint/2010/main" val="2877523588"/>
+      </p:ext>
+    </p:extLst>
+  </p:cSld>
+  <p:clrMapOvr>
+    <a:masterClrMapping/>
+  </p:clrMapOvr>
+</p:sld>
+</file>
+
+<file path=ppt/slides/slide15.xml><?xml version="1.0" encoding="utf-8"?>
+<p:sld xmlns:a="http://schemas.openxmlformats.org/drawingml/2006/main" xmlns:r="http://schemas.openxmlformats.org/officeDocument/2006/relationships" xmlns:p="http://schemas.openxmlformats.org/presentationml/2006/main">
+  <p:cSld>
+    <p:spTree>
+      <p:nvGrpSpPr>
+        <p:cNvPr id="1" name=""/>
+        <p:cNvGrpSpPr/>
+        <p:nvPr/>
+      </p:nvGrpSpPr>
+      <p:grpSpPr>
+        <a:xfrm>
+          <a:off x="0" y="0"/>
+          <a:ext cx="0" cy="0"/>
+          <a:chOff x="0" y="0"/>
+          <a:chExt cx="0" cy="0"/>
+        </a:xfrm>
+      </p:grpSpPr>
+      <p:sp>
+        <p:nvSpPr>
+          <p:cNvPr id="2" name="Текстов контейнер 1"/>
+          <p:cNvSpPr>
+            <a:spLocks noGrp="1"/>
+          </p:cNvSpPr>
+          <p:nvPr>
+            <p:ph type="body" sz="quarter" idx="10"/>
+          </p:nvPr>
+        </p:nvSpPr>
+        <p:spPr/>
+        <p:txBody>
+          <a:bodyPr/>
+          <a:lstStyle/>
+          <a:p>
+            <a:r>
+              <a:rPr lang="en-US" b="1" i="1" dirty="0" smtClean="0"/>
+              <a:t>Casting vs the as operator</a:t>
+            </a:r>
+            <a:endParaRPr lang="en-US" b="1" i="1" dirty="0"/>
+          </a:p>
+        </p:txBody>
+      </p:sp>
+      <p:sp>
+        <p:nvSpPr>
+          <p:cNvPr id="3" name="Текстов контейнер 2"/>
+          <p:cNvSpPr>
+            <a:spLocks noGrp="1"/>
+          </p:cNvSpPr>
+          <p:nvPr>
+            <p:ph type="body" sz="quarter" idx="11"/>
+          </p:nvPr>
+        </p:nvSpPr>
+        <p:spPr>
+          <a:xfrm>
+            <a:off x="0" y="807554"/>
+            <a:ext cx="9144000" cy="4104456"/>
+          </a:xfrm>
+        </p:spPr>
+        <p:txBody>
+          <a:bodyPr anchor="t"/>
+          <a:lstStyle/>
+          <a:p>
+            <a:pPr marL="342900" indent="-342900" algn="l">
+              <a:buFont typeface="Wingdings" panose="05000000000000000000" pitchFamily="2" charset="2"/>
+              <a:buChar char="§"/>
+            </a:pPr>
+            <a:r>
+              <a:rPr lang="en-US" sz="2200" dirty="0" smtClean="0"/>
+              <a:t>When </a:t>
+            </a:r>
+            <a:r>
+              <a:rPr lang="en-US" sz="2200" b="1" dirty="0" smtClean="0"/>
+              <a:t>casting</a:t>
+            </a:r>
+            <a:r>
+              <a:rPr lang="en-US" sz="2200" dirty="0" smtClean="0"/>
+              <a:t> from one type to another </a:t>
+            </a:r>
+            <a:r>
+              <a:rPr lang="en-US" sz="2200" b="1" dirty="0" smtClean="0"/>
+              <a:t>fails</a:t>
+            </a:r>
+            <a:r>
+              <a:rPr lang="en-US" sz="2200" dirty="0" smtClean="0"/>
+              <a:t>, the CLR will                  </a:t>
+            </a:r>
+            <a:r>
+              <a:rPr lang="en-US" sz="2200" b="1" dirty="0" smtClean="0"/>
+              <a:t>throw an exception</a:t>
+            </a:r>
+          </a:p>
+          <a:p>
+            <a:pPr algn="l"/>
+            <a:endParaRPr lang="en-US" sz="2200" b="1" dirty="0"/>
+          </a:p>
+          <a:p>
+            <a:pPr algn="l"/>
+            <a:endParaRPr lang="en-US" sz="2200" b="1" dirty="0" smtClean="0"/>
+          </a:p>
+          <a:p>
+            <a:pPr marL="342900" indent="-342900" algn="l">
+              <a:buFont typeface="Wingdings" panose="05000000000000000000" pitchFamily="2" charset="2"/>
+              <a:buChar char="§"/>
+            </a:pPr>
+            <a:r>
+              <a:rPr lang="en-US" sz="2200" dirty="0" smtClean="0"/>
+              <a:t>When using the </a:t>
+            </a:r>
+            <a:r>
+              <a:rPr lang="en-US" sz="2200" b="1" dirty="0" smtClean="0"/>
+              <a:t>as</a:t>
+            </a:r>
+            <a:r>
+              <a:rPr lang="en-US" sz="2200" dirty="0" smtClean="0"/>
+              <a:t> operator in case of </a:t>
+            </a:r>
+            <a:r>
+              <a:rPr lang="en-US" sz="2200" b="1" dirty="0" smtClean="0"/>
+              <a:t>fail</a:t>
+            </a:r>
+            <a:r>
+              <a:rPr lang="en-US" sz="2200" dirty="0" smtClean="0"/>
+              <a:t>, </a:t>
+            </a:r>
+            <a:r>
+              <a:rPr lang="en-US" sz="2200" b="1" dirty="0" smtClean="0"/>
+              <a:t>no exception </a:t>
+            </a:r>
+            <a:r>
+              <a:rPr lang="en-US" sz="2200" dirty="0" smtClean="0"/>
+              <a:t>will be        thrown but the value </a:t>
+            </a:r>
+            <a:r>
+              <a:rPr lang="en-US" sz="2200" b="1" dirty="0" smtClean="0"/>
+              <a:t>will be null</a:t>
+            </a:r>
+          </a:p>
+          <a:p>
+            <a:pPr algn="l"/>
+            <a:endParaRPr lang="en-US" sz="2200" dirty="0" smtClean="0"/>
+          </a:p>
+          <a:p>
+            <a:pPr algn="l"/>
+            <a:endParaRPr lang="en-US" sz="2200" dirty="0"/>
+          </a:p>
+          <a:p>
+            <a:pPr algn="l"/>
+            <a:endParaRPr lang="en-US" sz="2200" dirty="0" smtClean="0"/>
+          </a:p>
+          <a:p>
+            <a:pPr marL="342900" indent="-342900" algn="l">
+              <a:buFont typeface="Wingdings" panose="05000000000000000000" pitchFamily="2" charset="2"/>
+              <a:buChar char="§"/>
+            </a:pPr>
+            <a:r>
+              <a:rPr lang="en-US" sz="2200" dirty="0" smtClean="0"/>
+              <a:t>The ‘</a:t>
+            </a:r>
+            <a:r>
+              <a:rPr lang="en-US" sz="2200" b="1" dirty="0" smtClean="0"/>
+              <a:t>is</a:t>
+            </a:r>
+            <a:r>
+              <a:rPr lang="en-US" sz="2200" dirty="0" smtClean="0"/>
+              <a:t>’ operator can check the type of variable</a:t>
+            </a:r>
+            <a:endParaRPr lang="en-US" sz="2200" dirty="0"/>
+          </a:p>
+        </p:txBody>
+      </p:sp>
+      <p:sp>
+        <p:nvSpPr>
+          <p:cNvPr id="4" name="Правоъгълник 3"/>
+          <p:cNvSpPr/>
+          <p:nvPr/>
+        </p:nvSpPr>
+        <p:spPr>
+          <a:xfrm>
+            <a:off x="467544" y="3147814"/>
+            <a:ext cx="7560840" cy="1152128"/>
+          </a:xfrm>
+          <a:prstGeom prst="rect">
+            <a:avLst/>
+          </a:prstGeom>
+          <a:solidFill>
+            <a:schemeClr val="accent2">
+              <a:alpha val="50000"/>
+            </a:schemeClr>
+          </a:solidFill>
+          <a:ln>
+            <a:noFill/>
+          </a:ln>
+        </p:spPr>
+        <p:style>
+          <a:lnRef idx="0">
+            <a:scrgbClr r="0" g="0" b="0"/>
+          </a:lnRef>
+          <a:fillRef idx="0">
+            <a:scrgbClr r="0" g="0" b="0"/>
+          </a:fillRef>
+          <a:effectRef idx="0">
+            <a:scrgbClr r="0" g="0" b="0"/>
+          </a:effectRef>
+          <a:fontRef idx="minor">
+            <a:schemeClr val="lt1"/>
+          </a:fontRef>
+        </p:style>
+        <p:txBody>
+          <a:bodyPr rtlCol="0" anchor="ctr"/>
+          <a:lstStyle/>
+          <a:p>
+            <a:r>
+              <a:rPr lang="en-US" sz="2000" b="1" dirty="0" smtClean="0">
+                <a:solidFill>
+                  <a:schemeClr val="bg2">
+                    <a:lumMod val="25000"/>
+                  </a:schemeClr>
+                </a:solidFill>
+              </a:rPr>
+              <a:t>//</a:t>
+            </a:r>
+            <a:r>
+              <a:rPr lang="en-US" sz="2000" b="1" dirty="0" smtClean="0">
+                <a:solidFill>
+                  <a:schemeClr val="tx1"/>
+                </a:solidFill>
+              </a:rPr>
+              <a:t> </a:t>
+            </a:r>
+            <a:r>
+              <a:rPr lang="en-US" sz="2000" b="1" dirty="0" smtClean="0">
+                <a:solidFill>
+                  <a:schemeClr val="bg2">
+                    <a:lumMod val="25000"/>
+                  </a:schemeClr>
+                </a:solidFill>
+              </a:rPr>
+              <a:t>The </a:t>
+            </a:r>
+            <a:r>
+              <a:rPr lang="en-US" sz="2000" b="1" dirty="0">
+                <a:solidFill>
+                  <a:schemeClr val="bg2">
+                    <a:lumMod val="25000"/>
+                  </a:schemeClr>
+                </a:solidFill>
+              </a:rPr>
+              <a:t>next line will be evaluated without exception </a:t>
+            </a:r>
+          </a:p>
+          <a:p>
+            <a:r>
+              <a:rPr lang="en-US" sz="2000" b="1" dirty="0" err="1">
+                <a:solidFill>
+                  <a:schemeClr val="tx1"/>
+                </a:solidFill>
+              </a:rPr>
+              <a:t>var</a:t>
+            </a:r>
+            <a:r>
+              <a:rPr lang="en-US" sz="2000" b="1" dirty="0">
+                <a:solidFill>
+                  <a:schemeClr val="tx1"/>
+                </a:solidFill>
+              </a:rPr>
+              <a:t> </a:t>
+            </a:r>
+            <a:r>
+              <a:rPr lang="en-US" sz="2000" b="1" dirty="0" err="1">
+                <a:solidFill>
+                  <a:schemeClr val="tx1"/>
+                </a:solidFill>
+              </a:rPr>
+              <a:t>numberAsInt</a:t>
+            </a:r>
+            <a:r>
+              <a:rPr lang="en-US" sz="2000" b="1" dirty="0">
+                <a:solidFill>
+                  <a:schemeClr val="tx1"/>
+                </a:solidFill>
+              </a:rPr>
+              <a:t> = number as </a:t>
+            </a:r>
+            <a:r>
+              <a:rPr lang="en-US" sz="2000" b="1" dirty="0" err="1">
+                <a:solidFill>
+                  <a:schemeClr val="tx1"/>
+                </a:solidFill>
+              </a:rPr>
+              <a:t>int</a:t>
+            </a:r>
+            <a:r>
+              <a:rPr lang="en-US" sz="2000" b="1" dirty="0">
+                <a:solidFill>
+                  <a:schemeClr val="tx1"/>
+                </a:solidFill>
+              </a:rPr>
+              <a:t>?;</a:t>
+            </a:r>
+          </a:p>
+          <a:p>
+            <a:r>
+              <a:rPr lang="en-US" sz="2000" b="1" dirty="0" smtClean="0">
+                <a:solidFill>
+                  <a:schemeClr val="bg2">
+                    <a:lumMod val="25000"/>
+                  </a:schemeClr>
+                </a:solidFill>
+              </a:rPr>
+              <a:t>//</a:t>
+            </a:r>
+            <a:r>
+              <a:rPr lang="en-US" sz="2000" b="1" dirty="0" smtClean="0">
+                <a:solidFill>
+                  <a:schemeClr val="tx1"/>
+                </a:solidFill>
+              </a:rPr>
+              <a:t> </a:t>
+            </a:r>
+            <a:r>
+              <a:rPr lang="en-US" sz="2000" b="1" dirty="0" smtClean="0">
+                <a:solidFill>
+                  <a:schemeClr val="bg2">
+                    <a:lumMod val="25000"/>
+                  </a:schemeClr>
+                </a:solidFill>
+              </a:rPr>
+              <a:t>Here </a:t>
+            </a:r>
+            <a:r>
+              <a:rPr lang="en-US" sz="2000" b="1" dirty="0">
+                <a:solidFill>
+                  <a:schemeClr val="bg2">
+                    <a:lumMod val="25000"/>
+                  </a:schemeClr>
+                </a:solidFill>
+              </a:rPr>
+              <a:t>number as </a:t>
+            </a:r>
+            <a:r>
+              <a:rPr lang="en-US" sz="2000" b="1" dirty="0" err="1">
+                <a:solidFill>
+                  <a:schemeClr val="bg2">
+                    <a:lumMod val="25000"/>
+                  </a:schemeClr>
+                </a:solidFill>
+              </a:rPr>
+              <a:t>int</a:t>
+            </a:r>
+            <a:r>
+              <a:rPr lang="en-US" sz="2000" b="1" dirty="0">
+                <a:solidFill>
+                  <a:schemeClr val="bg2">
+                    <a:lumMod val="25000"/>
+                  </a:schemeClr>
+                </a:solidFill>
+              </a:rPr>
+              <a:t> will be null because the cast is invalid</a:t>
+            </a:r>
+          </a:p>
+        </p:txBody>
+      </p:sp>
+      <p:sp>
+        <p:nvSpPr>
+          <p:cNvPr id="5" name="Правоъгълник 4"/>
+          <p:cNvSpPr/>
+          <p:nvPr/>
+        </p:nvSpPr>
+        <p:spPr>
+          <a:xfrm>
+            <a:off x="3059832" y="1306161"/>
+            <a:ext cx="6084168" cy="936104"/>
+          </a:xfrm>
+          <a:prstGeom prst="rect">
+            <a:avLst/>
+          </a:prstGeom>
+          <a:solidFill>
+            <a:schemeClr val="accent2">
+              <a:alpha val="50000"/>
+            </a:schemeClr>
+          </a:solidFill>
+          <a:ln>
+            <a:noFill/>
+          </a:ln>
+        </p:spPr>
+        <p:style>
+          <a:lnRef idx="0">
+            <a:scrgbClr r="0" g="0" b="0"/>
+          </a:lnRef>
+          <a:fillRef idx="0">
+            <a:scrgbClr r="0" g="0" b="0"/>
+          </a:fillRef>
+          <a:effectRef idx="0">
+            <a:scrgbClr r="0" g="0" b="0"/>
+          </a:effectRef>
+          <a:fontRef idx="minor">
+            <a:schemeClr val="lt1"/>
+          </a:fontRef>
+        </p:style>
+        <p:txBody>
+          <a:bodyPr rtlCol="0" anchor="ctr"/>
+          <a:lstStyle/>
+          <a:p>
+            <a:r>
+              <a:rPr lang="en-US" sz="2000" b="1" dirty="0">
+                <a:solidFill>
+                  <a:schemeClr val="tx1"/>
+                </a:solidFill>
+              </a:rPr>
+              <a:t>object number = “Five”;</a:t>
+            </a:r>
+          </a:p>
+          <a:p>
+            <a:r>
+              <a:rPr lang="en-US" sz="2000" b="1" dirty="0" err="1">
+                <a:solidFill>
+                  <a:schemeClr val="tx1"/>
+                </a:solidFill>
+              </a:rPr>
+              <a:t>var</a:t>
+            </a:r>
+            <a:r>
+              <a:rPr lang="en-US" sz="2000" b="1" dirty="0">
+                <a:solidFill>
+                  <a:schemeClr val="tx1"/>
+                </a:solidFill>
+              </a:rPr>
+              <a:t> </a:t>
+            </a:r>
+            <a:r>
+              <a:rPr lang="en-US" sz="2000" b="1" dirty="0" err="1">
+                <a:solidFill>
+                  <a:schemeClr val="tx1"/>
+                </a:solidFill>
+              </a:rPr>
+              <a:t>num</a:t>
+            </a:r>
+            <a:r>
+              <a:rPr lang="en-US" sz="2000" b="1" dirty="0">
+                <a:solidFill>
+                  <a:schemeClr val="tx1"/>
+                </a:solidFill>
+              </a:rPr>
+              <a:t> = (</a:t>
+            </a:r>
+            <a:r>
+              <a:rPr lang="en-US" sz="2000" b="1" dirty="0" err="1">
+                <a:solidFill>
+                  <a:schemeClr val="tx1"/>
+                </a:solidFill>
+              </a:rPr>
+              <a:t>int</a:t>
+            </a:r>
+            <a:r>
+              <a:rPr lang="en-US" sz="2000" b="1" dirty="0">
+                <a:solidFill>
+                  <a:schemeClr val="tx1"/>
+                </a:solidFill>
+              </a:rPr>
+              <a:t>?)number; // </a:t>
+            </a:r>
+            <a:r>
+              <a:rPr lang="en-US" sz="2000" b="1" dirty="0" err="1" smtClean="0">
+                <a:solidFill>
+                  <a:schemeClr val="tx1"/>
+                </a:solidFill>
+              </a:rPr>
+              <a:t>InvalidCastException</a:t>
+            </a:r>
+            <a:endParaRPr lang="en-US" sz="2000" b="1" dirty="0">
+              <a:solidFill>
+                <a:schemeClr val="tx1"/>
+              </a:solidFill>
+            </a:endParaRPr>
+          </a:p>
+        </p:txBody>
+      </p:sp>
+    </p:spTree>
+    <p:extLst>
+      <p:ext uri="{BB962C8B-B14F-4D97-AF65-F5344CB8AC3E}">
+        <p14:creationId xmlns:p14="http://schemas.microsoft.com/office/powerpoint/2010/main" val="3334422082"/>
       </p:ext>
     </p:extLst>
   </p:cSld>
@@ -6540,6 +7474,94 @@
             <p:ph type="body" sz="quarter" idx="10"/>
           </p:nvPr>
         </p:nvSpPr>
+        <p:spPr>
+          <a:xfrm>
+            <a:off x="3013559" y="699542"/>
+            <a:ext cx="3888432" cy="576064"/>
+          </a:xfrm>
+        </p:spPr>
+        <p:txBody>
+          <a:bodyPr/>
+          <a:lstStyle/>
+          <a:p>
+            <a:r>
+              <a:rPr lang="en-US" dirty="0" smtClean="0"/>
+              <a:t>TRAPS</a:t>
+            </a:r>
+            <a:endParaRPr lang="en-US" dirty="0"/>
+          </a:p>
+        </p:txBody>
+      </p:sp>
+      <p:pic>
+        <p:nvPicPr>
+          <p:cNvPr id="4" name="Картина 3"/>
+          <p:cNvPicPr>
+            <a:picLocks noChangeAspect="1"/>
+          </p:cNvPicPr>
+          <p:nvPr/>
+        </p:nvPicPr>
+        <p:blipFill>
+          <a:blip r:embed="rId2" cstate="print">
+            <a:extLst>
+              <a:ext uri="{28A0092B-C50C-407E-A947-70E740481C1C}">
+                <a14:useLocalDpi xmlns:a14="http://schemas.microsoft.com/office/drawing/2010/main" val="0"/>
+              </a:ext>
+            </a:extLst>
+          </a:blip>
+          <a:stretch>
+            <a:fillRect/>
+          </a:stretch>
+        </p:blipFill>
+        <p:spPr>
+          <a:xfrm>
+            <a:off x="3419872" y="1707654"/>
+            <a:ext cx="3075806" cy="3075806"/>
+          </a:xfrm>
+          <a:prstGeom prst="rect">
+            <a:avLst/>
+          </a:prstGeom>
+        </p:spPr>
+      </p:pic>
+    </p:spTree>
+    <p:extLst>
+      <p:ext uri="{BB962C8B-B14F-4D97-AF65-F5344CB8AC3E}">
+        <p14:creationId xmlns:p14="http://schemas.microsoft.com/office/powerpoint/2010/main" val="3999147421"/>
+      </p:ext>
+    </p:extLst>
+  </p:cSld>
+  <p:clrMapOvr>
+    <a:masterClrMapping/>
+  </p:clrMapOvr>
+</p:sld>
+</file>
+
+<file path=ppt/slides/slide4.xml><?xml version="1.0" encoding="utf-8"?>
+<p:sld xmlns:a="http://schemas.openxmlformats.org/drawingml/2006/main" xmlns:r="http://schemas.openxmlformats.org/officeDocument/2006/relationships" xmlns:p="http://schemas.openxmlformats.org/presentationml/2006/main">
+  <p:cSld>
+    <p:spTree>
+      <p:nvGrpSpPr>
+        <p:cNvPr id="1" name=""/>
+        <p:cNvGrpSpPr/>
+        <p:nvPr/>
+      </p:nvGrpSpPr>
+      <p:grpSpPr>
+        <a:xfrm>
+          <a:off x="0" y="0"/>
+          <a:ext cx="0" cy="0"/>
+          <a:chOff x="0" y="0"/>
+          <a:chExt cx="0" cy="0"/>
+        </a:xfrm>
+      </p:grpSpPr>
+      <p:sp>
+        <p:nvSpPr>
+          <p:cNvPr id="2" name="Текстов контейнер 1"/>
+          <p:cNvSpPr>
+            <a:spLocks noGrp="1"/>
+          </p:cNvSpPr>
+          <p:nvPr>
+            <p:ph type="body" sz="quarter" idx="10"/>
+          </p:nvPr>
+        </p:nvSpPr>
         <p:spPr/>
         <p:txBody>
           <a:bodyPr/>
@@ -6718,283 +7740,6 @@
 </p:sld>
 </file>
 
-<file path=ppt/slides/slide4.xml><?xml version="1.0" encoding="utf-8"?>
-<p:sld xmlns:a="http://schemas.openxmlformats.org/drawingml/2006/main" xmlns:r="http://schemas.openxmlformats.org/officeDocument/2006/relationships" xmlns:p="http://schemas.openxmlformats.org/presentationml/2006/main">
-  <p:cSld>
-    <p:spTree>
-      <p:nvGrpSpPr>
-        <p:cNvPr id="1" name=""/>
-        <p:cNvGrpSpPr/>
-        <p:nvPr/>
-      </p:nvGrpSpPr>
-      <p:grpSpPr>
-        <a:xfrm>
-          <a:off x="0" y="0"/>
-          <a:ext cx="0" cy="0"/>
-          <a:chOff x="0" y="0"/>
-          <a:chExt cx="0" cy="0"/>
-        </a:xfrm>
-      </p:grpSpPr>
-      <p:sp>
-        <p:nvSpPr>
-          <p:cNvPr id="2" name="Текстов контейнер 1"/>
-          <p:cNvSpPr>
-            <a:spLocks noGrp="1"/>
-          </p:cNvSpPr>
-          <p:nvPr>
-            <p:ph type="body" sz="quarter" idx="10"/>
-          </p:nvPr>
-        </p:nvSpPr>
-        <p:spPr/>
-        <p:txBody>
-          <a:bodyPr/>
-          <a:lstStyle/>
-          <a:p>
-            <a:r>
-              <a:rPr lang="en-US" b="1" dirty="0" smtClean="0">
-                <a:solidFill>
-                  <a:schemeClr val="tx1"/>
-                </a:solidFill>
-              </a:rPr>
-              <a:t>Check references in .NET</a:t>
-            </a:r>
-            <a:endParaRPr lang="en-US" b="1" dirty="0">
-              <a:solidFill>
-                <a:schemeClr val="tx1"/>
-              </a:solidFill>
-            </a:endParaRPr>
-          </a:p>
-        </p:txBody>
-      </p:sp>
-      <p:sp>
-        <p:nvSpPr>
-          <p:cNvPr id="5" name="Текстово поле 4"/>
-          <p:cNvSpPr txBox="1"/>
-          <p:nvPr/>
-        </p:nvSpPr>
-        <p:spPr>
-          <a:xfrm>
-            <a:off x="323528" y="915566"/>
-            <a:ext cx="8496944" cy="6247864"/>
-          </a:xfrm>
-          <a:prstGeom prst="rect">
-            <a:avLst/>
-          </a:prstGeom>
-          <a:noFill/>
-        </p:spPr>
-        <p:txBody>
-          <a:bodyPr wrap="square" rtlCol="0">
-            <a:spAutoFit/>
-          </a:bodyPr>
-          <a:lstStyle/>
-          <a:p>
-            <a:pPr marL="285750" indent="-285750">
-              <a:buFont typeface="Wingdings" panose="05000000000000000000" pitchFamily="2" charset="2"/>
-              <a:buChar char="§"/>
-            </a:pPr>
-            <a:r>
-              <a:rPr lang="en-US" sz="2200" dirty="0" smtClean="0"/>
-              <a:t>To check for </a:t>
-            </a:r>
-            <a:r>
-              <a:rPr lang="en-US" sz="2200" b="1" dirty="0" smtClean="0"/>
-              <a:t>reference equality </a:t>
-            </a:r>
-            <a:r>
-              <a:rPr lang="en-US" sz="2200" dirty="0" smtClean="0"/>
-              <a:t>use </a:t>
-            </a:r>
-            <a:r>
-              <a:rPr lang="en-US" sz="2200" b="1" i="1" dirty="0" err="1" smtClean="0"/>
-              <a:t>ReferenceEquals</a:t>
-            </a:r>
-            <a:r>
-              <a:rPr lang="en-US" sz="2200" b="1" i="1" dirty="0" smtClean="0"/>
-              <a:t>              </a:t>
-            </a:r>
-            <a:r>
-              <a:rPr lang="en-US" sz="2200" dirty="0" smtClean="0"/>
-              <a:t>(return Boolean)</a:t>
-            </a:r>
-          </a:p>
-          <a:p>
-            <a:r>
-              <a:rPr lang="en-US" sz="2200" dirty="0" smtClean="0"/>
-              <a:t>	</a:t>
-            </a:r>
-            <a:r>
-              <a:rPr lang="en-US" sz="2200" i="1" dirty="0" err="1" smtClean="0"/>
-              <a:t>Object.ReferenceEquals</a:t>
-            </a:r>
-            <a:r>
-              <a:rPr lang="en-US" sz="2200" i="1" dirty="0" smtClean="0"/>
-              <a:t>(</a:t>
-            </a:r>
-            <a:r>
-              <a:rPr lang="en-US" sz="2200" i="1" dirty="0" err="1" smtClean="0"/>
-              <a:t>firstObject</a:t>
-            </a:r>
-            <a:r>
-              <a:rPr lang="en-US" sz="2200" i="1" dirty="0" smtClean="0"/>
-              <a:t>, </a:t>
-            </a:r>
-            <a:r>
-              <a:rPr lang="en-US" sz="2200" i="1" dirty="0" err="1" smtClean="0"/>
-              <a:t>secondObject</a:t>
-            </a:r>
-            <a:r>
-              <a:rPr lang="en-US" sz="2200" i="1" dirty="0" smtClean="0"/>
-              <a:t>);</a:t>
-            </a:r>
-          </a:p>
-          <a:p>
-            <a:pPr marL="285750" indent="-285750">
-              <a:buFont typeface="Wingdings" panose="05000000000000000000" pitchFamily="2" charset="2"/>
-              <a:buChar char="§"/>
-            </a:pPr>
-            <a:r>
-              <a:rPr lang="en-US" sz="2200" dirty="0" smtClean="0"/>
-              <a:t>To check for </a:t>
-            </a:r>
-            <a:r>
-              <a:rPr lang="en-US" sz="2200" b="1" dirty="0" smtClean="0"/>
-              <a:t>value equality</a:t>
-            </a:r>
-            <a:r>
-              <a:rPr lang="en-US" sz="2200" dirty="0" smtClean="0"/>
-              <a:t>, you should generally use </a:t>
-            </a:r>
-            <a:r>
-              <a:rPr lang="en-US" sz="2200" b="1" i="1" dirty="0" smtClean="0"/>
-              <a:t>Equals</a:t>
-            </a:r>
-          </a:p>
-          <a:p>
-            <a:pPr marL="742950" lvl="1" indent="-285750">
-              <a:buFont typeface="Wingdings" panose="05000000000000000000" pitchFamily="2" charset="2"/>
-              <a:buChar char="§"/>
-            </a:pPr>
-            <a:r>
-              <a:rPr lang="en-US" sz="2200" b="1" i="1" dirty="0" smtClean="0"/>
-              <a:t>Equals</a:t>
-            </a:r>
-            <a:r>
-              <a:rPr lang="en-US" sz="2200" dirty="0" smtClean="0"/>
-              <a:t> as it is implemented by </a:t>
-            </a:r>
-            <a:r>
-              <a:rPr lang="en-US" sz="2200" b="1" i="1" dirty="0"/>
-              <a:t>O</a:t>
-            </a:r>
-            <a:r>
-              <a:rPr lang="en-US" sz="2200" b="1" i="1" dirty="0" smtClean="0"/>
-              <a:t>bject </a:t>
-            </a:r>
-            <a:r>
-              <a:rPr lang="en-US" sz="2200" dirty="0" smtClean="0"/>
-              <a:t>just preforms a          reference check (we should override it) </a:t>
-            </a:r>
-          </a:p>
-          <a:p>
-            <a:r>
-              <a:rPr lang="en-US" sz="2200" dirty="0" smtClean="0"/>
-              <a:t>	</a:t>
-            </a:r>
-            <a:r>
-              <a:rPr lang="en-US" sz="2200" i="1" dirty="0" err="1" smtClean="0"/>
-              <a:t>firstObject.Equals</a:t>
-            </a:r>
-            <a:r>
-              <a:rPr lang="en-US" sz="2200" i="1" dirty="0" smtClean="0"/>
-              <a:t>(</a:t>
-            </a:r>
-            <a:r>
-              <a:rPr lang="en-US" sz="2200" i="1" dirty="0" err="1" smtClean="0"/>
-              <a:t>secondObject</a:t>
-            </a:r>
-            <a:r>
-              <a:rPr lang="en-US" sz="2200" i="1" dirty="0" smtClean="0"/>
-              <a:t>) // true or false</a:t>
-            </a:r>
-          </a:p>
-          <a:p>
-            <a:pPr marL="285750" indent="-285750">
-              <a:buFont typeface="Wingdings" panose="05000000000000000000" pitchFamily="2" charset="2"/>
-              <a:buChar char="§"/>
-            </a:pPr>
-            <a:r>
-              <a:rPr lang="en-US" sz="2200" dirty="0" smtClean="0"/>
-              <a:t>By default, the operator == tests for reference equality (override  it for immutable types)</a:t>
-            </a:r>
-          </a:p>
-          <a:p>
-            <a:r>
-              <a:rPr lang="en-US" sz="2200" dirty="0" smtClean="0"/>
-              <a:t>	</a:t>
-            </a:r>
-            <a:r>
-              <a:rPr lang="en-US" sz="2200" i="1" dirty="0" err="1" smtClean="0"/>
-              <a:t>firstObject</a:t>
-            </a:r>
-            <a:r>
-              <a:rPr lang="en-US" sz="2200" i="1" dirty="0" smtClean="0"/>
-              <a:t> == </a:t>
-            </a:r>
-            <a:r>
-              <a:rPr lang="en-US" sz="2200" i="1" dirty="0" err="1" smtClean="0"/>
-              <a:t>secondObject</a:t>
-            </a:r>
-            <a:r>
-              <a:rPr lang="en-US" sz="2200" i="1" dirty="0" smtClean="0"/>
-              <a:t> // true or false</a:t>
-            </a:r>
-            <a:endParaRPr lang="en-US" sz="2200" i="1" dirty="0"/>
-          </a:p>
-          <a:p>
-            <a:endParaRPr lang="en-US" dirty="0" smtClean="0"/>
-          </a:p>
-          <a:p>
-            <a:endParaRPr lang="en-US" dirty="0"/>
-          </a:p>
-          <a:p>
-            <a:endParaRPr lang="en-US" dirty="0" smtClean="0"/>
-          </a:p>
-          <a:p>
-            <a:endParaRPr lang="en-US" dirty="0"/>
-          </a:p>
-          <a:p>
-            <a:endParaRPr lang="en-US" dirty="0" smtClean="0"/>
-          </a:p>
-          <a:p>
-            <a:endParaRPr lang="en-US" dirty="0"/>
-          </a:p>
-          <a:p>
-            <a:endParaRPr lang="en-US" dirty="0" smtClean="0"/>
-          </a:p>
-          <a:p>
-            <a:endParaRPr lang="en-US" dirty="0"/>
-          </a:p>
-          <a:p>
-            <a:endParaRPr lang="en-US" dirty="0" smtClean="0"/>
-          </a:p>
-          <a:p>
-            <a:endParaRPr lang="en-US" dirty="0"/>
-          </a:p>
-        </p:txBody>
-      </p:sp>
-    </p:spTree>
-    <p:extLst>
-      <p:ext uri="{BB962C8B-B14F-4D97-AF65-F5344CB8AC3E}">
-        <p14:creationId xmlns:p14="http://schemas.microsoft.com/office/powerpoint/2010/main" val="659858673"/>
-      </p:ext>
-    </p:extLst>
-  </p:cSld>
-  <p:clrMapOvr>
-    <a:masterClrMapping/>
-  </p:clrMapOvr>
-</p:sld>
-</file>
-
 <file path=ppt/slides/slide5.xml><?xml version="1.0" encoding="utf-8"?>
 <p:sld xmlns:a="http://schemas.openxmlformats.org/drawingml/2006/main" xmlns:r="http://schemas.openxmlformats.org/officeDocument/2006/relationships" xmlns:p="http://schemas.openxmlformats.org/presentationml/2006/main">
   <p:cSld>
@@ -7033,6 +7778,283 @@
                   <a:schemeClr val="tx1"/>
                 </a:solidFill>
               </a:rPr>
+              <a:t>Check references in .NET</a:t>
+            </a:r>
+            <a:endParaRPr lang="en-US" b="1" dirty="0">
+              <a:solidFill>
+                <a:schemeClr val="tx1"/>
+              </a:solidFill>
+            </a:endParaRPr>
+          </a:p>
+        </p:txBody>
+      </p:sp>
+      <p:sp>
+        <p:nvSpPr>
+          <p:cNvPr id="5" name="Текстово поле 4"/>
+          <p:cNvSpPr txBox="1"/>
+          <p:nvPr/>
+        </p:nvSpPr>
+        <p:spPr>
+          <a:xfrm>
+            <a:off x="323528" y="915566"/>
+            <a:ext cx="8496944" cy="6247864"/>
+          </a:xfrm>
+          <a:prstGeom prst="rect">
+            <a:avLst/>
+          </a:prstGeom>
+          <a:noFill/>
+        </p:spPr>
+        <p:txBody>
+          <a:bodyPr wrap="square" rtlCol="0">
+            <a:spAutoFit/>
+          </a:bodyPr>
+          <a:lstStyle/>
+          <a:p>
+            <a:pPr marL="285750" indent="-285750">
+              <a:buFont typeface="Wingdings" panose="05000000000000000000" pitchFamily="2" charset="2"/>
+              <a:buChar char="§"/>
+            </a:pPr>
+            <a:r>
+              <a:rPr lang="en-US" sz="2200" dirty="0" smtClean="0"/>
+              <a:t>To check for </a:t>
+            </a:r>
+            <a:r>
+              <a:rPr lang="en-US" sz="2200" b="1" dirty="0" smtClean="0"/>
+              <a:t>reference equality </a:t>
+            </a:r>
+            <a:r>
+              <a:rPr lang="en-US" sz="2200" dirty="0" smtClean="0"/>
+              <a:t>use </a:t>
+            </a:r>
+            <a:r>
+              <a:rPr lang="en-US" sz="2200" b="1" i="1" dirty="0" err="1" smtClean="0"/>
+              <a:t>ReferenceEquals</a:t>
+            </a:r>
+            <a:r>
+              <a:rPr lang="en-US" sz="2200" b="1" i="1" dirty="0" smtClean="0"/>
+              <a:t>              </a:t>
+            </a:r>
+            <a:r>
+              <a:rPr lang="en-US" sz="2200" dirty="0" smtClean="0"/>
+              <a:t>(return Boolean)</a:t>
+            </a:r>
+          </a:p>
+          <a:p>
+            <a:r>
+              <a:rPr lang="en-US" sz="2200" dirty="0" smtClean="0"/>
+              <a:t>	</a:t>
+            </a:r>
+            <a:r>
+              <a:rPr lang="en-US" sz="2200" i="1" dirty="0" err="1" smtClean="0"/>
+              <a:t>Object.ReferenceEquals</a:t>
+            </a:r>
+            <a:r>
+              <a:rPr lang="en-US" sz="2200" i="1" dirty="0" smtClean="0"/>
+              <a:t>(</a:t>
+            </a:r>
+            <a:r>
+              <a:rPr lang="en-US" sz="2200" i="1" dirty="0" err="1" smtClean="0"/>
+              <a:t>firstObject</a:t>
+            </a:r>
+            <a:r>
+              <a:rPr lang="en-US" sz="2200" i="1" dirty="0" smtClean="0"/>
+              <a:t>, </a:t>
+            </a:r>
+            <a:r>
+              <a:rPr lang="en-US" sz="2200" i="1" dirty="0" err="1" smtClean="0"/>
+              <a:t>secondObject</a:t>
+            </a:r>
+            <a:r>
+              <a:rPr lang="en-US" sz="2200" i="1" dirty="0" smtClean="0"/>
+              <a:t>);</a:t>
+            </a:r>
+          </a:p>
+          <a:p>
+            <a:pPr marL="285750" indent="-285750">
+              <a:buFont typeface="Wingdings" panose="05000000000000000000" pitchFamily="2" charset="2"/>
+              <a:buChar char="§"/>
+            </a:pPr>
+            <a:r>
+              <a:rPr lang="en-US" sz="2200" dirty="0" smtClean="0"/>
+              <a:t>To check for </a:t>
+            </a:r>
+            <a:r>
+              <a:rPr lang="en-US" sz="2200" b="1" dirty="0" smtClean="0"/>
+              <a:t>value equality</a:t>
+            </a:r>
+            <a:r>
+              <a:rPr lang="en-US" sz="2200" dirty="0" smtClean="0"/>
+              <a:t>, you should generally use </a:t>
+            </a:r>
+            <a:r>
+              <a:rPr lang="en-US" sz="2200" b="1" i="1" dirty="0" smtClean="0"/>
+              <a:t>Equals</a:t>
+            </a:r>
+          </a:p>
+          <a:p>
+            <a:pPr marL="742950" lvl="1" indent="-285750">
+              <a:buFont typeface="Wingdings" panose="05000000000000000000" pitchFamily="2" charset="2"/>
+              <a:buChar char="§"/>
+            </a:pPr>
+            <a:r>
+              <a:rPr lang="en-US" sz="2200" b="1" i="1" dirty="0" smtClean="0"/>
+              <a:t>Equals</a:t>
+            </a:r>
+            <a:r>
+              <a:rPr lang="en-US" sz="2200" dirty="0" smtClean="0"/>
+              <a:t> as it is implemented by </a:t>
+            </a:r>
+            <a:r>
+              <a:rPr lang="en-US" sz="2200" b="1" i="1" dirty="0"/>
+              <a:t>O</a:t>
+            </a:r>
+            <a:r>
+              <a:rPr lang="en-US" sz="2200" b="1" i="1" dirty="0" smtClean="0"/>
+              <a:t>bject </a:t>
+            </a:r>
+            <a:r>
+              <a:rPr lang="en-US" sz="2200" dirty="0" smtClean="0"/>
+              <a:t>just preforms a          reference check (we should override it) </a:t>
+            </a:r>
+          </a:p>
+          <a:p>
+            <a:r>
+              <a:rPr lang="en-US" sz="2200" dirty="0" smtClean="0"/>
+              <a:t>	</a:t>
+            </a:r>
+            <a:r>
+              <a:rPr lang="en-US" sz="2200" i="1" dirty="0" err="1" smtClean="0"/>
+              <a:t>firstObject.Equals</a:t>
+            </a:r>
+            <a:r>
+              <a:rPr lang="en-US" sz="2200" i="1" dirty="0" smtClean="0"/>
+              <a:t>(</a:t>
+            </a:r>
+            <a:r>
+              <a:rPr lang="en-US" sz="2200" i="1" dirty="0" err="1" smtClean="0"/>
+              <a:t>secondObject</a:t>
+            </a:r>
+            <a:r>
+              <a:rPr lang="en-US" sz="2200" i="1" dirty="0" smtClean="0"/>
+              <a:t>) // true or false</a:t>
+            </a:r>
+          </a:p>
+          <a:p>
+            <a:pPr marL="285750" indent="-285750">
+              <a:buFont typeface="Wingdings" panose="05000000000000000000" pitchFamily="2" charset="2"/>
+              <a:buChar char="§"/>
+            </a:pPr>
+            <a:r>
+              <a:rPr lang="en-US" sz="2200" dirty="0" smtClean="0"/>
+              <a:t>By default, the operator == tests for reference equality (override  it for immutable types)</a:t>
+            </a:r>
+          </a:p>
+          <a:p>
+            <a:r>
+              <a:rPr lang="en-US" sz="2200" dirty="0" smtClean="0"/>
+              <a:t>	</a:t>
+            </a:r>
+            <a:r>
+              <a:rPr lang="en-US" sz="2200" i="1" dirty="0" err="1" smtClean="0"/>
+              <a:t>firstObject</a:t>
+            </a:r>
+            <a:r>
+              <a:rPr lang="en-US" sz="2200" i="1" dirty="0" smtClean="0"/>
+              <a:t> == </a:t>
+            </a:r>
+            <a:r>
+              <a:rPr lang="en-US" sz="2200" i="1" dirty="0" err="1" smtClean="0"/>
+              <a:t>secondObject</a:t>
+            </a:r>
+            <a:r>
+              <a:rPr lang="en-US" sz="2200" i="1" dirty="0" smtClean="0"/>
+              <a:t> // true or false</a:t>
+            </a:r>
+            <a:endParaRPr lang="en-US" sz="2200" i="1" dirty="0"/>
+          </a:p>
+          <a:p>
+            <a:endParaRPr lang="en-US" dirty="0" smtClean="0"/>
+          </a:p>
+          <a:p>
+            <a:endParaRPr lang="en-US" dirty="0"/>
+          </a:p>
+          <a:p>
+            <a:endParaRPr lang="en-US" dirty="0" smtClean="0"/>
+          </a:p>
+          <a:p>
+            <a:endParaRPr lang="en-US" dirty="0"/>
+          </a:p>
+          <a:p>
+            <a:endParaRPr lang="en-US" dirty="0" smtClean="0"/>
+          </a:p>
+          <a:p>
+            <a:endParaRPr lang="en-US" dirty="0"/>
+          </a:p>
+          <a:p>
+            <a:endParaRPr lang="en-US" dirty="0" smtClean="0"/>
+          </a:p>
+          <a:p>
+            <a:endParaRPr lang="en-US" dirty="0"/>
+          </a:p>
+          <a:p>
+            <a:endParaRPr lang="en-US" dirty="0" smtClean="0"/>
+          </a:p>
+          <a:p>
+            <a:endParaRPr lang="en-US" dirty="0"/>
+          </a:p>
+        </p:txBody>
+      </p:sp>
+    </p:spTree>
+    <p:extLst>
+      <p:ext uri="{BB962C8B-B14F-4D97-AF65-F5344CB8AC3E}">
+        <p14:creationId xmlns:p14="http://schemas.microsoft.com/office/powerpoint/2010/main" val="659858673"/>
+      </p:ext>
+    </p:extLst>
+  </p:cSld>
+  <p:clrMapOvr>
+    <a:masterClrMapping/>
+  </p:clrMapOvr>
+</p:sld>
+</file>
+
+<file path=ppt/slides/slide6.xml><?xml version="1.0" encoding="utf-8"?>
+<p:sld xmlns:a="http://schemas.openxmlformats.org/drawingml/2006/main" xmlns:r="http://schemas.openxmlformats.org/officeDocument/2006/relationships" xmlns:p="http://schemas.openxmlformats.org/presentationml/2006/main">
+  <p:cSld>
+    <p:spTree>
+      <p:nvGrpSpPr>
+        <p:cNvPr id="1" name=""/>
+        <p:cNvGrpSpPr/>
+        <p:nvPr/>
+      </p:nvGrpSpPr>
+      <p:grpSpPr>
+        <a:xfrm>
+          <a:off x="0" y="0"/>
+          <a:ext cx="0" cy="0"/>
+          <a:chOff x="0" y="0"/>
+          <a:chExt cx="0" cy="0"/>
+        </a:xfrm>
+      </p:grpSpPr>
+      <p:sp>
+        <p:nvSpPr>
+          <p:cNvPr id="2" name="Текстов контейнер 1"/>
+          <p:cNvSpPr>
+            <a:spLocks noGrp="1"/>
+          </p:cNvSpPr>
+          <p:nvPr>
+            <p:ph type="body" sz="quarter" idx="10"/>
+          </p:nvPr>
+        </p:nvSpPr>
+        <p:spPr/>
+        <p:txBody>
+          <a:bodyPr/>
+          <a:lstStyle/>
+          <a:p>
+            <a:r>
+              <a:rPr lang="en-US" b="1" dirty="0" smtClean="0">
+                <a:solidFill>
+                  <a:schemeClr val="tx1"/>
+                </a:solidFill>
+              </a:rPr>
               <a:t>Comparing </a:t>
             </a:r>
             <a:r>
@@ -7247,7 +8269,7 @@
 </p:sld>
 </file>
 
-<file path=ppt/slides/slide6.xml><?xml version="1.0" encoding="utf-8"?>
+<file path=ppt/slides/slide7.xml><?xml version="1.0" encoding="utf-8"?>
 <p:sld xmlns:a="http://schemas.openxmlformats.org/drawingml/2006/main" xmlns:r="http://schemas.openxmlformats.org/officeDocument/2006/relationships" xmlns:p="http://schemas.openxmlformats.org/presentationml/2006/main">
   <p:cSld>
     <p:spTree>
@@ -7710,315 +8732,6 @@
     <p:extLst>
       <p:ext uri="{BB962C8B-B14F-4D97-AF65-F5344CB8AC3E}">
         <p14:creationId xmlns:p14="http://schemas.microsoft.com/office/powerpoint/2010/main" val="2991388255"/>
-      </p:ext>
-    </p:extLst>
-  </p:cSld>
-  <p:clrMapOvr>
-    <a:masterClrMapping/>
-  </p:clrMapOvr>
-</p:sld>
-</file>
-
-<file path=ppt/slides/slide7.xml><?xml version="1.0" encoding="utf-8"?>
-<p:sld xmlns:a="http://schemas.openxmlformats.org/drawingml/2006/main" xmlns:r="http://schemas.openxmlformats.org/officeDocument/2006/relationships" xmlns:p="http://schemas.openxmlformats.org/presentationml/2006/main">
-  <p:cSld>
-    <p:spTree>
-      <p:nvGrpSpPr>
-        <p:cNvPr id="1" name=""/>
-        <p:cNvGrpSpPr/>
-        <p:nvPr/>
-      </p:nvGrpSpPr>
-      <p:grpSpPr>
-        <a:xfrm>
-          <a:off x="0" y="0"/>
-          <a:ext cx="0" cy="0"/>
-          <a:chOff x="0" y="0"/>
-          <a:chExt cx="0" cy="0"/>
-        </a:xfrm>
-      </p:grpSpPr>
-      <p:sp>
-        <p:nvSpPr>
-          <p:cNvPr id="2" name="Текстов контейнер 1"/>
-          <p:cNvSpPr>
-            <a:spLocks noGrp="1"/>
-          </p:cNvSpPr>
-          <p:nvPr>
-            <p:ph type="body" sz="quarter" idx="10"/>
-          </p:nvPr>
-        </p:nvSpPr>
-        <p:spPr/>
-        <p:txBody>
-          <a:bodyPr/>
-          <a:lstStyle/>
-          <a:p>
-            <a:r>
-              <a:rPr lang="en-US" b="1" i="1" dirty="0" smtClean="0">
-                <a:solidFill>
-                  <a:schemeClr val="tx1"/>
-                </a:solidFill>
-              </a:rPr>
-              <a:t>Preserving stack trace	</a:t>
-            </a:r>
-            <a:endParaRPr lang="en-US" b="1" i="1" dirty="0">
-              <a:solidFill>
-                <a:schemeClr val="tx1"/>
-              </a:solidFill>
-            </a:endParaRPr>
-          </a:p>
-        </p:txBody>
-      </p:sp>
-      <p:sp>
-        <p:nvSpPr>
-          <p:cNvPr id="3" name="Текстов контейнер 2"/>
-          <p:cNvSpPr>
-            <a:spLocks noGrp="1"/>
-          </p:cNvSpPr>
-          <p:nvPr>
-            <p:ph type="body" sz="quarter" idx="11"/>
-          </p:nvPr>
-        </p:nvSpPr>
-        <p:spPr>
-          <a:xfrm>
-            <a:off x="0" y="699542"/>
-            <a:ext cx="9144000" cy="4104456"/>
-          </a:xfrm>
-        </p:spPr>
-        <p:txBody>
-          <a:bodyPr anchor="t"/>
-          <a:lstStyle/>
-          <a:p>
-            <a:pPr marL="342900" indent="-342900" algn="l">
-              <a:buFont typeface="Wingdings" panose="05000000000000000000" pitchFamily="2" charset="2"/>
-              <a:buChar char="§"/>
-            </a:pPr>
-            <a:r>
-              <a:rPr lang="en-US" sz="2000" dirty="0" smtClean="0">
-                <a:solidFill>
-                  <a:schemeClr val="tx1"/>
-                </a:solidFill>
-              </a:rPr>
-              <a:t>These two same blocks simply </a:t>
-            </a:r>
-            <a:r>
-              <a:rPr lang="en-US" sz="2000" b="1" dirty="0" smtClean="0">
-                <a:solidFill>
-                  <a:schemeClr val="tx1"/>
-                </a:solidFill>
-              </a:rPr>
-              <a:t>re-throw</a:t>
-            </a:r>
-            <a:r>
-              <a:rPr lang="en-US" sz="2000" dirty="0" smtClean="0">
-                <a:solidFill>
-                  <a:schemeClr val="tx1"/>
-                </a:solidFill>
-              </a:rPr>
-              <a:t> the exception keeping the                 </a:t>
-            </a:r>
-            <a:r>
-              <a:rPr lang="en-US" sz="2000" b="1" dirty="0" smtClean="0">
-                <a:solidFill>
-                  <a:schemeClr val="tx1"/>
-                </a:solidFill>
-              </a:rPr>
-              <a:t>stack trace</a:t>
-            </a:r>
-            <a:r>
-              <a:rPr lang="en-US" sz="2000" dirty="0" smtClean="0">
-                <a:solidFill>
-                  <a:schemeClr val="tx1"/>
-                </a:solidFill>
-              </a:rPr>
-              <a:t>:</a:t>
-            </a:r>
-          </a:p>
-          <a:p>
-            <a:pPr algn="l"/>
-            <a:r>
-              <a:rPr lang="en-US" sz="2000" dirty="0" smtClean="0">
-                <a:solidFill>
-                  <a:schemeClr val="tx1"/>
-                </a:solidFill>
-              </a:rPr>
-              <a:t>	</a:t>
-            </a:r>
-            <a:r>
-              <a:rPr lang="en-US" sz="2000" b="1" dirty="0" smtClean="0">
-                <a:solidFill>
-                  <a:schemeClr val="tx1"/>
-                </a:solidFill>
-              </a:rPr>
-              <a:t>try { </a:t>
-            </a:r>
-            <a:r>
-              <a:rPr lang="en-150" sz="2000" b="1" dirty="0" smtClean="0">
-                <a:solidFill>
-                  <a:schemeClr val="tx1"/>
-                </a:solidFill>
-              </a:rPr>
-              <a:t>…</a:t>
-            </a:r>
-            <a:r>
-              <a:rPr lang="en-US" sz="2000" b="1" dirty="0" smtClean="0">
-                <a:solidFill>
-                  <a:schemeClr val="tx1"/>
-                </a:solidFill>
-              </a:rPr>
-              <a:t> } catch () { throw; }</a:t>
-            </a:r>
-          </a:p>
-          <a:p>
-            <a:pPr algn="l"/>
-            <a:r>
-              <a:rPr lang="en-US" sz="2000" b="1" dirty="0" smtClean="0">
-                <a:solidFill>
-                  <a:schemeClr val="tx1"/>
-                </a:solidFill>
-              </a:rPr>
-              <a:t>	try { </a:t>
-            </a:r>
-            <a:r>
-              <a:rPr lang="en-150" sz="2000" b="1" dirty="0" smtClean="0">
-                <a:solidFill>
-                  <a:schemeClr val="tx1"/>
-                </a:solidFill>
-              </a:rPr>
-              <a:t>…</a:t>
-            </a:r>
-            <a:r>
-              <a:rPr lang="en-US" sz="2000" b="1" dirty="0" smtClean="0">
-                <a:solidFill>
-                  <a:schemeClr val="tx1"/>
-                </a:solidFill>
-              </a:rPr>
-              <a:t> } catch (Exception e) { throw; }</a:t>
-            </a:r>
-          </a:p>
-          <a:p>
-            <a:pPr marL="342900" indent="-342900" algn="l">
-              <a:buFont typeface="Wingdings" panose="05000000000000000000" pitchFamily="2" charset="2"/>
-              <a:buChar char="§"/>
-            </a:pPr>
-            <a:r>
-              <a:rPr lang="en-US" sz="2000" dirty="0" smtClean="0">
-                <a:solidFill>
-                  <a:schemeClr val="tx1"/>
-                </a:solidFill>
-              </a:rPr>
-              <a:t>The next block is different:</a:t>
-            </a:r>
-          </a:p>
-          <a:p>
-            <a:pPr algn="l"/>
-            <a:r>
-              <a:rPr lang="en-US" sz="2000" dirty="0" smtClean="0">
-                <a:solidFill>
-                  <a:schemeClr val="tx1"/>
-                </a:solidFill>
-              </a:rPr>
-              <a:t>	</a:t>
-            </a:r>
-            <a:r>
-              <a:rPr lang="en-US" sz="2000" b="1" dirty="0" smtClean="0">
-                <a:solidFill>
-                  <a:schemeClr val="tx1"/>
-                </a:solidFill>
-              </a:rPr>
-              <a:t>try { </a:t>
-            </a:r>
-            <a:r>
-              <a:rPr lang="en-150" sz="2000" b="1" dirty="0" smtClean="0">
-                <a:solidFill>
-                  <a:schemeClr val="tx1"/>
-                </a:solidFill>
-              </a:rPr>
-              <a:t>…</a:t>
-            </a:r>
-            <a:r>
-              <a:rPr lang="en-US" sz="2000" b="1" dirty="0" smtClean="0">
-                <a:solidFill>
-                  <a:schemeClr val="tx1"/>
-                </a:solidFill>
-              </a:rPr>
-              <a:t> } catch (Exception ex) { throw ex; }</a:t>
-            </a:r>
-          </a:p>
-          <a:p>
-            <a:pPr marL="342900" indent="-342900" algn="l">
-              <a:buFont typeface="Wingdings" panose="05000000000000000000" pitchFamily="2" charset="2"/>
-              <a:buChar char="§"/>
-            </a:pPr>
-            <a:r>
-              <a:rPr lang="en-US" sz="2000" dirty="0" smtClean="0">
-                <a:solidFill>
-                  <a:schemeClr val="tx1"/>
-                </a:solidFill>
-              </a:rPr>
-              <a:t>It will change the </a:t>
-            </a:r>
-            <a:r>
-              <a:rPr lang="en-US" sz="2000" b="1" dirty="0" smtClean="0">
-                <a:solidFill>
-                  <a:schemeClr val="tx1"/>
-                </a:solidFill>
-              </a:rPr>
-              <a:t>source</a:t>
-            </a:r>
-            <a:r>
-              <a:rPr lang="en-US" sz="2000" dirty="0" smtClean="0">
-                <a:solidFill>
-                  <a:schemeClr val="tx1"/>
-                </a:solidFill>
-              </a:rPr>
-              <a:t> and the </a:t>
-            </a:r>
-            <a:r>
-              <a:rPr lang="en-US" sz="2000" b="1" dirty="0" smtClean="0">
-                <a:solidFill>
-                  <a:schemeClr val="tx1"/>
-                </a:solidFill>
-              </a:rPr>
-              <a:t>stack trace</a:t>
-            </a:r>
-          </a:p>
-          <a:p>
-            <a:pPr marL="1085850" lvl="1" indent="-342900">
-              <a:buFont typeface="Wingdings" panose="05000000000000000000" pitchFamily="2" charset="2"/>
-              <a:buChar char="§"/>
-            </a:pPr>
-            <a:r>
-              <a:rPr lang="en-US" sz="2000" dirty="0" smtClean="0"/>
-              <a:t>It will appear that the exception has been thrown from the current method from that line</a:t>
-            </a:r>
-          </a:p>
-          <a:p>
-            <a:pPr marL="342900" indent="-342900" algn="l">
-              <a:buFont typeface="Wingdings" panose="05000000000000000000" pitchFamily="2" charset="2"/>
-              <a:buChar char="§"/>
-            </a:pPr>
-            <a:r>
-              <a:rPr lang="en-US" sz="2000" dirty="0" smtClean="0">
-                <a:solidFill>
-                  <a:schemeClr val="tx1"/>
-                </a:solidFill>
-              </a:rPr>
-              <a:t>Prefer creating </a:t>
-            </a:r>
-            <a:r>
-              <a:rPr lang="en-US" sz="2000" b="1" dirty="0" smtClean="0">
-                <a:solidFill>
-                  <a:schemeClr val="tx1"/>
-                </a:solidFill>
-              </a:rPr>
-              <a:t>new custom exception</a:t>
-            </a:r>
-          </a:p>
-        </p:txBody>
-      </p:sp>
-    </p:spTree>
-    <p:extLst>
-      <p:ext uri="{BB962C8B-B14F-4D97-AF65-F5344CB8AC3E}">
-        <p14:creationId xmlns:p14="http://schemas.microsoft.com/office/powerpoint/2010/main" val="2421763994"/>
       </p:ext>
     </p:extLst>
   </p:cSld>
@@ -8061,14 +8774,14 @@
           <a:lstStyle/>
           <a:p>
             <a:r>
-              <a:rPr lang="en-US" dirty="0" smtClean="0">
-                <a:solidFill>
-                  <a:schemeClr val="tx1"/>
-                </a:solidFill>
-              </a:rPr>
-              <a:t>Exceptions &amp; Static constructors</a:t>
-            </a:r>
-            <a:endParaRPr lang="en-US" dirty="0">
+              <a:rPr lang="en-US" b="1" i="1" dirty="0" smtClean="0">
+                <a:solidFill>
+                  <a:schemeClr val="tx1"/>
+                </a:solidFill>
+              </a:rPr>
+              <a:t>Preserving stack trace	</a:t>
+            </a:r>
+            <a:endParaRPr lang="en-US" b="1" i="1" dirty="0">
               <a:solidFill>
                 <a:schemeClr val="tx1"/>
               </a:solidFill>
@@ -8088,15 +8801,15 @@
         </p:nvSpPr>
         <p:spPr>
           <a:xfrm>
-            <a:off x="0" y="843558"/>
-            <a:ext cx="9144000" cy="3888432"/>
+            <a:off x="0" y="699542"/>
+            <a:ext cx="9144000" cy="4104456"/>
           </a:xfrm>
         </p:spPr>
         <p:txBody>
           <a:bodyPr anchor="t"/>
           <a:lstStyle/>
           <a:p>
-            <a:pPr marL="285750" indent="-285750" algn="l">
+            <a:pPr marL="342900" indent="-342900" algn="l">
               <a:buFont typeface="Wingdings" panose="05000000000000000000" pitchFamily="2" charset="2"/>
               <a:buChar char="§"/>
             </a:pPr>
@@ -8106,135 +8819,212 @@
                   <a:schemeClr val="tx1"/>
                 </a:solidFill>
               </a:rPr>
-              <a:t>A static constructor is called automatically to initialize the class before:</a:t>
-            </a:r>
-          </a:p>
-          <a:p>
-            <a:pPr marL="1028700" lvl="1">
+              <a:t>These two same blocks simply </a:t>
+            </a:r>
+            <a:r>
+              <a:rPr lang="en-US" sz="2000" b="1" dirty="0" smtClean="0">
+                <a:solidFill>
+                  <a:schemeClr val="tx1"/>
+                </a:solidFill>
+              </a:rPr>
+              <a:t>re-throw</a:t>
+            </a:r>
+            <a:r>
+              <a:rPr lang="en-US" sz="2000" dirty="0" smtClean="0">
+                <a:solidFill>
+                  <a:schemeClr val="tx1"/>
+                </a:solidFill>
+              </a:rPr>
+              <a:t> the exception keeping the                 </a:t>
+            </a:r>
+            <a:r>
+              <a:rPr lang="en-US" sz="2000" b="1" dirty="0" smtClean="0">
+                <a:solidFill>
+                  <a:schemeClr val="tx1"/>
+                </a:solidFill>
+              </a:rPr>
+              <a:t>stack trace</a:t>
+            </a:r>
+            <a:r>
+              <a:rPr lang="en-US" sz="2000" dirty="0" smtClean="0">
+                <a:solidFill>
+                  <a:schemeClr val="tx1"/>
+                </a:solidFill>
+              </a:rPr>
+              <a:t>:</a:t>
+            </a:r>
+          </a:p>
+          <a:p>
+            <a:pPr algn="l"/>
+            <a:r>
+              <a:rPr lang="en-US" sz="2000" dirty="0" smtClean="0">
+                <a:solidFill>
+                  <a:schemeClr val="tx1"/>
+                </a:solidFill>
+              </a:rPr>
+              <a:t>	</a:t>
+            </a:r>
+            <a:r>
+              <a:rPr lang="en-US" sz="2000" b="1" dirty="0" smtClean="0">
+                <a:solidFill>
+                  <a:schemeClr val="tx1"/>
+                </a:solidFill>
+              </a:rPr>
+              <a:t>try { </a:t>
+            </a:r>
+            <a:r>
+              <a:rPr lang="en-150" sz="2000" b="1" dirty="0" smtClean="0">
+                <a:solidFill>
+                  <a:schemeClr val="tx1"/>
+                </a:solidFill>
+              </a:rPr>
+              <a:t>…</a:t>
+            </a:r>
+            <a:r>
+              <a:rPr lang="en-US" sz="2000" b="1" dirty="0" smtClean="0">
+                <a:solidFill>
+                  <a:schemeClr val="tx1"/>
+                </a:solidFill>
+              </a:rPr>
+              <a:t> } catch () { throw; }</a:t>
+            </a:r>
+          </a:p>
+          <a:p>
+            <a:pPr algn="l"/>
+            <a:r>
+              <a:rPr lang="en-US" sz="2000" b="1" dirty="0" smtClean="0">
+                <a:solidFill>
+                  <a:schemeClr val="tx1"/>
+                </a:solidFill>
+              </a:rPr>
+              <a:t>	try { </a:t>
+            </a:r>
+            <a:r>
+              <a:rPr lang="en-150" sz="2000" b="1" dirty="0" smtClean="0">
+                <a:solidFill>
+                  <a:schemeClr val="tx1"/>
+                </a:solidFill>
+              </a:rPr>
+              <a:t>…</a:t>
+            </a:r>
+            <a:r>
+              <a:rPr lang="en-US" sz="2000" b="1" dirty="0" smtClean="0">
+                <a:solidFill>
+                  <a:schemeClr val="tx1"/>
+                </a:solidFill>
+              </a:rPr>
+              <a:t> } catch (Exception e) { throw; }</a:t>
+            </a:r>
+          </a:p>
+          <a:p>
+            <a:pPr marL="342900" indent="-342900" algn="l">
               <a:buFont typeface="Wingdings" panose="05000000000000000000" pitchFamily="2" charset="2"/>
               <a:buChar char="§"/>
             </a:pPr>
             <a:r>
-              <a:rPr lang="en-US" sz="2000" dirty="0" smtClean="0"/>
-              <a:t>The first </a:t>
-            </a:r>
-            <a:r>
-              <a:rPr lang="en-US" sz="2000" b="1" dirty="0" smtClean="0"/>
-              <a:t>instance</a:t>
-            </a:r>
-            <a:r>
-              <a:rPr lang="en-US" sz="2000" dirty="0" smtClean="0"/>
-              <a:t> is created</a:t>
-            </a:r>
-          </a:p>
-          <a:p>
-            <a:pPr marL="1028700" lvl="1">
+              <a:rPr lang="en-US" sz="2000" dirty="0" smtClean="0">
+                <a:solidFill>
+                  <a:schemeClr val="tx1"/>
+                </a:solidFill>
+              </a:rPr>
+              <a:t>The next block is different:</a:t>
+            </a:r>
+          </a:p>
+          <a:p>
+            <a:pPr algn="l"/>
+            <a:r>
+              <a:rPr lang="en-US" sz="2000" dirty="0" smtClean="0">
+                <a:solidFill>
+                  <a:schemeClr val="tx1"/>
+                </a:solidFill>
+              </a:rPr>
+              <a:t>	</a:t>
+            </a:r>
+            <a:r>
+              <a:rPr lang="en-US" sz="2000" b="1" dirty="0" smtClean="0">
+                <a:solidFill>
+                  <a:schemeClr val="tx1"/>
+                </a:solidFill>
+              </a:rPr>
+              <a:t>try { </a:t>
+            </a:r>
+            <a:r>
+              <a:rPr lang="en-150" sz="2000" b="1" dirty="0" smtClean="0">
+                <a:solidFill>
+                  <a:schemeClr val="tx1"/>
+                </a:solidFill>
+              </a:rPr>
+              <a:t>…</a:t>
+            </a:r>
+            <a:r>
+              <a:rPr lang="en-US" sz="2000" b="1" dirty="0" smtClean="0">
+                <a:solidFill>
+                  <a:schemeClr val="tx1"/>
+                </a:solidFill>
+              </a:rPr>
+              <a:t> } catch (Exception ex) { throw ex; }</a:t>
+            </a:r>
+          </a:p>
+          <a:p>
+            <a:pPr marL="342900" indent="-342900" algn="l">
               <a:buFont typeface="Wingdings" panose="05000000000000000000" pitchFamily="2" charset="2"/>
               <a:buChar char="§"/>
             </a:pPr>
             <a:r>
-              <a:rPr lang="en-US" sz="2000" dirty="0" smtClean="0"/>
-              <a:t>Or any </a:t>
-            </a:r>
-            <a:r>
-              <a:rPr lang="en-US" sz="2000" b="1" dirty="0" smtClean="0"/>
-              <a:t>static members </a:t>
-            </a:r>
-            <a:r>
-              <a:rPr lang="en-US" sz="2000" dirty="0" smtClean="0"/>
-              <a:t>are </a:t>
-            </a:r>
-            <a:r>
-              <a:rPr lang="en-US" sz="2000" b="1" dirty="0" smtClean="0"/>
-              <a:t>referenced</a:t>
-            </a:r>
-          </a:p>
-          <a:p>
-            <a:pPr marL="285750" indent="-285750" algn="l">
+              <a:rPr lang="en-US" sz="2000" dirty="0" smtClean="0">
+                <a:solidFill>
+                  <a:schemeClr val="tx1"/>
+                </a:solidFill>
+              </a:rPr>
+              <a:t>It will change the </a:t>
+            </a:r>
+            <a:r>
+              <a:rPr lang="en-US" sz="2000" b="1" dirty="0" smtClean="0">
+                <a:solidFill>
+                  <a:schemeClr val="tx1"/>
+                </a:solidFill>
+              </a:rPr>
+              <a:t>source</a:t>
+            </a:r>
+            <a:r>
+              <a:rPr lang="en-US" sz="2000" dirty="0" smtClean="0">
+                <a:solidFill>
+                  <a:schemeClr val="tx1"/>
+                </a:solidFill>
+              </a:rPr>
+              <a:t> and the </a:t>
+            </a:r>
+            <a:r>
+              <a:rPr lang="en-US" sz="2000" b="1" dirty="0" smtClean="0">
+                <a:solidFill>
+                  <a:schemeClr val="tx1"/>
+                </a:solidFill>
+              </a:rPr>
+              <a:t>stack trace</a:t>
+            </a:r>
+          </a:p>
+          <a:p>
+            <a:pPr marL="1085850" lvl="1" indent="-342900">
               <a:buFont typeface="Wingdings" panose="05000000000000000000" pitchFamily="2" charset="2"/>
               <a:buChar char="§"/>
             </a:pPr>
             <a:r>
-              <a:rPr lang="en-US" sz="2000" dirty="0" smtClean="0">
-                <a:solidFill>
-                  <a:schemeClr val="tx1"/>
-                </a:solidFill>
-              </a:rPr>
-              <a:t>Once a type initializer has failed, it </a:t>
-            </a:r>
-            <a:r>
-              <a:rPr lang="en-US" sz="2000" b="1" dirty="0" smtClean="0">
-                <a:solidFill>
-                  <a:schemeClr val="tx1"/>
-                </a:solidFill>
-              </a:rPr>
-              <a:t>never retried </a:t>
-            </a:r>
-            <a:r>
-              <a:rPr lang="en-US" sz="2000" dirty="0" smtClean="0">
-                <a:solidFill>
-                  <a:schemeClr val="tx1"/>
-                </a:solidFill>
-              </a:rPr>
-              <a:t>(for the lifetime of the         </a:t>
-            </a:r>
-            <a:r>
-              <a:rPr lang="en-US" sz="2000" dirty="0" err="1" smtClean="0">
-                <a:solidFill>
-                  <a:schemeClr val="tx1"/>
-                </a:solidFill>
-              </a:rPr>
-              <a:t>AppDomain</a:t>
-            </a:r>
-            <a:r>
-              <a:rPr lang="en-US" sz="2000" dirty="0" smtClean="0">
-                <a:solidFill>
-                  <a:schemeClr val="tx1"/>
-                </a:solidFill>
-              </a:rPr>
-              <a:t>)</a:t>
-            </a:r>
-          </a:p>
-          <a:p>
-            <a:pPr marL="1028700" lvl="1">
+              <a:rPr lang="en-US" sz="2000" dirty="0" smtClean="0"/>
+              <a:t>It will appear that the exception has been thrown from the current method from that line</a:t>
+            </a:r>
+          </a:p>
+          <a:p>
+            <a:pPr marL="342900" indent="-342900" algn="l">
               <a:buFont typeface="Wingdings" panose="05000000000000000000" pitchFamily="2" charset="2"/>
               <a:buChar char="§"/>
             </a:pPr>
             <a:r>
-              <a:rPr lang="en-US" sz="2000" dirty="0" smtClean="0"/>
-              <a:t>Type will remain </a:t>
-            </a:r>
-            <a:r>
-              <a:rPr lang="en-US" sz="2000" b="1" dirty="0" smtClean="0"/>
-              <a:t>uninitialized</a:t>
-            </a:r>
-          </a:p>
-          <a:p>
-            <a:pPr marL="1028700" lvl="1">
-              <a:buFont typeface="Wingdings" panose="05000000000000000000" pitchFamily="2" charset="2"/>
-              <a:buChar char="§"/>
-            </a:pPr>
-            <a:r>
-              <a:rPr lang="en-US" sz="2000" dirty="0" smtClean="0"/>
-              <a:t>Creating instances will also </a:t>
-            </a:r>
-            <a:r>
-              <a:rPr lang="en-US" sz="2000" b="1" dirty="0" smtClean="0"/>
-              <a:t>fail</a:t>
-            </a:r>
-          </a:p>
-          <a:p>
-            <a:pPr marL="285750" indent="-285750" algn="l">
-              <a:buFont typeface="Wingdings" panose="05000000000000000000" pitchFamily="2" charset="2"/>
-              <a:buChar char="§"/>
-            </a:pPr>
-            <a:r>
               <a:rPr lang="en-US" sz="2000" dirty="0" smtClean="0">
                 <a:solidFill>
                   <a:schemeClr val="tx1"/>
                 </a:solidFill>
               </a:rPr>
-              <a:t>You should have a </a:t>
+              <a:t>Prefer creating </a:t>
             </a:r>
             <a:r>
               <a:rPr lang="en-US" sz="2000" b="1" dirty="0" smtClean="0">
@@ -8242,52 +9032,21 @@
                   <a:schemeClr val="tx1"/>
                 </a:solidFill>
               </a:rPr>
-              <a:t>very good reason </a:t>
-            </a:r>
-            <a:r>
-              <a:rPr lang="en-US" sz="2000" dirty="0" smtClean="0">
-                <a:solidFill>
-                  <a:schemeClr val="tx1"/>
-                </a:solidFill>
-              </a:rPr>
-              <a:t>for throwing an exception from a static constructor</a:t>
-            </a:r>
-          </a:p>
-          <a:p>
-            <a:pPr lvl="1" indent="0">
-              <a:buNone/>
-            </a:pPr>
-            <a:r>
-              <a:rPr lang="en-US" sz="1600" dirty="0" smtClean="0"/>
-              <a:t>										</a:t>
-            </a:r>
-          </a:p>
-          <a:p>
-            <a:pPr marL="285750">
-              <a:buFont typeface="Wingdings" panose="05000000000000000000" pitchFamily="2" charset="2"/>
-              <a:buChar char="§"/>
-            </a:pPr>
-            <a:endParaRPr lang="en-US" sz="200" dirty="0"/>
+              <a:t>new custom exception</a:t>
+            </a:r>
           </a:p>
         </p:txBody>
       </p:sp>
     </p:spTree>
     <p:extLst>
       <p:ext uri="{BB962C8B-B14F-4D97-AF65-F5344CB8AC3E}">
-        <p14:creationId xmlns:p14="http://schemas.microsoft.com/office/powerpoint/2010/main" val="3184376360"/>
+        <p14:creationId xmlns:p14="http://schemas.microsoft.com/office/powerpoint/2010/main" val="2421763994"/>
       </p:ext>
     </p:extLst>
   </p:cSld>
   <p:clrMapOvr>
     <a:masterClrMapping/>
   </p:clrMapOvr>
-  <p:timing>
-    <p:tnLst>
-      <p:par>
-        <p:cTn id="1" dur="indefinite" restart="never" nodeType="tmRoot"/>
-      </p:par>
-    </p:tnLst>
-  </p:timing>
 </p:sld>
 </file>
 
@@ -8324,14 +9083,14 @@
           <a:lstStyle/>
           <a:p>
             <a:r>
-              <a:rPr lang="en-US" b="1" i="1" dirty="0" smtClean="0">
-                <a:solidFill>
-                  <a:schemeClr val="tx1"/>
-                </a:solidFill>
-              </a:rPr>
-              <a:t>Virtual call in constructor</a:t>
-            </a:r>
-            <a:endParaRPr lang="en-US" b="1" i="1" dirty="0">
+              <a:rPr lang="en-US" dirty="0" smtClean="0">
+                <a:solidFill>
+                  <a:schemeClr val="tx1"/>
+                </a:solidFill>
+              </a:rPr>
+              <a:t>Exceptions &amp; Static constructors</a:t>
+            </a:r>
+            <a:endParaRPr lang="en-US" dirty="0">
               <a:solidFill>
                 <a:schemeClr val="tx1"/>
               </a:solidFill>
@@ -8351,14 +9110,12 @@
         </p:nvSpPr>
         <p:spPr>
           <a:xfrm>
-            <a:off x="179512" y="873137"/>
-            <a:ext cx="8784976" cy="4244788"/>
+            <a:off x="0" y="843558"/>
+            <a:ext cx="9144000" cy="3888432"/>
           </a:xfrm>
         </p:spPr>
         <p:txBody>
-          <a:bodyPr wrap="square" anchor="t">
-            <a:noAutofit/>
-          </a:bodyPr>
+          <a:bodyPr anchor="t"/>
           <a:lstStyle/>
           <a:p>
             <a:pPr marL="285750" indent="-285750" algn="l">
@@ -8366,44 +9123,52 @@
               <a:buChar char="§"/>
             </a:pPr>
             <a:r>
-              <a:rPr lang="en-US" sz="2200" dirty="0" smtClean="0">
-                <a:solidFill>
-                  <a:schemeClr val="tx1"/>
-                </a:solidFill>
-              </a:rPr>
-              <a:t>Calling </a:t>
-            </a:r>
-            <a:r>
-              <a:rPr lang="en-US" sz="2200" b="1" dirty="0" smtClean="0">
-                <a:solidFill>
-                  <a:schemeClr val="tx1"/>
-                </a:solidFill>
-              </a:rPr>
-              <a:t>virtual methods </a:t>
-            </a:r>
-            <a:r>
-              <a:rPr lang="en-US" sz="2200" dirty="0" smtClean="0">
-                <a:solidFill>
-                  <a:schemeClr val="tx1"/>
-                </a:solidFill>
-              </a:rPr>
-              <a:t>in a constrictor is a </a:t>
-            </a:r>
-            <a:r>
-              <a:rPr lang="en-US" sz="2200" b="1" dirty="0" smtClean="0">
-                <a:solidFill>
-                  <a:schemeClr val="tx1"/>
-                </a:solidFill>
-              </a:rPr>
-              <a:t>bad</a:t>
-            </a:r>
-            <a:r>
-              <a:rPr lang="en-US" sz="2200" dirty="0" smtClean="0">
-                <a:solidFill>
-                  <a:schemeClr val="tx1"/>
-                </a:solidFill>
-              </a:rPr>
-              <a:t> idea</a:t>
+              <a:rPr lang="en-US" sz="2000" dirty="0" smtClean="0">
+                <a:solidFill>
+                  <a:schemeClr val="tx1"/>
+                </a:solidFill>
+              </a:rPr>
+              <a:t>A static constructor is called automatically to initialize the class before:</a:t>
+            </a:r>
+          </a:p>
+          <a:p>
+            <a:pPr marL="1028700" lvl="1">
+              <a:buFont typeface="Wingdings" panose="05000000000000000000" pitchFamily="2" charset="2"/>
+              <a:buChar char="§"/>
+            </a:pPr>
+            <a:r>
+              <a:rPr lang="en-US" sz="2000" dirty="0" smtClean="0"/>
+              <a:t>The first </a:t>
+            </a:r>
+            <a:r>
+              <a:rPr lang="en-US" sz="2000" b="1" dirty="0" smtClean="0"/>
+              <a:t>instance</a:t>
+            </a:r>
+            <a:r>
+              <a:rPr lang="en-US" sz="2000" dirty="0" smtClean="0"/>
+              <a:t> is created</a:t>
+            </a:r>
+          </a:p>
+          <a:p>
+            <a:pPr marL="1028700" lvl="1">
+              <a:buFont typeface="Wingdings" panose="05000000000000000000" pitchFamily="2" charset="2"/>
+              <a:buChar char="§"/>
+            </a:pPr>
+            <a:r>
+              <a:rPr lang="en-US" sz="2000" dirty="0" smtClean="0"/>
+              <a:t>Or any </a:t>
+            </a:r>
+            <a:r>
+              <a:rPr lang="en-US" sz="2000" b="1" dirty="0" smtClean="0"/>
+              <a:t>static members </a:t>
+            </a:r>
+            <a:r>
+              <a:rPr lang="en-US" sz="2000" dirty="0" smtClean="0"/>
+              <a:t>are </a:t>
+            </a:r>
+            <a:r>
+              <a:rPr lang="en-US" sz="2000" b="1" dirty="0" smtClean="0"/>
+              <a:t>referenced</a:t>
             </a:r>
           </a:p>
           <a:p>
@@ -8412,20 +9177,44 @@
               <a:buChar char="§"/>
             </a:pPr>
             <a:r>
-              <a:rPr lang="en-US" sz="2200" dirty="0" smtClean="0">
-                <a:solidFill>
-                  <a:schemeClr val="tx1"/>
-                </a:solidFill>
-              </a:rPr>
-              <a:t>When initializing a type in C# constructors are invoked </a:t>
-            </a:r>
-            <a:r>
-              <a:rPr lang="en-US" sz="2200" b="1" dirty="0" smtClean="0">
-                <a:solidFill>
-                  <a:schemeClr val="tx1"/>
-                </a:solidFill>
-              </a:rPr>
-              <a:t>top-down</a:t>
+              <a:rPr lang="en-US" sz="2000" dirty="0" smtClean="0">
+                <a:solidFill>
+                  <a:schemeClr val="tx1"/>
+                </a:solidFill>
+              </a:rPr>
+              <a:t>Once a type initializer has failed, it </a:t>
+            </a:r>
+            <a:r>
+              <a:rPr lang="en-US" sz="2000" b="1" dirty="0" smtClean="0">
+                <a:solidFill>
+                  <a:schemeClr val="tx1"/>
+                </a:solidFill>
+              </a:rPr>
+              <a:t>never retried </a:t>
+            </a:r>
+            <a:r>
+              <a:rPr lang="en-US" sz="2000" dirty="0" smtClean="0">
+                <a:solidFill>
+                  <a:schemeClr val="tx1"/>
+                </a:solidFill>
+              </a:rPr>
+              <a:t>(for the lifetime of the         </a:t>
+            </a:r>
+            <a:r>
+              <a:rPr lang="en-US" sz="2000" dirty="0" err="1" smtClean="0">
+                <a:solidFill>
+                  <a:schemeClr val="tx1"/>
+                </a:solidFill>
+              </a:rPr>
+              <a:t>AppDomain</a:t>
+            </a:r>
+            <a:r>
+              <a:rPr lang="en-US" sz="2000" dirty="0" smtClean="0">
+                <a:solidFill>
+                  <a:schemeClr val="tx1"/>
+                </a:solidFill>
+              </a:rPr>
+              <a:t>)</a:t>
             </a:r>
           </a:p>
           <a:p>
@@ -8434,16 +9223,12 @@
               <a:buChar char="§"/>
             </a:pPr>
             <a:r>
-              <a:rPr lang="en-US" sz="2200" dirty="0" smtClean="0"/>
-              <a:t>First the </a:t>
-            </a:r>
-            <a:r>
-              <a:rPr lang="en-US" sz="2200" b="1" dirty="0" smtClean="0"/>
-              <a:t>top base </a:t>
-            </a:r>
-            <a:r>
-              <a:rPr lang="en-US" sz="2200" dirty="0" smtClean="0"/>
-              <a:t>constructor (object())</a:t>
+              <a:rPr lang="en-US" sz="2000" dirty="0" smtClean="0"/>
+              <a:t>Type will remain </a:t>
+            </a:r>
+            <a:r>
+              <a:rPr lang="en-US" sz="2000" b="1" dirty="0" smtClean="0"/>
+              <a:t>uninitialized</a:t>
             </a:r>
           </a:p>
           <a:p>
@@ -8452,16 +9237,12 @@
               <a:buChar char="§"/>
             </a:pPr>
             <a:r>
-              <a:rPr lang="en-US" sz="2200" dirty="0" smtClean="0"/>
-              <a:t>Then down to </a:t>
-            </a:r>
-            <a:r>
-              <a:rPr lang="en-US" sz="2200" b="1" dirty="0" smtClean="0"/>
-              <a:t>the derived constructors </a:t>
-            </a:r>
-            <a:r>
-              <a:rPr lang="en-US" sz="2200" dirty="0" smtClean="0"/>
-              <a:t>through inheritance</a:t>
+              <a:rPr lang="en-US" sz="2000" dirty="0" smtClean="0"/>
+              <a:t>Creating instances will also </a:t>
+            </a:r>
+            <a:r>
+              <a:rPr lang="en-US" sz="2000" b="1" dirty="0" smtClean="0"/>
+              <a:t>fail</a:t>
             </a:r>
           </a:p>
           <a:p>
@@ -8470,122 +9251,52 @@
               <a:buChar char="§"/>
             </a:pPr>
             <a:r>
-              <a:rPr lang="en-US" sz="2200" dirty="0" smtClean="0">
-                <a:solidFill>
-                  <a:schemeClr val="tx1"/>
-                </a:solidFill>
-              </a:rPr>
-              <a:t>But virtual methods are invoked </a:t>
-            </a:r>
-            <a:r>
-              <a:rPr lang="en-US" sz="2200" b="1" dirty="0" smtClean="0">
-                <a:solidFill>
-                  <a:schemeClr val="tx1"/>
-                </a:solidFill>
-              </a:rPr>
-              <a:t>bottom-up</a:t>
-            </a:r>
-            <a:r>
-              <a:rPr lang="en-US" sz="2200" dirty="0" smtClean="0">
-                <a:solidFill>
-                  <a:schemeClr val="tx1"/>
-                </a:solidFill>
-              </a:rPr>
-              <a:t>	</a:t>
-            </a:r>
-          </a:p>
-          <a:p>
-            <a:pPr marL="1028700" lvl="1">
+              <a:rPr lang="en-US" sz="2000" dirty="0" smtClean="0">
+                <a:solidFill>
+                  <a:schemeClr val="tx1"/>
+                </a:solidFill>
+              </a:rPr>
+              <a:t>You should have a </a:t>
+            </a:r>
+            <a:r>
+              <a:rPr lang="en-US" sz="2000" b="1" dirty="0" smtClean="0">
+                <a:solidFill>
+                  <a:schemeClr val="tx1"/>
+                </a:solidFill>
+              </a:rPr>
+              <a:t>very good reason </a:t>
+            </a:r>
+            <a:r>
+              <a:rPr lang="en-US" sz="2000" dirty="0" smtClean="0">
+                <a:solidFill>
+                  <a:schemeClr val="tx1"/>
+                </a:solidFill>
+              </a:rPr>
+              <a:t>for throwing an exception from a static constructor</a:t>
+            </a:r>
+          </a:p>
+          <a:p>
+            <a:pPr lvl="1" indent="0">
+              <a:buNone/>
+            </a:pPr>
+            <a:r>
+              <a:rPr lang="en-US" sz="1600" dirty="0" smtClean="0"/>
+              <a:t>										</a:t>
+            </a:r>
+          </a:p>
+          <a:p>
+            <a:pPr marL="285750">
               <a:buFont typeface="Wingdings" panose="05000000000000000000" pitchFamily="2" charset="2"/>
               <a:buChar char="§"/>
             </a:pPr>
-            <a:r>
-              <a:rPr lang="en-US" sz="2200" dirty="0" smtClean="0"/>
-              <a:t>First the </a:t>
-            </a:r>
-            <a:r>
-              <a:rPr lang="en-US" sz="2200" b="1" dirty="0" smtClean="0"/>
-              <a:t>most</a:t>
-            </a:r>
-            <a:r>
-              <a:rPr lang="en-US" sz="2200" dirty="0" smtClean="0"/>
-              <a:t> </a:t>
-            </a:r>
-            <a:r>
-              <a:rPr lang="en-US" sz="2200" b="1" dirty="0" smtClean="0"/>
-              <a:t>derived overridden method</a:t>
-            </a:r>
-          </a:p>
-          <a:p>
-            <a:pPr marL="1028700" lvl="1">
-              <a:buFont typeface="Wingdings" panose="05000000000000000000" pitchFamily="2" charset="2"/>
-              <a:buChar char="§"/>
-            </a:pPr>
-            <a:r>
-              <a:rPr lang="en-US" sz="2200" dirty="0" smtClean="0"/>
-              <a:t>Then up to all </a:t>
-            </a:r>
-            <a:r>
-              <a:rPr lang="en-US" sz="2200" b="1" dirty="0" smtClean="0"/>
-              <a:t>base virtual </a:t>
-            </a:r>
-            <a:r>
-              <a:rPr lang="en-US" sz="2200" dirty="0" smtClean="0"/>
-              <a:t>methods</a:t>
-            </a:r>
-          </a:p>
-          <a:p>
-            <a:pPr marL="285750" indent="-285750" algn="l">
-              <a:buFont typeface="Wingdings" panose="05000000000000000000" pitchFamily="2" charset="2"/>
-              <a:buChar char="§"/>
-            </a:pPr>
-            <a:r>
-              <a:rPr lang="en-US" sz="2200" dirty="0" smtClean="0">
-                <a:solidFill>
-                  <a:schemeClr val="tx1"/>
-                </a:solidFill>
-              </a:rPr>
-              <a:t>For this reason, if you call virtual methods in constructor, you may </a:t>
-            </a:r>
-            <a:r>
-              <a:rPr lang="en-US" sz="2200" b="1" dirty="0" smtClean="0">
-                <a:solidFill>
-                  <a:schemeClr val="tx1"/>
-                </a:solidFill>
-              </a:rPr>
-              <a:t>have unexpected </a:t>
-            </a:r>
-            <a:r>
-              <a:rPr lang="en-US" sz="2200" b="1" dirty="0" err="1" smtClean="0">
-                <a:solidFill>
-                  <a:schemeClr val="tx1"/>
-                </a:solidFill>
-              </a:rPr>
-              <a:t>behaviour</a:t>
-            </a:r>
-            <a:r>
-              <a:rPr lang="en-US" sz="2200" dirty="0" smtClean="0">
-                <a:solidFill>
-                  <a:schemeClr val="tx1"/>
-                </a:solidFill>
-              </a:rPr>
-              <a:t> from your classes</a:t>
-            </a:r>
-          </a:p>
-          <a:p>
-            <a:pPr algn="l"/>
-            <a:endParaRPr lang="en-US" sz="2200" dirty="0">
-              <a:solidFill>
-                <a:schemeClr val="tx1"/>
-              </a:solidFill>
-            </a:endParaRPr>
+            <a:endParaRPr lang="en-US" sz="200" dirty="0"/>
           </a:p>
         </p:txBody>
       </p:sp>
     </p:spTree>
     <p:extLst>
       <p:ext uri="{BB962C8B-B14F-4D97-AF65-F5344CB8AC3E}">
-        <p14:creationId xmlns:p14="http://schemas.microsoft.com/office/powerpoint/2010/main" val="773331329"/>
+        <p14:creationId xmlns:p14="http://schemas.microsoft.com/office/powerpoint/2010/main" val="3184376360"/>
       </p:ext>
     </p:extLst>
   </p:cSld>

</xml_diff>

<commit_message>
Constraining gener Yield ptoject in other folder
</commit_message>
<xml_diff>
--- a/C# Tips and Tricks.pptx
+++ b/C# Tips and Tricks.pptx
@@ -7,10 +7,10 @@
     <p:sldMasterId id="2147483653" r:id="rId3"/>
   </p:sldMasterIdLst>
   <p:notesMasterIdLst>
-    <p:notesMasterId r:id="rId22"/>
+    <p:notesMasterId r:id="rId23"/>
   </p:notesMasterIdLst>
   <p:handoutMasterIdLst>
-    <p:handoutMasterId r:id="rId23"/>
+    <p:handoutMasterId r:id="rId24"/>
   </p:handoutMasterIdLst>
   <p:sldIdLst>
     <p:sldId id="256" r:id="rId4"/>
@@ -31,6 +31,7 @@
     <p:sldId id="271" r:id="rId19"/>
     <p:sldId id="272" r:id="rId20"/>
     <p:sldId id="273" r:id="rId21"/>
+    <p:sldId id="274" r:id="rId22"/>
   </p:sldIdLst>
   <p:sldSz cx="9144000" cy="5143500" type="screen16x9"/>
   <p:notesSz cx="6858000" cy="9144000"/>
@@ -8786,6 +8787,250 @@
     <p:extLst>
       <p:ext uri="{BB962C8B-B14F-4D97-AF65-F5344CB8AC3E}">
         <p14:creationId xmlns:p14="http://schemas.microsoft.com/office/powerpoint/2010/main" val="1258013900"/>
+      </p:ext>
+    </p:extLst>
+  </p:cSld>
+  <p:clrMapOvr>
+    <a:masterClrMapping/>
+  </p:clrMapOvr>
+</p:sld>
+</file>
+
+<file path=ppt/slides/slide19.xml><?xml version="1.0" encoding="utf-8"?>
+<p:sld xmlns:a="http://schemas.openxmlformats.org/drawingml/2006/main" xmlns:r="http://schemas.openxmlformats.org/officeDocument/2006/relationships" xmlns:p="http://schemas.openxmlformats.org/presentationml/2006/main">
+  <p:cSld>
+    <p:spTree>
+      <p:nvGrpSpPr>
+        <p:cNvPr id="1" name=""/>
+        <p:cNvGrpSpPr/>
+        <p:nvPr/>
+      </p:nvGrpSpPr>
+      <p:grpSpPr>
+        <a:xfrm>
+          <a:off x="0" y="0"/>
+          <a:ext cx="0" cy="0"/>
+          <a:chOff x="0" y="0"/>
+          <a:chExt cx="0" cy="0"/>
+        </a:xfrm>
+      </p:grpSpPr>
+      <p:sp>
+        <p:nvSpPr>
+          <p:cNvPr id="2" name="Текстов контейнер 1"/>
+          <p:cNvSpPr>
+            <a:spLocks noGrp="1"/>
+          </p:cNvSpPr>
+          <p:nvPr>
+            <p:ph type="body" sz="quarter" idx="10"/>
+          </p:nvPr>
+        </p:nvSpPr>
+        <p:spPr/>
+        <p:txBody>
+          <a:bodyPr/>
+          <a:lstStyle/>
+          <a:p>
+            <a:r>
+              <a:rPr lang="en-US" dirty="0" smtClean="0"/>
+              <a:t>Constraining generics</a:t>
+            </a:r>
+            <a:endParaRPr lang="en-US" dirty="0"/>
+          </a:p>
+        </p:txBody>
+      </p:sp>
+      <p:sp>
+        <p:nvSpPr>
+          <p:cNvPr id="3" name="Текстов контейнер 2"/>
+          <p:cNvSpPr>
+            <a:spLocks noGrp="1"/>
+          </p:cNvSpPr>
+          <p:nvPr>
+            <p:ph type="body" sz="quarter" idx="11"/>
+          </p:nvPr>
+        </p:nvSpPr>
+        <p:spPr>
+          <a:xfrm>
+            <a:off x="0" y="751012"/>
+            <a:ext cx="9144000" cy="4392488"/>
+          </a:xfrm>
+        </p:spPr>
+        <p:txBody>
+          <a:bodyPr anchor="t"/>
+          <a:lstStyle/>
+          <a:p>
+            <a:pPr marL="342900" indent="-342900" algn="l">
+              <a:buFont typeface="Wingdings" panose="05000000000000000000" pitchFamily="2" charset="2"/>
+              <a:buChar char="§"/>
+            </a:pPr>
+            <a:r>
+              <a:rPr lang="en-US" sz="2200" dirty="0" smtClean="0"/>
+              <a:t>In </a:t>
+            </a:r>
+            <a:r>
+              <a:rPr lang="en-US" sz="2200" b="1" dirty="0" smtClean="0"/>
+              <a:t>generic classes</a:t>
+            </a:r>
+            <a:r>
+              <a:rPr lang="en-US" sz="2200" dirty="0" smtClean="0"/>
+              <a:t> we can apply restrictions to the </a:t>
+            </a:r>
+            <a:r>
+              <a:rPr lang="en-US" sz="2200" b="1" dirty="0" smtClean="0"/>
+              <a:t>type arguments</a:t>
+            </a:r>
+          </a:p>
+          <a:p>
+            <a:pPr marL="342900" indent="-342900" algn="l">
+              <a:buFont typeface="Wingdings" panose="05000000000000000000" pitchFamily="2" charset="2"/>
+              <a:buChar char="§"/>
+            </a:pPr>
+            <a:r>
+              <a:rPr lang="en-US" sz="2200" dirty="0" smtClean="0"/>
+              <a:t>The type argument must </a:t>
+            </a:r>
+            <a:r>
+              <a:rPr lang="en-US" sz="2200" b="1" dirty="0" smtClean="0"/>
+              <a:t>be or derive from the specified base        class or interface</a:t>
+            </a:r>
+            <a:endParaRPr lang="en-US" sz="2200" dirty="0"/>
+          </a:p>
+          <a:p>
+            <a:pPr algn="l"/>
+            <a:r>
+              <a:rPr lang="en-US" sz="2200" dirty="0" smtClean="0"/>
+              <a:t>	</a:t>
+            </a:r>
+            <a:r>
+              <a:rPr lang="en-US" sz="2200" b="1" i="1" dirty="0" smtClean="0"/>
+              <a:t>class </a:t>
+            </a:r>
+            <a:r>
+              <a:rPr lang="en-US" sz="2200" b="1" i="1" dirty="0" err="1" smtClean="0"/>
+              <a:t>TemplateClass</a:t>
+            </a:r>
+            <a:r>
+              <a:rPr lang="en-US" sz="2200" b="1" i="1" dirty="0" smtClean="0"/>
+              <a:t>&lt;T&gt; where T : </a:t>
+            </a:r>
+            <a:r>
+              <a:rPr lang="en-US" sz="2200" b="1" i="1" dirty="0" err="1" smtClean="0"/>
+              <a:t>SomeClass</a:t>
+            </a:r>
+            <a:endParaRPr lang="en-US" sz="2200" b="1" i="1" dirty="0" smtClean="0"/>
+          </a:p>
+          <a:p>
+            <a:pPr marL="342900" indent="-342900" algn="l">
+              <a:buFont typeface="Wingdings" panose="05000000000000000000" pitchFamily="2" charset="2"/>
+              <a:buChar char="§"/>
+            </a:pPr>
+            <a:r>
+              <a:rPr lang="en-US" sz="2200" dirty="0" smtClean="0"/>
+              <a:t>The type argument must be </a:t>
+            </a:r>
+            <a:r>
+              <a:rPr lang="en-US" sz="2200" b="1" dirty="0" smtClean="0"/>
+              <a:t>reference type (class) or                       value type (</a:t>
+            </a:r>
+            <a:r>
+              <a:rPr lang="en-US" sz="2200" b="1" dirty="0" err="1" smtClean="0"/>
+              <a:t>struct</a:t>
+            </a:r>
+            <a:r>
+              <a:rPr lang="en-US" sz="2200" b="1" dirty="0" smtClean="0"/>
+              <a:t>) </a:t>
+            </a:r>
+          </a:p>
+          <a:p>
+            <a:pPr algn="l"/>
+            <a:r>
+              <a:rPr lang="en-US" sz="2200" b="1" dirty="0"/>
+              <a:t>	</a:t>
+            </a:r>
+            <a:r>
+              <a:rPr lang="en-US" sz="2200" b="1" i="1" dirty="0" smtClean="0"/>
+              <a:t>class </a:t>
+            </a:r>
+            <a:r>
+              <a:rPr lang="en-US" sz="2200" b="1" i="1" dirty="0" err="1" smtClean="0"/>
+              <a:t>TemplateClass</a:t>
+            </a:r>
+            <a:r>
+              <a:rPr lang="en-US" sz="2200" b="1" i="1" dirty="0" smtClean="0"/>
+              <a:t>&lt;T&gt; where T : class </a:t>
+            </a:r>
+            <a:r>
+              <a:rPr lang="en-US" sz="2200" b="1" i="1" dirty="0" smtClean="0">
+                <a:solidFill>
+                  <a:schemeClr val="bg2">
+                    <a:lumMod val="25000"/>
+                  </a:schemeClr>
+                </a:solidFill>
+              </a:rPr>
+              <a:t>// where T : </a:t>
+            </a:r>
+            <a:r>
+              <a:rPr lang="en-US" sz="2200" b="1" i="1" dirty="0" err="1" smtClean="0">
+                <a:solidFill>
+                  <a:schemeClr val="bg2">
+                    <a:lumMod val="25000"/>
+                  </a:schemeClr>
+                </a:solidFill>
+              </a:rPr>
+              <a:t>struct</a:t>
+            </a:r>
+            <a:endParaRPr lang="en-US" sz="2200" b="1" i="1" dirty="0" smtClean="0">
+              <a:solidFill>
+                <a:schemeClr val="bg2">
+                  <a:lumMod val="25000"/>
+                </a:schemeClr>
+              </a:solidFill>
+            </a:endParaRPr>
+          </a:p>
+          <a:p>
+            <a:pPr marL="342900" indent="-342900" algn="l">
+              <a:buFont typeface="Wingdings" panose="05000000000000000000" pitchFamily="2" charset="2"/>
+              <a:buChar char="§"/>
+            </a:pPr>
+            <a:r>
+              <a:rPr lang="en-US" sz="2200" dirty="0" smtClean="0"/>
+              <a:t>The type argument must </a:t>
+            </a:r>
+            <a:r>
+              <a:rPr lang="en-US" sz="2200" b="1" dirty="0" smtClean="0"/>
+              <a:t>have a public </a:t>
+            </a:r>
+            <a:r>
+              <a:rPr lang="en-US" sz="2200" b="1" dirty="0" err="1" smtClean="0"/>
+              <a:t>parameterless</a:t>
+            </a:r>
+            <a:r>
+              <a:rPr lang="en-US" sz="2200" b="1" dirty="0" smtClean="0"/>
+              <a:t> constructor</a:t>
+            </a:r>
+          </a:p>
+          <a:p>
+            <a:pPr algn="l"/>
+            <a:r>
+              <a:rPr lang="en-US" sz="2200" dirty="0" smtClean="0"/>
+              <a:t>	</a:t>
+            </a:r>
+            <a:r>
+              <a:rPr lang="en-US" sz="2200" b="1" i="1" dirty="0" smtClean="0"/>
+              <a:t>class </a:t>
+            </a:r>
+            <a:r>
+              <a:rPr lang="en-US" sz="2200" b="1" i="1" dirty="0" err="1" smtClean="0"/>
+              <a:t>TemplateClass</a:t>
+            </a:r>
+            <a:r>
+              <a:rPr lang="en-US" sz="2200" b="1" i="1" dirty="0" smtClean="0"/>
+              <a:t>&lt;T&gt; where T : new()</a:t>
+            </a:r>
+          </a:p>
+        </p:txBody>
+      </p:sp>
+    </p:spTree>
+    <p:extLst>
+      <p:ext uri="{BB962C8B-B14F-4D97-AF65-F5344CB8AC3E}">
+        <p14:creationId xmlns:p14="http://schemas.microsoft.com/office/powerpoint/2010/main" val="1391104696"/>
       </p:ext>
     </p:extLst>
   </p:cSld>

</xml_diff>

<commit_message>
Unit testing - test private and internal methods
</commit_message>
<xml_diff>
--- a/C# Tips and Tricks.pptx
+++ b/C# Tips and Tricks.pptx
@@ -7,10 +7,10 @@
     <p:sldMasterId id="2147483653" r:id="rId3"/>
   </p:sldMasterIdLst>
   <p:notesMasterIdLst>
-    <p:notesMasterId r:id="rId32"/>
+    <p:notesMasterId r:id="rId34"/>
   </p:notesMasterIdLst>
   <p:handoutMasterIdLst>
-    <p:handoutMasterId r:id="rId33"/>
+    <p:handoutMasterId r:id="rId35"/>
   </p:handoutMasterIdLst>
   <p:sldIdLst>
     <p:sldId id="256" r:id="rId4"/>
@@ -41,6 +41,8 @@
     <p:sldId id="281" r:id="rId29"/>
     <p:sldId id="282" r:id="rId30"/>
     <p:sldId id="283" r:id="rId31"/>
+    <p:sldId id="284" r:id="rId32"/>
+    <p:sldId id="285" r:id="rId33"/>
   </p:sldIdLst>
   <p:sldSz cx="9144000" cy="5143500" type="screen16x9"/>
   <p:notesSz cx="6858000" cy="9144000"/>
@@ -12685,6 +12687,64 @@
 </p:sld>
 </file>
 
+<file path=ppt/slides/slide29.xml><?xml version="1.0" encoding="utf-8"?>
+<p:sld xmlns:a="http://schemas.openxmlformats.org/drawingml/2006/main" xmlns:r="http://schemas.openxmlformats.org/officeDocument/2006/relationships" xmlns:p="http://schemas.openxmlformats.org/presentationml/2006/main">
+  <p:cSld>
+    <p:spTree>
+      <p:nvGrpSpPr>
+        <p:cNvPr id="1" name=""/>
+        <p:cNvGrpSpPr/>
+        <p:nvPr/>
+      </p:nvGrpSpPr>
+      <p:grpSpPr>
+        <a:xfrm>
+          <a:off x="0" y="0"/>
+          <a:ext cx="0" cy="0"/>
+          <a:chOff x="0" y="0"/>
+          <a:chExt cx="0" cy="0"/>
+        </a:xfrm>
+      </p:grpSpPr>
+      <p:sp>
+        <p:nvSpPr>
+          <p:cNvPr id="2" name="Текстов контейнер 1"/>
+          <p:cNvSpPr>
+            <a:spLocks noGrp="1"/>
+          </p:cNvSpPr>
+          <p:nvPr>
+            <p:ph type="body" sz="quarter" idx="10"/>
+          </p:nvPr>
+        </p:nvSpPr>
+        <p:spPr>
+          <a:xfrm>
+            <a:off x="14567" y="3867894"/>
+            <a:ext cx="9144000" cy="576064"/>
+          </a:xfrm>
+        </p:spPr>
+        <p:txBody>
+          <a:bodyPr/>
+          <a:lstStyle/>
+          <a:p>
+            <a:r>
+              <a:rPr lang="en-US" b="1" i="1" dirty="0" smtClean="0"/>
+              <a:t>Debugging and testing tips</a:t>
+            </a:r>
+            <a:endParaRPr lang="en-US" b="1" i="1" dirty="0"/>
+          </a:p>
+        </p:txBody>
+      </p:sp>
+    </p:spTree>
+    <p:extLst>
+      <p:ext uri="{BB962C8B-B14F-4D97-AF65-F5344CB8AC3E}">
+        <p14:creationId xmlns:p14="http://schemas.microsoft.com/office/powerpoint/2010/main" val="934348141"/>
+      </p:ext>
+    </p:extLst>
+  </p:cSld>
+  <p:clrMapOvr>
+    <a:masterClrMapping/>
+  </p:clrMapOvr>
+</p:sld>
+</file>
+
 <file path=ppt/slides/slide3.xml><?xml version="1.0" encoding="utf-8"?>
 <p:sld xmlns:a="http://schemas.openxmlformats.org/drawingml/2006/main" xmlns:r="http://schemas.openxmlformats.org/officeDocument/2006/relationships" xmlns:p="http://schemas.openxmlformats.org/presentationml/2006/main">
   <p:cSld>
@@ -12764,6 +12824,190 @@
     <p:extLst>
       <p:ext uri="{BB962C8B-B14F-4D97-AF65-F5344CB8AC3E}">
         <p14:creationId xmlns:p14="http://schemas.microsoft.com/office/powerpoint/2010/main" val="3999147421"/>
+      </p:ext>
+    </p:extLst>
+  </p:cSld>
+  <p:clrMapOvr>
+    <a:masterClrMapping/>
+  </p:clrMapOvr>
+</p:sld>
+</file>
+
+<file path=ppt/slides/slide30.xml><?xml version="1.0" encoding="utf-8"?>
+<p:sld xmlns:a="http://schemas.openxmlformats.org/drawingml/2006/main" xmlns:r="http://schemas.openxmlformats.org/officeDocument/2006/relationships" xmlns:p="http://schemas.openxmlformats.org/presentationml/2006/main">
+  <p:cSld>
+    <p:spTree>
+      <p:nvGrpSpPr>
+        <p:cNvPr id="1" name=""/>
+        <p:cNvGrpSpPr/>
+        <p:nvPr/>
+      </p:nvGrpSpPr>
+      <p:grpSpPr>
+        <a:xfrm>
+          <a:off x="0" y="0"/>
+          <a:ext cx="0" cy="0"/>
+          <a:chOff x="0" y="0"/>
+          <a:chExt cx="0" cy="0"/>
+        </a:xfrm>
+      </p:grpSpPr>
+      <p:sp>
+        <p:nvSpPr>
+          <p:cNvPr id="2" name="Текстов контейнер 1"/>
+          <p:cNvSpPr>
+            <a:spLocks noGrp="1"/>
+          </p:cNvSpPr>
+          <p:nvPr>
+            <p:ph type="body" sz="quarter" idx="10"/>
+          </p:nvPr>
+        </p:nvSpPr>
+        <p:spPr/>
+        <p:txBody>
+          <a:bodyPr/>
+          <a:lstStyle/>
+          <a:p>
+            <a:r>
+              <a:rPr lang="en-US" b="1" i="1" dirty="0" smtClean="0"/>
+              <a:t>Test Internal/Private Members</a:t>
+            </a:r>
+            <a:endParaRPr lang="en-US" b="1" i="1" dirty="0"/>
+          </a:p>
+        </p:txBody>
+      </p:sp>
+      <p:sp>
+        <p:nvSpPr>
+          <p:cNvPr id="3" name="Текстов контейнер 2"/>
+          <p:cNvSpPr>
+            <a:spLocks noGrp="1"/>
+          </p:cNvSpPr>
+          <p:nvPr>
+            <p:ph type="body" sz="quarter" idx="11"/>
+          </p:nvPr>
+        </p:nvSpPr>
+        <p:spPr>
+          <a:xfrm>
+            <a:off x="0" y="699542"/>
+            <a:ext cx="9144000" cy="4176464"/>
+          </a:xfrm>
+        </p:spPr>
+        <p:txBody>
+          <a:bodyPr anchor="t"/>
+          <a:lstStyle/>
+          <a:p>
+            <a:pPr marL="342900" indent="-342900" algn="l">
+              <a:buFont typeface="Wingdings" panose="05000000000000000000" pitchFamily="2" charset="2"/>
+              <a:buChar char="§"/>
+            </a:pPr>
+            <a:r>
+              <a:rPr lang="en-US" sz="2200" dirty="0" smtClean="0"/>
+              <a:t>Easiest way out is to make the members </a:t>
+            </a:r>
+            <a:r>
+              <a:rPr lang="en-US" sz="2200" b="1" dirty="0" smtClean="0"/>
+              <a:t>public</a:t>
+            </a:r>
+          </a:p>
+          <a:p>
+            <a:pPr marL="342900" indent="-342900" algn="l">
+              <a:buFont typeface="Wingdings" panose="05000000000000000000" pitchFamily="2" charset="2"/>
+              <a:buChar char="§"/>
+            </a:pPr>
+            <a:r>
+              <a:rPr lang="en-US" sz="2200" dirty="0" smtClean="0"/>
+              <a:t>Make the members </a:t>
+            </a:r>
+            <a:r>
+              <a:rPr lang="en-US" sz="2200" b="1" dirty="0" smtClean="0"/>
+              <a:t>protected</a:t>
+            </a:r>
+            <a:r>
+              <a:rPr lang="en-US" sz="2200" dirty="0" smtClean="0"/>
+              <a:t> and have the unit test class </a:t>
+            </a:r>
+            <a:r>
+              <a:rPr lang="en-US" sz="2200" b="1" dirty="0" smtClean="0"/>
+              <a:t>extend</a:t>
+            </a:r>
+            <a:r>
+              <a:rPr lang="en-US" sz="2200" dirty="0" smtClean="0"/>
+              <a:t>     this </a:t>
+            </a:r>
+            <a:r>
+              <a:rPr lang="en-US" sz="2200" b="1" dirty="0" smtClean="0"/>
+              <a:t>class</a:t>
+            </a:r>
+            <a:r>
+              <a:rPr lang="en-US" sz="2200" dirty="0" smtClean="0"/>
+              <a:t> to gain access</a:t>
+            </a:r>
+          </a:p>
+          <a:p>
+            <a:pPr marL="342900" indent="-342900" algn="l">
+              <a:buFont typeface="Wingdings" panose="05000000000000000000" pitchFamily="2" charset="2"/>
+              <a:buChar char="§"/>
+            </a:pPr>
+            <a:r>
+              <a:rPr lang="en-US" sz="2200" dirty="0" smtClean="0"/>
+              <a:t>Use </a:t>
+            </a:r>
+            <a:r>
+              <a:rPr lang="en-US" sz="2200" b="1" dirty="0" smtClean="0"/>
+              <a:t>reflection</a:t>
+            </a:r>
+            <a:r>
+              <a:rPr lang="en-US" sz="2200" dirty="0" smtClean="0"/>
+              <a:t> to invoke the members</a:t>
+            </a:r>
+          </a:p>
+          <a:p>
+            <a:pPr marL="342900" indent="-342900" algn="l">
+              <a:buFont typeface="Wingdings" panose="05000000000000000000" pitchFamily="2" charset="2"/>
+              <a:buChar char="§"/>
+            </a:pPr>
+            <a:r>
+              <a:rPr lang="en-US" sz="2200" dirty="0" smtClean="0"/>
+              <a:t>Use </a:t>
+            </a:r>
+            <a:r>
+              <a:rPr lang="en-US" sz="2200" b="1" dirty="0" err="1" smtClean="0"/>
+              <a:t>InternalsVissibleTo</a:t>
+            </a:r>
+            <a:r>
+              <a:rPr lang="en-US" sz="2200" dirty="0" smtClean="0"/>
+              <a:t> for internal members</a:t>
+            </a:r>
+          </a:p>
+          <a:p>
+            <a:pPr marL="342900" indent="-342900" algn="l">
+              <a:buFont typeface="Wingdings" panose="05000000000000000000" pitchFamily="2" charset="2"/>
+              <a:buChar char="§"/>
+            </a:pPr>
+            <a:r>
+              <a:rPr lang="en-US" sz="2200" b="1" dirty="0" smtClean="0"/>
+              <a:t>[assembly: </a:t>
+            </a:r>
+            <a:r>
+              <a:rPr lang="en-US" sz="2200" b="1" dirty="0" err="1" smtClean="0"/>
+              <a:t>InternalsVisibleTo</a:t>
+            </a:r>
+            <a:r>
+              <a:rPr lang="en-US" sz="2200" b="1" dirty="0" smtClean="0"/>
+              <a:t>(string </a:t>
+            </a:r>
+            <a:r>
+              <a:rPr lang="en-US" sz="2200" b="1" dirty="0" err="1" smtClean="0"/>
+              <a:t>assemblyName</a:t>
+            </a:r>
+            <a:r>
+              <a:rPr lang="en-US" sz="2200" b="1" dirty="0" smtClean="0"/>
+              <a:t>)]</a:t>
+            </a:r>
+          </a:p>
+        </p:txBody>
+      </p:sp>
+    </p:spTree>
+    <p:extLst>
+      <p:ext uri="{BB962C8B-B14F-4D97-AF65-F5344CB8AC3E}">
+        <p14:creationId xmlns:p14="http://schemas.microsoft.com/office/powerpoint/2010/main" val="3059561675"/>
       </p:ext>
     </p:extLst>
   </p:cSld>

</xml_diff>